<commit_message>
Fixed bug in plotting and made minor optimizations.
</commit_message>
<xml_diff>
--- a/presentation/Stage：零磁场垂直入射线性重建.pptx
+++ b/presentation/Stage：零磁场垂直入射线性重建.pptx
@@ -10022,6 +10022,52 @@
           <a:chExt cx="0" cy="0"/>
         </a:xfrm>
       </p:grpSpPr>
+      <p:pic>
+        <p:nvPicPr>
+          <p:cNvPr id="5" name="图片 4" descr="图表&#10;&#10;中度可信度描述已自动生成">
+            <a:extLst>
+              <a:ext uri="{FF2B5EF4-FFF2-40B4-BE49-F238E27FC236}">
+                <a16:creationId xmlns:a16="http://schemas.microsoft.com/office/drawing/2014/main" id="{EA2A1A8E-68C2-EADE-56D9-11F42AAF4384}"/>
+              </a:ext>
+            </a:extLst>
+          </p:cNvPr>
+          <p:cNvPicPr>
+            <a:picLocks noChangeAspect="1"/>
+          </p:cNvPicPr>
+          <p:nvPr/>
+        </p:nvPicPr>
+        <p:blipFill>
+          <a:blip r:embed="rId2">
+            <a:clrChange>
+              <a:clrFrom>
+                <a:srgbClr val="FFFFFF"/>
+              </a:clrFrom>
+              <a:clrTo>
+                <a:srgbClr val="FFFFFF">
+                  <a:alpha val="0"/>
+                </a:srgbClr>
+              </a:clrTo>
+            </a:clrChange>
+            <a:extLst>
+              <a:ext uri="{28A0092B-C50C-407E-A947-70E740481C1C}">
+                <a14:useLocalDpi xmlns:a14="http://schemas.microsoft.com/office/drawing/2010/main" val="0"/>
+              </a:ext>
+            </a:extLst>
+          </a:blip>
+          <a:stretch>
+            <a:fillRect/>
+          </a:stretch>
+        </p:blipFill>
+        <p:spPr>
+          <a:xfrm>
+            <a:off x="694800" y="1670400"/>
+            <a:ext cx="6286622" cy="4399200"/>
+          </a:xfrm>
+          <a:prstGeom prst="rect">
+            <a:avLst/>
+          </a:prstGeom>
+        </p:spPr>
+      </p:pic>
       <p:sp>
         <p:nvSpPr>
           <p:cNvPr id="2" name="标题 1">
@@ -10067,8 +10113,8 @@
           </a:p>
         </p:txBody>
       </p:sp>
-      <mc:AlternateContent xmlns:mc="http://schemas.openxmlformats.org/markup-compatibility/2006" xmlns:a14="http://schemas.microsoft.com/office/drawing/2010/main">
-        <mc:Choice Requires="a14">
+      <mc:AlternateContent xmlns:mc="http://schemas.openxmlformats.org/markup-compatibility/2006">
+        <mc:Choice xmlns:a14="http://schemas.microsoft.com/office/drawing/2010/main" Requires="a14">
           <p:sp>
             <p:nvSpPr>
               <p:cNvPr id="3" name="文本框 2">
@@ -10193,7 +10239,7 @@
             </p:txBody>
           </p:sp>
         </mc:Choice>
-        <mc:Fallback xmlns="">
+        <mc:Fallback>
           <p:sp>
             <p:nvSpPr>
               <p:cNvPr id="3" name="文本框 2">
@@ -10217,7 +10263,7 @@
                 <a:avLst/>
               </a:prstGeom>
               <a:blipFill>
-                <a:blip r:embed="rId2"/>
+                <a:blip r:embed="rId3"/>
                 <a:stretch>
                   <a:fillRect l="-903" t="-10526" b="-28947"/>
                 </a:stretch>
@@ -10272,54 +10318,8 @@
           </a:p>
         </p:txBody>
       </p:sp>
-      <p:pic>
-        <p:nvPicPr>
-          <p:cNvPr id="11" name="图片 10" descr="图表&#10;&#10;描述已自动生成">
-            <a:extLst>
-              <a:ext uri="{FF2B5EF4-FFF2-40B4-BE49-F238E27FC236}">
-                <a16:creationId xmlns:a16="http://schemas.microsoft.com/office/drawing/2014/main" id="{E895D121-EFA8-5D99-EF8D-B2C5BDC2BC7C}"/>
-              </a:ext>
-            </a:extLst>
-          </p:cNvPr>
-          <p:cNvPicPr>
-            <a:picLocks noChangeAspect="1"/>
-          </p:cNvPicPr>
-          <p:nvPr/>
-        </p:nvPicPr>
-        <p:blipFill>
-          <a:blip r:embed="rId3">
-            <a:clrChange>
-              <a:clrFrom>
-                <a:srgbClr val="FFFFFF"/>
-              </a:clrFrom>
-              <a:clrTo>
-                <a:srgbClr val="FFFFFF">
-                  <a:alpha val="0"/>
-                </a:srgbClr>
-              </a:clrTo>
-            </a:clrChange>
-            <a:extLst>
-              <a:ext uri="{28A0092B-C50C-407E-A947-70E740481C1C}">
-                <a14:useLocalDpi xmlns:a14="http://schemas.microsoft.com/office/drawing/2010/main" val="0"/>
-              </a:ext>
-            </a:extLst>
-          </a:blip>
-          <a:stretch>
-            <a:fillRect/>
-          </a:stretch>
-        </p:blipFill>
-        <p:spPr>
-          <a:xfrm>
-            <a:off x="694800" y="1670832"/>
-            <a:ext cx="6284469" cy="4397694"/>
-          </a:xfrm>
-          <a:prstGeom prst="rect">
-            <a:avLst/>
-          </a:prstGeom>
-        </p:spPr>
-      </p:pic>
-      <mc:AlternateContent xmlns:mc="http://schemas.openxmlformats.org/markup-compatibility/2006" xmlns:a14="http://schemas.microsoft.com/office/drawing/2010/main">
-        <mc:Choice Requires="a14">
+      <mc:AlternateContent xmlns:mc="http://schemas.openxmlformats.org/markup-compatibility/2006">
+        <mc:Choice xmlns:a14="http://schemas.microsoft.com/office/drawing/2010/main" Requires="a14">
           <p:sp>
             <p:nvSpPr>
               <p:cNvPr id="12" name="文本框 11">
@@ -10397,7 +10397,7 @@
                         <a:ea typeface="华文楷体" panose="02010600040101010101" pitchFamily="2" charset="-122"/>
                         <a:cs typeface="+mj-cs"/>
                       </a:rPr>
-                      <m:t>𝛽𝛾</m:t>
+                      <m:t>𝛽</m:t>
                     </m:r>
                   </m:oMath>
                 </a14:m>
@@ -10413,7 +10413,7 @@
             </p:txBody>
           </p:sp>
         </mc:Choice>
-        <mc:Fallback xmlns="">
+        <mc:Fallback>
           <p:sp>
             <p:nvSpPr>
               <p:cNvPr id="12" name="文本框 11">
@@ -10472,7 +10472,7 @@
         </p:nvSpPr>
         <p:spPr>
           <a:xfrm>
-            <a:off x="6668048" y="3154098"/>
+            <a:off x="6668048" y="2369805"/>
             <a:ext cx="4826752" cy="461665"/>
           </a:xfrm>
           <a:prstGeom prst="rect">
@@ -10526,8 +10526,8 @@
           </a:p>
         </p:txBody>
       </p:sp>
-      <mc:AlternateContent xmlns:mc="http://schemas.openxmlformats.org/markup-compatibility/2006" xmlns:a14="http://schemas.microsoft.com/office/drawing/2010/main">
-        <mc:Choice Requires="a14">
+      <mc:AlternateContent xmlns:mc="http://schemas.openxmlformats.org/markup-compatibility/2006">
+        <mc:Choice xmlns:a14="http://schemas.microsoft.com/office/drawing/2010/main" Requires="a14">
           <p:sp>
             <p:nvSpPr>
               <p:cNvPr id="16" name="文本框 15">
@@ -10542,7 +10542,7 @@
             </p:nvSpPr>
             <p:spPr>
               <a:xfrm>
-                <a:off x="6668048" y="3615763"/>
+                <a:off x="6668048" y="4401130"/>
                 <a:ext cx="4826752" cy="1200329"/>
               </a:xfrm>
               <a:prstGeom prst="rect">
@@ -10580,7 +10580,7 @@
                         <a:ea typeface="华文楷体" panose="02010600040101010101" pitchFamily="2" charset="-122"/>
                         <a:cs typeface="+mj-cs"/>
                       </a:rPr>
-                      <m:t>𝛽𝛾</m:t>
+                      <m:t>𝛽</m:t>
                     </m:r>
                   </m:oMath>
                 </a14:m>
@@ -10639,7 +10639,7 @@
             </p:txBody>
           </p:sp>
         </mc:Choice>
-        <mc:Fallback xmlns="">
+        <mc:Fallback>
           <p:sp>
             <p:nvSpPr>
               <p:cNvPr id="16" name="文本框 15">
@@ -10656,7 +10656,7 @@
             </p:nvSpPr>
             <p:spPr>
               <a:xfrm>
-                <a:off x="6668048" y="3615763"/>
+                <a:off x="6668048" y="4401130"/>
                 <a:ext cx="4826752" cy="1200329"/>
               </a:xfrm>
               <a:prstGeom prst="rect">
@@ -10684,6 +10684,301 @@
           </p:sp>
         </mc:Fallback>
       </mc:AlternateContent>
+      <mc:AlternateContent xmlns:mc="http://schemas.openxmlformats.org/markup-compatibility/2006">
+        <mc:Choice xmlns:a14="http://schemas.microsoft.com/office/drawing/2010/main" Requires="a14">
+          <p:sp>
+            <p:nvSpPr>
+              <p:cNvPr id="6" name="文本框 5">
+                <a:extLst>
+                  <a:ext uri="{FF2B5EF4-FFF2-40B4-BE49-F238E27FC236}">
+                    <a16:creationId xmlns:a16="http://schemas.microsoft.com/office/drawing/2014/main" id="{8C54F6EE-EC98-1EB9-8980-80DB11E84B10}"/>
+                  </a:ext>
+                </a:extLst>
+              </p:cNvPr>
+              <p:cNvSpPr txBox="1"/>
+              <p:nvPr/>
+            </p:nvSpPr>
+            <p:spPr>
+              <a:xfrm>
+                <a:off x="6668048" y="2831470"/>
+                <a:ext cx="4826752" cy="1569660"/>
+              </a:xfrm>
+              <a:prstGeom prst="rect">
+                <a:avLst/>
+              </a:prstGeom>
+              <a:noFill/>
+            </p:spPr>
+            <p:txBody>
+              <a:bodyPr wrap="square">
+                <a:spAutoFit/>
+              </a:bodyPr>
+              <a:lstStyle/>
+              <a:p>
+                <a:pPr>
+                  <a:spcBef>
+                    <a:spcPts val="600"/>
+                  </a:spcBef>
+                  <a:spcAft>
+                    <a:spcPts val="600"/>
+                  </a:spcAft>
+                </a:pPr>
+                <a:r>
+                  <a:rPr lang="zh-CN" altLang="en-US" sz="2400" dirty="0">
+                    <a:latin typeface="华文楷体" panose="02010600040101010101" pitchFamily="2" charset="-122"/>
+                    <a:ea typeface="华文楷体" panose="02010600040101010101" pitchFamily="2" charset="-122"/>
+                    <a:cs typeface="+mj-cs"/>
+                  </a:rPr>
+                  <a:t>由于</a:t>
+                </a:r>
+                <a:r>
+                  <a:rPr lang="en-US" altLang="zh-CN" sz="2400" dirty="0">
+                    <a:latin typeface="华文楷体" panose="02010600040101010101" pitchFamily="2" charset="-122"/>
+                    <a:ea typeface="华文楷体" panose="02010600040101010101" pitchFamily="2" charset="-122"/>
+                    <a:cs typeface="+mj-cs"/>
+                  </a:rPr>
+                  <a:t>[7]</a:t>
+                </a:r>
+                <a:r>
+                  <a:rPr lang="zh-CN" altLang="en-US" sz="2400" dirty="0">
+                    <a:latin typeface="华文楷体" panose="02010600040101010101" pitchFamily="2" charset="-122"/>
+                    <a:ea typeface="华文楷体" panose="02010600040101010101" pitchFamily="2" charset="-122"/>
+                    <a:cs typeface="+mj-cs"/>
+                  </a:rPr>
+                  <a:t>指出</a:t>
+                </a:r>
+                <a:r>
+                  <a:rPr lang="en-US" altLang="zh-CN" sz="2400" dirty="0">
+                    <a:latin typeface="华文楷体" panose="02010600040101010101" pitchFamily="2" charset="-122"/>
+                    <a:ea typeface="华文楷体" panose="02010600040101010101" pitchFamily="2" charset="-122"/>
+                    <a:cs typeface="+mj-cs"/>
+                  </a:rPr>
+                  <a:t>Bethe</a:t>
+                </a:r>
+                <a:r>
+                  <a:rPr lang="zh-CN" altLang="en-US" sz="2400" dirty="0">
+                    <a:latin typeface="华文楷体" panose="02010600040101010101" pitchFamily="2" charset="-122"/>
+                    <a:ea typeface="华文楷体" panose="02010600040101010101" pitchFamily="2" charset="-122"/>
+                    <a:cs typeface="+mj-cs"/>
+                  </a:rPr>
+                  <a:t>方程在</a:t>
+                </a:r>
+                <a14:m>
+                  <m:oMath xmlns:m="http://schemas.openxmlformats.org/officeDocument/2006/math">
+                    <m:r>
+                      <a:rPr lang="en-US" altLang="zh-CN" sz="2400" i="1" dirty="0" smtClean="0">
+                        <a:latin typeface="Cambria Math" panose="02040503050406030204" pitchFamily="18" charset="0"/>
+                        <a:ea typeface="华文楷体" panose="02010600040101010101" pitchFamily="2" charset="-122"/>
+                        <a:cs typeface="+mj-cs"/>
+                      </a:rPr>
+                      <m:t>0.1≤</m:t>
+                    </m:r>
+                    <m:r>
+                      <a:rPr lang="en-US" altLang="zh-CN" sz="2400" b="0" i="1" dirty="0" smtClean="0">
+                        <a:latin typeface="Cambria Math" panose="02040503050406030204" pitchFamily="18" charset="0"/>
+                        <a:ea typeface="华文楷体" panose="02010600040101010101" pitchFamily="2" charset="-122"/>
+                        <a:cs typeface="+mj-cs"/>
+                      </a:rPr>
+                      <m:t>𝛽𝛾</m:t>
+                    </m:r>
+                    <m:r>
+                      <a:rPr lang="en-US" altLang="zh-CN" sz="2400" b="0" i="1" dirty="0" smtClean="0">
+                        <a:latin typeface="Cambria Math" panose="02040503050406030204" pitchFamily="18" charset="0"/>
+                        <a:ea typeface="华文楷体" panose="02010600040101010101" pitchFamily="2" charset="-122"/>
+                        <a:cs typeface="+mj-cs"/>
+                      </a:rPr>
+                      <m:t>≤1000</m:t>
+                    </m:r>
+                  </m:oMath>
+                </a14:m>
+                <a:r>
+                  <a:rPr lang="zh-CN" altLang="en-US" sz="2400" dirty="0">
+                    <a:latin typeface="华文楷体" panose="02010600040101010101" pitchFamily="2" charset="-122"/>
+                    <a:ea typeface="华文楷体" panose="02010600040101010101" pitchFamily="2" charset="-122"/>
+                    <a:cs typeface="+mj-cs"/>
+                  </a:rPr>
+                  <a:t>的误差可以接受，因此以</a:t>
+                </a:r>
+                <a14:m>
+                  <m:oMath xmlns:m="http://schemas.openxmlformats.org/officeDocument/2006/math">
+                    <m:r>
+                      <a:rPr lang="en-US" altLang="zh-CN" sz="2400" i="1" dirty="0">
+                        <a:latin typeface="Cambria Math" panose="02040503050406030204" pitchFamily="18" charset="0"/>
+                        <a:ea typeface="华文楷体" panose="02010600040101010101" pitchFamily="2" charset="-122"/>
+                      </a:rPr>
+                      <m:t>𝛽𝛾</m:t>
+                    </m:r>
+                  </m:oMath>
+                </a14:m>
+                <a:r>
+                  <a:rPr lang="zh-CN" altLang="en-US" sz="2400" dirty="0">
+                    <a:latin typeface="华文楷体" panose="02010600040101010101" pitchFamily="2" charset="-122"/>
+                    <a:ea typeface="华文楷体" panose="02010600040101010101" pitchFamily="2" charset="-122"/>
+                    <a:cs typeface="+mj-cs"/>
+                  </a:rPr>
+                  <a:t>作为限制区域，</a:t>
+                </a:r>
+                <a:r>
+                  <a:rPr lang="zh-CN" altLang="en-US" sz="2400" dirty="0">
+                    <a:solidFill>
+                      <a:srgbClr val="1F1FFF"/>
+                    </a:solidFill>
+                    <a:latin typeface="华文楷体" panose="02010600040101010101" pitchFamily="2" charset="-122"/>
+                    <a:ea typeface="华文楷体" panose="02010600040101010101" pitchFamily="2" charset="-122"/>
+                    <a:cs typeface="+mj-cs"/>
+                  </a:rPr>
+                  <a:t>蓝色实线</a:t>
+                </a:r>
+                <a:r>
+                  <a:rPr lang="zh-CN" altLang="en-US" sz="2400" dirty="0">
+                    <a:latin typeface="华文楷体" panose="02010600040101010101" pitchFamily="2" charset="-122"/>
+                    <a:ea typeface="华文楷体" panose="02010600040101010101" pitchFamily="2" charset="-122"/>
+                    <a:cs typeface="+mj-cs"/>
+                  </a:rPr>
+                  <a:t>的最左端为</a:t>
+                </a:r>
+                <a14:m>
+                  <m:oMath xmlns:m="http://schemas.openxmlformats.org/officeDocument/2006/math">
+                    <m:r>
+                      <a:rPr lang="en-US" altLang="zh-CN" sz="2400" i="1" dirty="0" smtClean="0">
+                        <a:latin typeface="Cambria Math" panose="02040503050406030204" pitchFamily="18" charset="0"/>
+                        <a:ea typeface="华文楷体" panose="02010600040101010101" pitchFamily="2" charset="-122"/>
+                      </a:rPr>
+                      <m:t>𝛽𝛾</m:t>
+                    </m:r>
+                  </m:oMath>
+                </a14:m>
+                <a:r>
+                  <a:rPr lang="en-US" altLang="zh-CN" sz="2400" dirty="0">
+                    <a:latin typeface="华文楷体" panose="02010600040101010101" pitchFamily="2" charset="-122"/>
+                    <a:ea typeface="华文楷体" panose="02010600040101010101" pitchFamily="2" charset="-122"/>
+                    <a:cs typeface="+mj-cs"/>
+                  </a:rPr>
+                  <a:t>=0.1</a:t>
+                </a:r>
+                <a:r>
+                  <a:rPr lang="zh-CN" altLang="en-US" sz="2400" dirty="0">
+                    <a:latin typeface="华文楷体" panose="02010600040101010101" pitchFamily="2" charset="-122"/>
+                    <a:ea typeface="华文楷体" panose="02010600040101010101" pitchFamily="2" charset="-122"/>
+                    <a:cs typeface="+mj-cs"/>
+                  </a:rPr>
+                  <a:t>，最右端为</a:t>
+                </a:r>
+                <a14:m>
+                  <m:oMath xmlns:m="http://schemas.openxmlformats.org/officeDocument/2006/math">
+                    <m:r>
+                      <a:rPr lang="en-US" altLang="zh-CN" sz="2400" i="1" dirty="0">
+                        <a:latin typeface="Cambria Math" panose="02040503050406030204" pitchFamily="18" charset="0"/>
+                        <a:ea typeface="华文楷体" panose="02010600040101010101" pitchFamily="2" charset="-122"/>
+                      </a:rPr>
+                      <m:t>𝛽𝛾</m:t>
+                    </m:r>
+                  </m:oMath>
+                </a14:m>
+                <a:r>
+                  <a:rPr lang="en-US" altLang="zh-CN" sz="2400" dirty="0">
+                    <a:latin typeface="华文楷体" panose="02010600040101010101" pitchFamily="2" charset="-122"/>
+                    <a:ea typeface="华文楷体" panose="02010600040101010101" pitchFamily="2" charset="-122"/>
+                  </a:rPr>
+                  <a:t>=1000</a:t>
+                </a:r>
+                <a:endParaRPr lang="en-US" altLang="zh-CN" sz="2400" dirty="0">
+                  <a:latin typeface="华文楷体" panose="02010600040101010101" pitchFamily="2" charset="-122"/>
+                  <a:ea typeface="华文楷体" panose="02010600040101010101" pitchFamily="2" charset="-122"/>
+                  <a:cs typeface="+mj-cs"/>
+                </a:endParaRPr>
+              </a:p>
+            </p:txBody>
+          </p:sp>
+        </mc:Choice>
+        <mc:Fallback>
+          <p:sp>
+            <p:nvSpPr>
+              <p:cNvPr id="6" name="文本框 5">
+                <a:extLst>
+                  <a:ext uri="{FF2B5EF4-FFF2-40B4-BE49-F238E27FC236}">
+                    <a16:creationId xmlns:a16="http://schemas.microsoft.com/office/drawing/2014/main" id="{8C54F6EE-EC98-1EB9-8980-80DB11E84B10}"/>
+                  </a:ext>
+                </a:extLst>
+              </p:cNvPr>
+              <p:cNvSpPr txBox="1">
+                <a:spLocks noRot="1" noChangeAspect="1" noMove="1" noResize="1" noEditPoints="1" noAdjustHandles="1" noChangeArrowheads="1" noChangeShapeType="1" noTextEdit="1"/>
+              </p:cNvSpPr>
+              <p:nvPr/>
+            </p:nvSpPr>
+            <p:spPr>
+              <a:xfrm>
+                <a:off x="6668048" y="2831470"/>
+                <a:ext cx="4826752" cy="1569660"/>
+              </a:xfrm>
+              <a:prstGeom prst="rect">
+                <a:avLst/>
+              </a:prstGeom>
+              <a:blipFill>
+                <a:blip r:embed="rId6"/>
+                <a:stretch>
+                  <a:fillRect l="-2020" t="-3101" r="-379" b="-7752"/>
+                </a:stretch>
+              </a:blipFill>
+            </p:spPr>
+            <p:txBody>
+              <a:bodyPr/>
+              <a:lstStyle/>
+              <a:p>
+                <a:r>
+                  <a:rPr lang="zh-CN" altLang="en-US">
+                    <a:noFill/>
+                  </a:rPr>
+                  <a:t> </a:t>
+                </a:r>
+              </a:p>
+            </p:txBody>
+          </p:sp>
+        </mc:Fallback>
+      </mc:AlternateContent>
+      <p:sp>
+        <p:nvSpPr>
+          <p:cNvPr id="8" name="文本框 7">
+            <a:extLst>
+              <a:ext uri="{FF2B5EF4-FFF2-40B4-BE49-F238E27FC236}">
+                <a16:creationId xmlns:a16="http://schemas.microsoft.com/office/drawing/2014/main" id="{D7F551C6-C2B6-9496-3E4B-51D9B4CDDE64}"/>
+              </a:ext>
+            </a:extLst>
+          </p:cNvPr>
+          <p:cNvSpPr txBox="1"/>
+          <p:nvPr/>
+        </p:nvSpPr>
+        <p:spPr>
+          <a:xfrm>
+            <a:off x="154800" y="6370340"/>
+            <a:ext cx="11880000" cy="338554"/>
+          </a:xfrm>
+          <a:prstGeom prst="rect">
+            <a:avLst/>
+          </a:prstGeom>
+          <a:noFill/>
+        </p:spPr>
+        <p:txBody>
+          <a:bodyPr wrap="square">
+            <a:spAutoFit/>
+          </a:bodyPr>
+          <a:lstStyle/>
+          <a:p>
+            <a:r>
+              <a:rPr lang="en-US" altLang="zh-CN" sz="1600" dirty="0">
+                <a:latin typeface="华文楷体" panose="02010600040101010101" pitchFamily="2" charset="-122"/>
+                <a:ea typeface="华文楷体" panose="02010600040101010101" pitchFamily="2" charset="-122"/>
+                <a:cs typeface="Times New Roman" panose="02020603050405020304" pitchFamily="18" charset="0"/>
+              </a:rPr>
+              <a:t>[7] Navas, S., others. Review of particle physics. Phys. Rev. D, 110(3): 030001, 2024. DOI: 10.1103/PhysRevD.110.030001.</a:t>
+            </a:r>
+            <a:endParaRPr lang="zh-CN" altLang="en-US" sz="1600" dirty="0">
+              <a:latin typeface="华文楷体" panose="02010600040101010101" pitchFamily="2" charset="-122"/>
+              <a:ea typeface="华文楷体" panose="02010600040101010101" pitchFamily="2" charset="-122"/>
+              <a:cs typeface="Times New Roman" panose="02020603050405020304" pitchFamily="18" charset="0"/>
+            </a:endParaRPr>
+          </a:p>
+        </p:txBody>
+      </p:sp>
     </p:spTree>
     <p:extLst>
       <p:ext uri="{BB962C8B-B14F-4D97-AF65-F5344CB8AC3E}">
@@ -10777,66 +11072,165 @@
           </a:p>
         </p:txBody>
       </p:sp>
-      <p:sp>
-        <p:nvSpPr>
-          <p:cNvPr id="3" name="文本框 2">
-            <a:extLst>
-              <a:ext uri="{FF2B5EF4-FFF2-40B4-BE49-F238E27FC236}">
-                <a16:creationId xmlns:a16="http://schemas.microsoft.com/office/drawing/2014/main" id="{AAE421F9-56E5-729B-610E-5EA665B67065}"/>
-              </a:ext>
-            </a:extLst>
-          </p:cNvPr>
-          <p:cNvSpPr txBox="1"/>
-          <p:nvPr/>
-        </p:nvSpPr>
-        <p:spPr>
-          <a:xfrm>
-            <a:off x="694800" y="1440000"/>
-            <a:ext cx="10800000" cy="461665"/>
-          </a:xfrm>
-          <a:prstGeom prst="rect">
-            <a:avLst/>
-          </a:prstGeom>
-          <a:noFill/>
-        </p:spPr>
-        <p:txBody>
-          <a:bodyPr wrap="square">
-            <a:spAutoFit/>
-          </a:bodyPr>
-          <a:lstStyle/>
-          <a:p>
-            <a:pPr>
-              <a:spcBef>
-                <a:spcPts val="600"/>
-              </a:spcBef>
-              <a:spcAft>
-                <a:spcPts val="600"/>
-              </a:spcAft>
-            </a:pPr>
-            <a:r>
-              <a:rPr lang="en-US" altLang="zh-CN" sz="2400" dirty="0">
-                <a:latin typeface="华文楷体" panose="02010600040101010101" pitchFamily="2" charset="-122"/>
-                <a:ea typeface="华文楷体" panose="02010600040101010101" pitchFamily="2" charset="-122"/>
-                <a:cs typeface="+mj-cs"/>
-              </a:rPr>
-              <a:t>2. </a:t>
-            </a:r>
-            <a:r>
-              <a:rPr lang="zh-CN" altLang="en-US" sz="2400" dirty="0">
-                <a:latin typeface="华文楷体" panose="02010600040101010101" pitchFamily="2" charset="-122"/>
-                <a:ea typeface="华文楷体" panose="02010600040101010101" pitchFamily="2" charset="-122"/>
-                <a:cs typeface="+mj-cs"/>
-              </a:rPr>
-              <a:t>能量损失对粒子通过探测器时的时间的影响</a:t>
-            </a:r>
-            <a:endParaRPr lang="en-US" altLang="zh-CN" sz="2400" dirty="0">
-              <a:latin typeface="华文楷体" panose="02010600040101010101" pitchFamily="2" charset="-122"/>
-              <a:ea typeface="华文楷体" panose="02010600040101010101" pitchFamily="2" charset="-122"/>
-              <a:cs typeface="+mj-cs"/>
-            </a:endParaRPr>
-          </a:p>
-        </p:txBody>
-      </p:sp>
+      <mc:AlternateContent xmlns:mc="http://schemas.openxmlformats.org/markup-compatibility/2006">
+        <mc:Choice xmlns:a14="http://schemas.microsoft.com/office/drawing/2010/main" Requires="a14">
+          <p:sp>
+            <p:nvSpPr>
+              <p:cNvPr id="3" name="文本框 2">
+                <a:extLst>
+                  <a:ext uri="{FF2B5EF4-FFF2-40B4-BE49-F238E27FC236}">
+                    <a16:creationId xmlns:a16="http://schemas.microsoft.com/office/drawing/2014/main" id="{AAE421F9-56E5-729B-610E-5EA665B67065}"/>
+                  </a:ext>
+                </a:extLst>
+              </p:cNvPr>
+              <p:cNvSpPr txBox="1"/>
+              <p:nvPr/>
+            </p:nvSpPr>
+            <p:spPr>
+              <a:xfrm>
+                <a:off x="694800" y="1440000"/>
+                <a:ext cx="10800000" cy="461665"/>
+              </a:xfrm>
+              <a:prstGeom prst="rect">
+                <a:avLst/>
+              </a:prstGeom>
+              <a:noFill/>
+            </p:spPr>
+            <p:txBody>
+              <a:bodyPr wrap="square">
+                <a:spAutoFit/>
+              </a:bodyPr>
+              <a:lstStyle/>
+              <a:p>
+                <a:pPr>
+                  <a:spcBef>
+                    <a:spcPts val="600"/>
+                  </a:spcBef>
+                  <a:spcAft>
+                    <a:spcPts val="600"/>
+                  </a:spcAft>
+                </a:pPr>
+                <a:r>
+                  <a:rPr lang="en-US" altLang="zh-CN" sz="2400" dirty="0">
+                    <a:latin typeface="华文楷体" panose="02010600040101010101" pitchFamily="2" charset="-122"/>
+                    <a:ea typeface="华文楷体" panose="02010600040101010101" pitchFamily="2" charset="-122"/>
+                    <a:cs typeface="+mj-cs"/>
+                  </a:rPr>
+                  <a:t>2. </a:t>
+                </a:r>
+                <a:r>
+                  <a:rPr lang="zh-CN" altLang="en-US" sz="2400" dirty="0">
+                    <a:latin typeface="华文楷体" panose="02010600040101010101" pitchFamily="2" charset="-122"/>
+                    <a:ea typeface="华文楷体" panose="02010600040101010101" pitchFamily="2" charset="-122"/>
+                    <a:cs typeface="+mj-cs"/>
+                  </a:rPr>
+                  <a:t>能量损失对粒子通过探测器时的时间的影响（</a:t>
+                </a:r>
+                <a14:m>
+                  <m:oMath xmlns:m="http://schemas.openxmlformats.org/officeDocument/2006/math">
+                    <m:sSub>
+                      <m:sSubPr>
+                        <m:ctrlPr>
+                          <a:rPr lang="en-US" altLang="zh-CN" sz="2400" b="0" i="1" smtClean="0">
+                            <a:latin typeface="Cambria Math" panose="02040503050406030204" pitchFamily="18" charset="0"/>
+                            <a:ea typeface="华文楷体" panose="02010600040101010101" pitchFamily="2" charset="-122"/>
+                            <a:cs typeface="+mj-cs"/>
+                          </a:rPr>
+                        </m:ctrlPr>
+                      </m:sSubPr>
+                      <m:e>
+                        <m:r>
+                          <a:rPr lang="en-US" altLang="zh-CN" sz="2400" b="0" i="1" smtClean="0">
+                            <a:latin typeface="Cambria Math" panose="02040503050406030204" pitchFamily="18" charset="0"/>
+                            <a:ea typeface="华文楷体" panose="02010600040101010101" pitchFamily="2" charset="-122"/>
+                            <a:cs typeface="+mj-cs"/>
+                          </a:rPr>
+                          <m:t>𝛽</m:t>
+                        </m:r>
+                      </m:e>
+                      <m:sub>
+                        <m:r>
+                          <a:rPr lang="en-US" altLang="zh-CN" sz="2400" b="0" i="1" smtClean="0">
+                            <a:latin typeface="Cambria Math" panose="02040503050406030204" pitchFamily="18" charset="0"/>
+                            <a:ea typeface="华文楷体" panose="02010600040101010101" pitchFamily="2" charset="-122"/>
+                            <a:cs typeface="+mj-cs"/>
+                          </a:rPr>
+                          <m:t>𝑟𝑒𝑎𝑙</m:t>
+                        </m:r>
+                      </m:sub>
+                    </m:sSub>
+                    <m:r>
+                      <a:rPr lang="en-US" altLang="zh-CN" sz="2400" b="0" i="1" smtClean="0">
+                        <a:latin typeface="Cambria Math" panose="02040503050406030204" pitchFamily="18" charset="0"/>
+                        <a:ea typeface="华文楷体" panose="02010600040101010101" pitchFamily="2" charset="-122"/>
+                        <a:cs typeface="+mj-cs"/>
+                      </a:rPr>
+                      <m:t>=0.7</m:t>
+                    </m:r>
+                  </m:oMath>
+                </a14:m>
+                <a:r>
+                  <a:rPr lang="zh-CN" altLang="en-US" sz="2400" dirty="0">
+                    <a:latin typeface="华文楷体" panose="02010600040101010101" pitchFamily="2" charset="-122"/>
+                    <a:ea typeface="华文楷体" panose="02010600040101010101" pitchFamily="2" charset="-122"/>
+                    <a:cs typeface="+mj-cs"/>
+                  </a:rPr>
+                  <a:t>）</a:t>
+                </a:r>
+                <a:endParaRPr lang="en-US" altLang="zh-CN" sz="2400" dirty="0">
+                  <a:latin typeface="华文楷体" panose="02010600040101010101" pitchFamily="2" charset="-122"/>
+                  <a:ea typeface="华文楷体" panose="02010600040101010101" pitchFamily="2" charset="-122"/>
+                  <a:cs typeface="+mj-cs"/>
+                </a:endParaRPr>
+              </a:p>
+            </p:txBody>
+          </p:sp>
+        </mc:Choice>
+        <mc:Fallback>
+          <p:sp>
+            <p:nvSpPr>
+              <p:cNvPr id="3" name="文本框 2">
+                <a:extLst>
+                  <a:ext uri="{FF2B5EF4-FFF2-40B4-BE49-F238E27FC236}">
+                    <a16:creationId xmlns:a16="http://schemas.microsoft.com/office/drawing/2014/main" id="{AAE421F9-56E5-729B-610E-5EA665B67065}"/>
+                  </a:ext>
+                </a:extLst>
+              </p:cNvPr>
+              <p:cNvSpPr txBox="1">
+                <a:spLocks noRot="1" noChangeAspect="1" noMove="1" noResize="1" noEditPoints="1" noAdjustHandles="1" noChangeArrowheads="1" noChangeShapeType="1" noTextEdit="1"/>
+              </p:cNvSpPr>
+              <p:nvPr/>
+            </p:nvSpPr>
+            <p:spPr>
+              <a:xfrm>
+                <a:off x="694800" y="1440000"/>
+                <a:ext cx="10800000" cy="461665"/>
+              </a:xfrm>
+              <a:prstGeom prst="rect">
+                <a:avLst/>
+              </a:prstGeom>
+              <a:blipFill>
+                <a:blip r:embed="rId2"/>
+                <a:stretch>
+                  <a:fillRect l="-903" t="-10526" b="-28947"/>
+                </a:stretch>
+              </a:blipFill>
+            </p:spPr>
+            <p:txBody>
+              <a:bodyPr/>
+              <a:lstStyle/>
+              <a:p>
+                <a:r>
+                  <a:rPr lang="zh-CN" altLang="en-US">
+                    <a:noFill/>
+                  </a:rPr>
+                  <a:t> </a:t>
+                </a:r>
+              </a:p>
+            </p:txBody>
+          </p:sp>
+        </mc:Fallback>
+      </mc:AlternateContent>
       <p:sp>
         <p:nvSpPr>
           <p:cNvPr id="7" name="灯片编号占位符 3">
@@ -11065,7 +11459,7 @@
                 <a:avLst/>
               </a:prstGeom>
               <a:blipFill>
-                <a:blip r:embed="rId2"/>
+                <a:blip r:embed="rId3"/>
                 <a:stretch>
                   <a:fillRect l="-2020" t="-5839" b="-15328"/>
                 </a:stretch>
@@ -11153,7 +11547,7 @@
           <p:nvPr/>
         </p:nvPicPr>
         <p:blipFill>
-          <a:blip r:embed="rId3">
+          <a:blip r:embed="rId4">
             <a:clrChange>
               <a:clrFrom>
                 <a:srgbClr val="FFFFFF"/>
@@ -11277,66 +11671,165 @@
           </a:p>
         </p:txBody>
       </p:sp>
-      <p:sp>
-        <p:nvSpPr>
-          <p:cNvPr id="3" name="文本框 2">
-            <a:extLst>
-              <a:ext uri="{FF2B5EF4-FFF2-40B4-BE49-F238E27FC236}">
-                <a16:creationId xmlns:a16="http://schemas.microsoft.com/office/drawing/2014/main" id="{9027521E-48BC-23D3-ECC6-0DB179720E16}"/>
-              </a:ext>
-            </a:extLst>
-          </p:cNvPr>
-          <p:cNvSpPr txBox="1"/>
-          <p:nvPr/>
-        </p:nvSpPr>
-        <p:spPr>
-          <a:xfrm>
-            <a:off x="694800" y="1440000"/>
-            <a:ext cx="10800000" cy="461665"/>
-          </a:xfrm>
-          <a:prstGeom prst="rect">
-            <a:avLst/>
-          </a:prstGeom>
-          <a:noFill/>
-        </p:spPr>
-        <p:txBody>
-          <a:bodyPr wrap="square">
-            <a:spAutoFit/>
-          </a:bodyPr>
-          <a:lstStyle/>
-          <a:p>
-            <a:pPr>
-              <a:spcBef>
-                <a:spcPts val="600"/>
-              </a:spcBef>
-              <a:spcAft>
-                <a:spcPts val="600"/>
-              </a:spcAft>
-            </a:pPr>
-            <a:r>
-              <a:rPr lang="en-US" altLang="zh-CN" sz="2400" dirty="0">
-                <a:latin typeface="华文楷体" panose="02010600040101010101" pitchFamily="2" charset="-122"/>
-                <a:ea typeface="华文楷体" panose="02010600040101010101" pitchFamily="2" charset="-122"/>
-                <a:cs typeface="+mj-cs"/>
-              </a:rPr>
-              <a:t>3. </a:t>
-            </a:r>
-            <a:r>
-              <a:rPr lang="zh-CN" altLang="en-US" sz="2400" dirty="0">
-                <a:latin typeface="华文楷体" panose="02010600040101010101" pitchFamily="2" charset="-122"/>
-                <a:ea typeface="华文楷体" panose="02010600040101010101" pitchFamily="2" charset="-122"/>
-                <a:cs typeface="+mj-cs"/>
-              </a:rPr>
-              <a:t>探测与拟合（重建）</a:t>
-            </a:r>
-            <a:endParaRPr lang="en-US" altLang="zh-CN" sz="2400" dirty="0">
-              <a:latin typeface="华文楷体" panose="02010600040101010101" pitchFamily="2" charset="-122"/>
-              <a:ea typeface="华文楷体" panose="02010600040101010101" pitchFamily="2" charset="-122"/>
-              <a:cs typeface="+mj-cs"/>
-            </a:endParaRPr>
-          </a:p>
-        </p:txBody>
-      </p:sp>
+      <mc:AlternateContent xmlns:mc="http://schemas.openxmlformats.org/markup-compatibility/2006">
+        <mc:Choice xmlns:a14="http://schemas.microsoft.com/office/drawing/2010/main" Requires="a14">
+          <p:sp>
+            <p:nvSpPr>
+              <p:cNvPr id="3" name="文本框 2">
+                <a:extLst>
+                  <a:ext uri="{FF2B5EF4-FFF2-40B4-BE49-F238E27FC236}">
+                    <a16:creationId xmlns:a16="http://schemas.microsoft.com/office/drawing/2014/main" id="{9027521E-48BC-23D3-ECC6-0DB179720E16}"/>
+                  </a:ext>
+                </a:extLst>
+              </p:cNvPr>
+              <p:cNvSpPr txBox="1"/>
+              <p:nvPr/>
+            </p:nvSpPr>
+            <p:spPr>
+              <a:xfrm>
+                <a:off x="694800" y="1440000"/>
+                <a:ext cx="10800000" cy="461665"/>
+              </a:xfrm>
+              <a:prstGeom prst="rect">
+                <a:avLst/>
+              </a:prstGeom>
+              <a:noFill/>
+            </p:spPr>
+            <p:txBody>
+              <a:bodyPr wrap="square">
+                <a:spAutoFit/>
+              </a:bodyPr>
+              <a:lstStyle/>
+              <a:p>
+                <a:pPr>
+                  <a:spcBef>
+                    <a:spcPts val="600"/>
+                  </a:spcBef>
+                  <a:spcAft>
+                    <a:spcPts val="600"/>
+                  </a:spcAft>
+                </a:pPr>
+                <a:r>
+                  <a:rPr lang="en-US" altLang="zh-CN" sz="2400" dirty="0">
+                    <a:latin typeface="华文楷体" panose="02010600040101010101" pitchFamily="2" charset="-122"/>
+                    <a:ea typeface="华文楷体" panose="02010600040101010101" pitchFamily="2" charset="-122"/>
+                    <a:cs typeface="+mj-cs"/>
+                  </a:rPr>
+                  <a:t>3. </a:t>
+                </a:r>
+                <a:r>
+                  <a:rPr lang="zh-CN" altLang="en-US" sz="2400" dirty="0">
+                    <a:latin typeface="华文楷体" panose="02010600040101010101" pitchFamily="2" charset="-122"/>
+                    <a:ea typeface="华文楷体" panose="02010600040101010101" pitchFamily="2" charset="-122"/>
+                    <a:cs typeface="+mj-cs"/>
+                  </a:rPr>
+                  <a:t>探测与拟合（重建） （</a:t>
+                </a:r>
+                <a14:m>
+                  <m:oMath xmlns:m="http://schemas.openxmlformats.org/officeDocument/2006/math">
+                    <m:sSub>
+                      <m:sSubPr>
+                        <m:ctrlPr>
+                          <a:rPr lang="en-US" altLang="zh-CN" sz="2400" b="0" i="1" smtClean="0">
+                            <a:latin typeface="Cambria Math" panose="02040503050406030204" pitchFamily="18" charset="0"/>
+                            <a:ea typeface="华文楷体" panose="02010600040101010101" pitchFamily="2" charset="-122"/>
+                            <a:cs typeface="+mj-cs"/>
+                          </a:rPr>
+                        </m:ctrlPr>
+                      </m:sSubPr>
+                      <m:e>
+                        <m:r>
+                          <a:rPr lang="en-US" altLang="zh-CN" sz="2400" b="0" i="1" smtClean="0">
+                            <a:latin typeface="Cambria Math" panose="02040503050406030204" pitchFamily="18" charset="0"/>
+                            <a:ea typeface="华文楷体" panose="02010600040101010101" pitchFamily="2" charset="-122"/>
+                            <a:cs typeface="+mj-cs"/>
+                          </a:rPr>
+                          <m:t>𝛽</m:t>
+                        </m:r>
+                      </m:e>
+                      <m:sub>
+                        <m:r>
+                          <a:rPr lang="en-US" altLang="zh-CN" sz="2400" b="0" i="1" smtClean="0">
+                            <a:latin typeface="Cambria Math" panose="02040503050406030204" pitchFamily="18" charset="0"/>
+                            <a:ea typeface="华文楷体" panose="02010600040101010101" pitchFamily="2" charset="-122"/>
+                            <a:cs typeface="+mj-cs"/>
+                          </a:rPr>
+                          <m:t>𝑟𝑒𝑎𝑙</m:t>
+                        </m:r>
+                      </m:sub>
+                    </m:sSub>
+                    <m:r>
+                      <a:rPr lang="en-US" altLang="zh-CN" sz="2400" b="0" i="1" smtClean="0">
+                        <a:latin typeface="Cambria Math" panose="02040503050406030204" pitchFamily="18" charset="0"/>
+                        <a:ea typeface="华文楷体" panose="02010600040101010101" pitchFamily="2" charset="-122"/>
+                        <a:cs typeface="+mj-cs"/>
+                      </a:rPr>
+                      <m:t>=0.7</m:t>
+                    </m:r>
+                  </m:oMath>
+                </a14:m>
+                <a:r>
+                  <a:rPr lang="zh-CN" altLang="en-US" sz="2400" dirty="0">
+                    <a:latin typeface="华文楷体" panose="02010600040101010101" pitchFamily="2" charset="-122"/>
+                    <a:ea typeface="华文楷体" panose="02010600040101010101" pitchFamily="2" charset="-122"/>
+                    <a:cs typeface="+mj-cs"/>
+                  </a:rPr>
+                  <a:t>）</a:t>
+                </a:r>
+                <a:endParaRPr lang="en-US" altLang="zh-CN" sz="2400" dirty="0">
+                  <a:latin typeface="华文楷体" panose="02010600040101010101" pitchFamily="2" charset="-122"/>
+                  <a:ea typeface="华文楷体" panose="02010600040101010101" pitchFamily="2" charset="-122"/>
+                  <a:cs typeface="+mj-cs"/>
+                </a:endParaRPr>
+              </a:p>
+            </p:txBody>
+          </p:sp>
+        </mc:Choice>
+        <mc:Fallback>
+          <p:sp>
+            <p:nvSpPr>
+              <p:cNvPr id="3" name="文本框 2">
+                <a:extLst>
+                  <a:ext uri="{FF2B5EF4-FFF2-40B4-BE49-F238E27FC236}">
+                    <a16:creationId xmlns:a16="http://schemas.microsoft.com/office/drawing/2014/main" id="{9027521E-48BC-23D3-ECC6-0DB179720E16}"/>
+                  </a:ext>
+                </a:extLst>
+              </p:cNvPr>
+              <p:cNvSpPr txBox="1">
+                <a:spLocks noRot="1" noChangeAspect="1" noMove="1" noResize="1" noEditPoints="1" noAdjustHandles="1" noChangeArrowheads="1" noChangeShapeType="1" noTextEdit="1"/>
+              </p:cNvSpPr>
+              <p:nvPr/>
+            </p:nvSpPr>
+            <p:spPr>
+              <a:xfrm>
+                <a:off x="694800" y="1440000"/>
+                <a:ext cx="10800000" cy="461665"/>
+              </a:xfrm>
+              <a:prstGeom prst="rect">
+                <a:avLst/>
+              </a:prstGeom>
+              <a:blipFill>
+                <a:blip r:embed="rId2"/>
+                <a:stretch>
+                  <a:fillRect l="-903" t="-10526" b="-28947"/>
+                </a:stretch>
+              </a:blipFill>
+            </p:spPr>
+            <p:txBody>
+              <a:bodyPr/>
+              <a:lstStyle/>
+              <a:p>
+                <a:r>
+                  <a:rPr lang="zh-CN" altLang="en-US">
+                    <a:noFill/>
+                  </a:rPr>
+                  <a:t> </a:t>
+                </a:r>
+              </a:p>
+            </p:txBody>
+          </p:sp>
+        </mc:Fallback>
+      </mc:AlternateContent>
       <p:sp>
         <p:nvSpPr>
           <p:cNvPr id="7" name="灯片编号占位符 3">
@@ -11548,7 +12041,7 @@
           <p:nvPr/>
         </p:nvPicPr>
         <p:blipFill>
-          <a:blip r:embed="rId2">
+          <a:blip r:embed="rId3">
             <a:clrChange>
               <a:clrFrom>
                 <a:srgbClr val="FFFFFF"/>
@@ -11627,6 +12120,42 @@
           <a:chExt cx="0" cy="0"/>
         </a:xfrm>
       </p:grpSpPr>
+      <p:pic>
+        <p:nvPicPr>
+          <p:cNvPr id="8" name="图片 7" descr="图表, 折线图&#10;&#10;描述已自动生成">
+            <a:extLst>
+              <a:ext uri="{FF2B5EF4-FFF2-40B4-BE49-F238E27FC236}">
+                <a16:creationId xmlns:a16="http://schemas.microsoft.com/office/drawing/2014/main" id="{C2D5453D-4F25-AF21-902D-B23542C0C22D}"/>
+              </a:ext>
+            </a:extLst>
+          </p:cNvPr>
+          <p:cNvPicPr>
+            <a:picLocks noChangeAspect="1"/>
+          </p:cNvPicPr>
+          <p:nvPr/>
+        </p:nvPicPr>
+        <p:blipFill>
+          <a:blip r:embed="rId2">
+            <a:extLst>
+              <a:ext uri="{28A0092B-C50C-407E-A947-70E740481C1C}">
+                <a14:useLocalDpi xmlns:a14="http://schemas.microsoft.com/office/drawing/2010/main" val="0"/>
+              </a:ext>
+            </a:extLst>
+          </a:blip>
+          <a:stretch>
+            <a:fillRect/>
+          </a:stretch>
+        </p:blipFill>
+        <p:spPr>
+          <a:xfrm>
+            <a:off x="694800" y="1670400"/>
+            <a:ext cx="6286622" cy="4399200"/>
+          </a:xfrm>
+          <a:prstGeom prst="rect">
+            <a:avLst/>
+          </a:prstGeom>
+        </p:spPr>
+      </p:pic>
       <p:sp>
         <p:nvSpPr>
           <p:cNvPr id="2" name="标题 1">
@@ -11672,66 +12201,165 @@
           </a:p>
         </p:txBody>
       </p:sp>
-      <p:sp>
-        <p:nvSpPr>
-          <p:cNvPr id="3" name="文本框 2">
-            <a:extLst>
-              <a:ext uri="{FF2B5EF4-FFF2-40B4-BE49-F238E27FC236}">
-                <a16:creationId xmlns:a16="http://schemas.microsoft.com/office/drawing/2014/main" id="{3CFA08A8-4152-2994-A094-8BC35DA7AB84}"/>
-              </a:ext>
-            </a:extLst>
-          </p:cNvPr>
-          <p:cNvSpPr txBox="1"/>
-          <p:nvPr/>
-        </p:nvSpPr>
-        <p:spPr>
-          <a:xfrm>
-            <a:off x="694800" y="1440000"/>
-            <a:ext cx="10800000" cy="461665"/>
-          </a:xfrm>
-          <a:prstGeom prst="rect">
-            <a:avLst/>
-          </a:prstGeom>
-          <a:noFill/>
-        </p:spPr>
-        <p:txBody>
-          <a:bodyPr wrap="square">
-            <a:spAutoFit/>
-          </a:bodyPr>
-          <a:lstStyle/>
-          <a:p>
-            <a:pPr>
-              <a:spcBef>
-                <a:spcPts val="600"/>
-              </a:spcBef>
-              <a:spcAft>
-                <a:spcPts val="600"/>
-              </a:spcAft>
-            </a:pPr>
-            <a:r>
-              <a:rPr lang="en-US" altLang="zh-CN" sz="2400" dirty="0">
-                <a:latin typeface="华文楷体" panose="02010600040101010101" pitchFamily="2" charset="-122"/>
-                <a:ea typeface="华文楷体" panose="02010600040101010101" pitchFamily="2" charset="-122"/>
-                <a:cs typeface="+mj-cs"/>
-              </a:rPr>
-              <a:t>4. </a:t>
-            </a:r>
-            <a:r>
-              <a:rPr lang="zh-CN" altLang="en-US" sz="2400" dirty="0">
-                <a:latin typeface="华文楷体" panose="02010600040101010101" pitchFamily="2" charset="-122"/>
-                <a:ea typeface="华文楷体" panose="02010600040101010101" pitchFamily="2" charset="-122"/>
-                <a:cs typeface="+mj-cs"/>
-              </a:rPr>
-              <a:t>重建后的分布</a:t>
-            </a:r>
-            <a:endParaRPr lang="en-US" altLang="zh-CN" sz="2400" dirty="0">
-              <a:latin typeface="华文楷体" panose="02010600040101010101" pitchFamily="2" charset="-122"/>
-              <a:ea typeface="华文楷体" panose="02010600040101010101" pitchFamily="2" charset="-122"/>
-              <a:cs typeface="+mj-cs"/>
-            </a:endParaRPr>
-          </a:p>
-        </p:txBody>
-      </p:sp>
+      <mc:AlternateContent xmlns:mc="http://schemas.openxmlformats.org/markup-compatibility/2006">
+        <mc:Choice xmlns:a14="http://schemas.microsoft.com/office/drawing/2010/main" Requires="a14">
+          <p:sp>
+            <p:nvSpPr>
+              <p:cNvPr id="3" name="文本框 2">
+                <a:extLst>
+                  <a:ext uri="{FF2B5EF4-FFF2-40B4-BE49-F238E27FC236}">
+                    <a16:creationId xmlns:a16="http://schemas.microsoft.com/office/drawing/2014/main" id="{3CFA08A8-4152-2994-A094-8BC35DA7AB84}"/>
+                  </a:ext>
+                </a:extLst>
+              </p:cNvPr>
+              <p:cNvSpPr txBox="1"/>
+              <p:nvPr/>
+            </p:nvSpPr>
+            <p:spPr>
+              <a:xfrm>
+                <a:off x="694800" y="1440000"/>
+                <a:ext cx="10800000" cy="461665"/>
+              </a:xfrm>
+              <a:prstGeom prst="rect">
+                <a:avLst/>
+              </a:prstGeom>
+              <a:noFill/>
+            </p:spPr>
+            <p:txBody>
+              <a:bodyPr wrap="square">
+                <a:spAutoFit/>
+              </a:bodyPr>
+              <a:lstStyle/>
+              <a:p>
+                <a:pPr>
+                  <a:spcBef>
+                    <a:spcPts val="600"/>
+                  </a:spcBef>
+                  <a:spcAft>
+                    <a:spcPts val="600"/>
+                  </a:spcAft>
+                </a:pPr>
+                <a:r>
+                  <a:rPr lang="en-US" altLang="zh-CN" sz="2400" dirty="0">
+                    <a:latin typeface="华文楷体" panose="02010600040101010101" pitchFamily="2" charset="-122"/>
+                    <a:ea typeface="华文楷体" panose="02010600040101010101" pitchFamily="2" charset="-122"/>
+                    <a:cs typeface="+mj-cs"/>
+                  </a:rPr>
+                  <a:t>4. </a:t>
+                </a:r>
+                <a:r>
+                  <a:rPr lang="zh-CN" altLang="en-US" sz="2400" dirty="0">
+                    <a:latin typeface="华文楷体" panose="02010600040101010101" pitchFamily="2" charset="-122"/>
+                    <a:ea typeface="华文楷体" panose="02010600040101010101" pitchFamily="2" charset="-122"/>
+                    <a:cs typeface="+mj-cs"/>
+                  </a:rPr>
+                  <a:t>重建后的分布（</a:t>
+                </a:r>
+                <a14:m>
+                  <m:oMath xmlns:m="http://schemas.openxmlformats.org/officeDocument/2006/math">
+                    <m:sSub>
+                      <m:sSubPr>
+                        <m:ctrlPr>
+                          <a:rPr lang="en-US" altLang="zh-CN" sz="2400" b="0" i="1" smtClean="0">
+                            <a:latin typeface="Cambria Math" panose="02040503050406030204" pitchFamily="18" charset="0"/>
+                            <a:ea typeface="华文楷体" panose="02010600040101010101" pitchFamily="2" charset="-122"/>
+                            <a:cs typeface="+mj-cs"/>
+                          </a:rPr>
+                        </m:ctrlPr>
+                      </m:sSubPr>
+                      <m:e>
+                        <m:r>
+                          <a:rPr lang="en-US" altLang="zh-CN" sz="2400" b="0" i="1" smtClean="0">
+                            <a:latin typeface="Cambria Math" panose="02040503050406030204" pitchFamily="18" charset="0"/>
+                            <a:ea typeface="华文楷体" panose="02010600040101010101" pitchFamily="2" charset="-122"/>
+                            <a:cs typeface="+mj-cs"/>
+                          </a:rPr>
+                          <m:t>𝛽</m:t>
+                        </m:r>
+                      </m:e>
+                      <m:sub>
+                        <m:r>
+                          <a:rPr lang="en-US" altLang="zh-CN" sz="2400" b="0" i="1" smtClean="0">
+                            <a:latin typeface="Cambria Math" panose="02040503050406030204" pitchFamily="18" charset="0"/>
+                            <a:ea typeface="华文楷体" panose="02010600040101010101" pitchFamily="2" charset="-122"/>
+                            <a:cs typeface="+mj-cs"/>
+                          </a:rPr>
+                          <m:t>𝑟𝑒𝑎𝑙</m:t>
+                        </m:r>
+                      </m:sub>
+                    </m:sSub>
+                    <m:r>
+                      <a:rPr lang="en-US" altLang="zh-CN" sz="2400" b="0" i="1" smtClean="0">
+                        <a:latin typeface="Cambria Math" panose="02040503050406030204" pitchFamily="18" charset="0"/>
+                        <a:ea typeface="华文楷体" panose="02010600040101010101" pitchFamily="2" charset="-122"/>
+                        <a:cs typeface="+mj-cs"/>
+                      </a:rPr>
+                      <m:t>=0.7</m:t>
+                    </m:r>
+                  </m:oMath>
+                </a14:m>
+                <a:r>
+                  <a:rPr lang="zh-CN" altLang="en-US" sz="2400" dirty="0">
+                    <a:latin typeface="华文楷体" panose="02010600040101010101" pitchFamily="2" charset="-122"/>
+                    <a:ea typeface="华文楷体" panose="02010600040101010101" pitchFamily="2" charset="-122"/>
+                    <a:cs typeface="+mj-cs"/>
+                  </a:rPr>
+                  <a:t>）</a:t>
+                </a:r>
+                <a:endParaRPr lang="en-US" altLang="zh-CN" sz="2400" dirty="0">
+                  <a:latin typeface="华文楷体" panose="02010600040101010101" pitchFamily="2" charset="-122"/>
+                  <a:ea typeface="华文楷体" panose="02010600040101010101" pitchFamily="2" charset="-122"/>
+                  <a:cs typeface="+mj-cs"/>
+                </a:endParaRPr>
+              </a:p>
+            </p:txBody>
+          </p:sp>
+        </mc:Choice>
+        <mc:Fallback>
+          <p:sp>
+            <p:nvSpPr>
+              <p:cNvPr id="3" name="文本框 2">
+                <a:extLst>
+                  <a:ext uri="{FF2B5EF4-FFF2-40B4-BE49-F238E27FC236}">
+                    <a16:creationId xmlns:a16="http://schemas.microsoft.com/office/drawing/2014/main" id="{3CFA08A8-4152-2994-A094-8BC35DA7AB84}"/>
+                  </a:ext>
+                </a:extLst>
+              </p:cNvPr>
+              <p:cNvSpPr txBox="1">
+                <a:spLocks noRot="1" noChangeAspect="1" noMove="1" noResize="1" noEditPoints="1" noAdjustHandles="1" noChangeArrowheads="1" noChangeShapeType="1" noTextEdit="1"/>
+              </p:cNvSpPr>
+              <p:nvPr/>
+            </p:nvSpPr>
+            <p:spPr>
+              <a:xfrm>
+                <a:off x="694800" y="1440000"/>
+                <a:ext cx="10800000" cy="461665"/>
+              </a:xfrm>
+              <a:prstGeom prst="rect">
+                <a:avLst/>
+              </a:prstGeom>
+              <a:blipFill>
+                <a:blip r:embed="rId3"/>
+                <a:stretch>
+                  <a:fillRect l="-903" t="-10526" b="-28947"/>
+                </a:stretch>
+              </a:blipFill>
+            </p:spPr>
+            <p:txBody>
+              <a:bodyPr/>
+              <a:lstStyle/>
+              <a:p>
+                <a:r>
+                  <a:rPr lang="zh-CN" altLang="en-US">
+                    <a:noFill/>
+                  </a:rPr>
+                  <a:t> </a:t>
+                </a:r>
+              </a:p>
+            </p:txBody>
+          </p:sp>
+        </mc:Fallback>
+      </mc:AlternateContent>
       <p:sp>
         <p:nvSpPr>
           <p:cNvPr id="7" name="灯片编号占位符 3">
@@ -11903,7 +12531,7 @@
                 <a:avLst/>
               </a:prstGeom>
               <a:blipFill>
-                <a:blip r:embed="rId2"/>
+                <a:blip r:embed="rId4"/>
                 <a:stretch>
                   <a:fillRect b="-6452"/>
                 </a:stretch>
@@ -11940,8 +12568,8 @@
             </p:nvSpPr>
             <p:spPr>
               <a:xfrm>
-                <a:off x="6668048" y="2969969"/>
-                <a:ext cx="4826752" cy="1200329"/>
+                <a:off x="6668048" y="2785304"/>
+                <a:ext cx="4826752" cy="1569660"/>
               </a:xfrm>
               <a:prstGeom prst="rect">
                 <a:avLst/>
@@ -12156,8 +12784,64 @@
                     <a:ea typeface="华文楷体" panose="02010600040101010101" pitchFamily="2" charset="-122"/>
                     <a:cs typeface="+mj-cs"/>
                   </a:rPr>
-                  <a:t>）差值的分布</a:t>
+                  <a:t>）差值的分布，中央黑色竖线为</a:t>
                 </a:r>
+                <a:r>
+                  <a:rPr lang="en-US" altLang="zh-CN" sz="2400" dirty="0">
+                    <a:latin typeface="华文楷体" panose="02010600040101010101" pitchFamily="2" charset="-122"/>
+                    <a:ea typeface="华文楷体" panose="02010600040101010101" pitchFamily="2" charset="-122"/>
+                    <a:cs typeface="+mj-cs"/>
+                  </a:rPr>
+                  <a:t>0</a:t>
+                </a:r>
+                <a:r>
+                  <a:rPr lang="zh-CN" altLang="en-US" sz="2400" dirty="0">
+                    <a:latin typeface="华文楷体" panose="02010600040101010101" pitchFamily="2" charset="-122"/>
+                    <a:ea typeface="华文楷体" panose="02010600040101010101" pitchFamily="2" charset="-122"/>
+                    <a:cs typeface="+mj-cs"/>
+                  </a:rPr>
+                  <a:t>时间分辨率时的</a:t>
+                </a:r>
+                <a14:m>
+                  <m:oMath xmlns:m="http://schemas.openxmlformats.org/officeDocument/2006/math">
+                    <m:r>
+                      <m:rPr>
+                        <m:sty m:val="p"/>
+                      </m:rPr>
+                      <a:rPr lang="en-US" altLang="zh-CN" sz="2400" b="0" i="0" smtClean="0">
+                        <a:latin typeface="Cambria Math" panose="02040503050406030204" pitchFamily="18" charset="0"/>
+                        <a:ea typeface="华文楷体" panose="02010600040101010101" pitchFamily="2" charset="-122"/>
+                      </a:rPr>
+                      <m:t>Δ</m:t>
+                    </m:r>
+                    <m:d>
+                      <m:dPr>
+                        <m:ctrlPr>
+                          <a:rPr lang="en-US" altLang="zh-CN" sz="2400" b="0" i="0" smtClean="0">
+                            <a:latin typeface="Cambria Math" panose="02040503050406030204" pitchFamily="18" charset="0"/>
+                            <a:ea typeface="华文楷体" panose="02010600040101010101" pitchFamily="2" charset="-122"/>
+                          </a:rPr>
+                        </m:ctrlPr>
+                      </m:dPr>
+                      <m:e>
+                        <m:r>
+                          <a:rPr lang="en-US" altLang="zh-CN" sz="2400" i="1">
+                            <a:latin typeface="Cambria Math" panose="02040503050406030204" pitchFamily="18" charset="0"/>
+                            <a:ea typeface="华文楷体" panose="02010600040101010101" pitchFamily="2" charset="-122"/>
+                          </a:rPr>
+                          <m:t>1/</m:t>
+                        </m:r>
+                        <m:r>
+                          <a:rPr lang="en-US" altLang="zh-CN" sz="2400" i="1">
+                            <a:latin typeface="Cambria Math" panose="02040503050406030204" pitchFamily="18" charset="0"/>
+                            <a:ea typeface="华文楷体" panose="02010600040101010101" pitchFamily="2" charset="-122"/>
+                          </a:rPr>
+                          <m:t>𝛽</m:t>
+                        </m:r>
+                      </m:e>
+                    </m:d>
+                  </m:oMath>
+                </a14:m>
                 <a:endParaRPr lang="en-US" altLang="zh-CN" sz="2400" dirty="0">
                   <a:latin typeface="华文楷体" panose="02010600040101010101" pitchFamily="2" charset="-122"/>
                   <a:ea typeface="华文楷体" panose="02010600040101010101" pitchFamily="2" charset="-122"/>
@@ -12184,16 +12868,16 @@
             </p:nvSpPr>
             <p:spPr>
               <a:xfrm>
-                <a:off x="6668048" y="2969969"/>
-                <a:ext cx="4826752" cy="1200329"/>
+                <a:off x="6668048" y="2785304"/>
+                <a:ext cx="4826752" cy="1569660"/>
               </a:xfrm>
               <a:prstGeom prst="rect">
                 <a:avLst/>
               </a:prstGeom>
               <a:blipFill>
-                <a:blip r:embed="rId3"/>
+                <a:blip r:embed="rId5"/>
                 <a:stretch>
-                  <a:fillRect l="-2020" t="-4061" b="-10660"/>
+                  <a:fillRect l="-2020" t="-3113" b="-8171"/>
                 </a:stretch>
               </a:blipFill>
             </p:spPr>
@@ -12212,52 +12896,6 @@
           </p:sp>
         </mc:Fallback>
       </mc:AlternateContent>
-      <p:pic>
-        <p:nvPicPr>
-          <p:cNvPr id="5" name="图片 4" descr="图表, 折线图&#10;&#10;描述已自动生成">
-            <a:extLst>
-              <a:ext uri="{FF2B5EF4-FFF2-40B4-BE49-F238E27FC236}">
-                <a16:creationId xmlns:a16="http://schemas.microsoft.com/office/drawing/2014/main" id="{0CFC11EB-C95D-7ECA-7EEF-89A35A5A8FED}"/>
-              </a:ext>
-            </a:extLst>
-          </p:cNvPr>
-          <p:cNvPicPr>
-            <a:picLocks noChangeAspect="1"/>
-          </p:cNvPicPr>
-          <p:nvPr/>
-        </p:nvPicPr>
-        <p:blipFill>
-          <a:blip r:embed="rId4">
-            <a:clrChange>
-              <a:clrFrom>
-                <a:srgbClr val="FFFFFF"/>
-              </a:clrFrom>
-              <a:clrTo>
-                <a:srgbClr val="FFFFFF">
-                  <a:alpha val="0"/>
-                </a:srgbClr>
-              </a:clrTo>
-            </a:clrChange>
-            <a:extLst>
-              <a:ext uri="{28A0092B-C50C-407E-A947-70E740481C1C}">
-                <a14:useLocalDpi xmlns:a14="http://schemas.microsoft.com/office/drawing/2010/main" val="0"/>
-              </a:ext>
-            </a:extLst>
-          </a:blip>
-          <a:stretch>
-            <a:fillRect/>
-          </a:stretch>
-        </p:blipFill>
-        <p:spPr>
-          <a:xfrm>
-            <a:off x="694800" y="1670400"/>
-            <a:ext cx="6286622" cy="4399200"/>
-          </a:xfrm>
-          <a:prstGeom prst="rect">
-            <a:avLst/>
-          </a:prstGeom>
-        </p:spPr>
-      </p:pic>
       <p:sp>
         <p:nvSpPr>
           <p:cNvPr id="4" name="文本框 3">
@@ -12272,7 +12910,7 @@
         </p:nvSpPr>
         <p:spPr>
           <a:xfrm>
-            <a:off x="6668048" y="4170298"/>
+            <a:off x="6668048" y="4354964"/>
             <a:ext cx="4826752" cy="830997"/>
           </a:xfrm>
           <a:prstGeom prst="rect">
@@ -12300,22 +12938,6 @@
                 <a:ea typeface="华文楷体" panose="02010600040101010101" pitchFamily="2" charset="-122"/>
                 <a:cs typeface="+mj-cs"/>
               </a:rPr>
-              <a:t>图</a:t>
-            </a:r>
-            <a:r>
-              <a:rPr lang="en-US" altLang="zh-CN" sz="2400" dirty="0">
-                <a:latin typeface="华文楷体" panose="02010600040101010101" pitchFamily="2" charset="-122"/>
-                <a:ea typeface="华文楷体" panose="02010600040101010101" pitchFamily="2" charset="-122"/>
-                <a:cs typeface="+mj-cs"/>
-              </a:rPr>
-              <a:t>6</a:t>
-            </a:r>
-            <a:r>
-              <a:rPr lang="zh-CN" altLang="en-US" sz="2400" dirty="0">
-                <a:latin typeface="华文楷体" panose="02010600040101010101" pitchFamily="2" charset="-122"/>
-                <a:ea typeface="华文楷体" panose="02010600040101010101" pitchFamily="2" charset="-122"/>
-                <a:cs typeface="+mj-cs"/>
-              </a:rPr>
               <a:t>可见均值并不在</a:t>
             </a:r>
             <a:r>
@@ -12332,7 +12954,7 @@
                 <a:ea typeface="华文楷体" panose="02010600040101010101" pitchFamily="2" charset="-122"/>
                 <a:cs typeface="+mj-cs"/>
               </a:rPr>
-              <a:t>处，猜想为线性重建方法的弊端</a:t>
+              <a:t>处，猜想为由重建方法（线性重建）造成</a:t>
             </a:r>
             <a:endParaRPr lang="en-US" altLang="zh-CN" sz="2400" dirty="0">
               <a:latin typeface="华文楷体" panose="02010600040101010101" pitchFamily="2" charset="-122"/>
@@ -12390,6 +13012,42 @@
           <a:chExt cx="0" cy="0"/>
         </a:xfrm>
       </p:grpSpPr>
+      <p:pic>
+        <p:nvPicPr>
+          <p:cNvPr id="5" name="图片 4" descr="图表, 折线图&#10;&#10;描述已自动生成">
+            <a:extLst>
+              <a:ext uri="{FF2B5EF4-FFF2-40B4-BE49-F238E27FC236}">
+                <a16:creationId xmlns:a16="http://schemas.microsoft.com/office/drawing/2014/main" id="{95225374-D0A4-FCE8-5AC2-EBB2428B111B}"/>
+              </a:ext>
+            </a:extLst>
+          </p:cNvPr>
+          <p:cNvPicPr>
+            <a:picLocks noChangeAspect="1"/>
+          </p:cNvPicPr>
+          <p:nvPr/>
+        </p:nvPicPr>
+        <p:blipFill>
+          <a:blip r:embed="rId2">
+            <a:extLst>
+              <a:ext uri="{28A0092B-C50C-407E-A947-70E740481C1C}">
+                <a14:useLocalDpi xmlns:a14="http://schemas.microsoft.com/office/drawing/2010/main" val="0"/>
+              </a:ext>
+            </a:extLst>
+          </a:blip>
+          <a:stretch>
+            <a:fillRect/>
+          </a:stretch>
+        </p:blipFill>
+        <p:spPr>
+          <a:xfrm>
+            <a:off x="694800" y="1670400"/>
+            <a:ext cx="6286622" cy="4399200"/>
+          </a:xfrm>
+          <a:prstGeom prst="rect">
+            <a:avLst/>
+          </a:prstGeom>
+        </p:spPr>
+      </p:pic>
       <p:sp>
         <p:nvSpPr>
           <p:cNvPr id="2" name="标题 1">
@@ -12435,8 +13093,8 @@
           </a:p>
         </p:txBody>
       </p:sp>
-      <mc:AlternateContent xmlns:mc="http://schemas.openxmlformats.org/markup-compatibility/2006" xmlns:a14="http://schemas.microsoft.com/office/drawing/2010/main">
-        <mc:Choice Requires="a14">
+      <mc:AlternateContent xmlns:mc="http://schemas.openxmlformats.org/markup-compatibility/2006">
+        <mc:Choice xmlns:a14="http://schemas.microsoft.com/office/drawing/2010/main" Requires="a14">
           <p:sp>
             <p:nvSpPr>
               <p:cNvPr id="3" name="文本框 2">
@@ -12500,6 +13158,22 @@
                     <a:cs typeface="+mj-cs"/>
                   </a:rPr>
                   <a:t>分别为</a:t>
+                </a:r>
+                <a:r>
+                  <a:rPr lang="en-US" altLang="zh-CN" sz="2400" dirty="0">
+                    <a:latin typeface="华文楷体" panose="02010600040101010101" pitchFamily="2" charset="-122"/>
+                    <a:ea typeface="华文楷体" panose="02010600040101010101" pitchFamily="2" charset="-122"/>
+                    <a:cs typeface="+mj-cs"/>
+                  </a:rPr>
+                  <a:t>0.4</a:t>
+                </a:r>
+                <a:r>
+                  <a:rPr lang="zh-CN" altLang="en-US" sz="2400" dirty="0">
+                    <a:latin typeface="华文楷体" panose="02010600040101010101" pitchFamily="2" charset="-122"/>
+                    <a:ea typeface="华文楷体" panose="02010600040101010101" pitchFamily="2" charset="-122"/>
+                    <a:cs typeface="+mj-cs"/>
+                  </a:rPr>
+                  <a:t>、</a:t>
                 </a:r>
                 <a:r>
                   <a:rPr lang="en-US" altLang="zh-CN" sz="2400" dirty="0">
@@ -12630,7 +13304,7 @@
             </p:txBody>
           </p:sp>
         </mc:Choice>
-        <mc:Fallback xmlns="">
+        <mc:Fallback>
           <p:sp>
             <p:nvSpPr>
               <p:cNvPr id="3" name="文本框 2">
@@ -12654,7 +13328,7 @@
                 <a:avLst/>
               </a:prstGeom>
               <a:blipFill>
-                <a:blip r:embed="rId2"/>
+                <a:blip r:embed="rId3"/>
                 <a:stretch>
                   <a:fillRect l="-903" t="-10526" b="-28947"/>
                 </a:stretch>
@@ -12866,7 +13540,7 @@
                 <a:avLst/>
               </a:prstGeom>
               <a:blipFill>
-                <a:blip r:embed="rId3"/>
+                <a:blip r:embed="rId4"/>
                 <a:stretch>
                   <a:fillRect b="-6452"/>
                 </a:stretch>
@@ -13010,7 +13684,7 @@
                 <a:avLst/>
               </a:prstGeom>
               <a:blipFill>
-                <a:blip r:embed="rId4"/>
+                <a:blip r:embed="rId5"/>
                 <a:stretch>
                   <a:fillRect l="-2020" t="-4061" r="-758" b="-10660"/>
                 </a:stretch>
@@ -13031,54 +13705,8 @@
           </p:sp>
         </mc:Fallback>
       </mc:AlternateContent>
-      <p:pic>
-        <p:nvPicPr>
-          <p:cNvPr id="6" name="图片 5" descr="图表, 折线图&#10;&#10;描述已自动生成">
-            <a:extLst>
-              <a:ext uri="{FF2B5EF4-FFF2-40B4-BE49-F238E27FC236}">
-                <a16:creationId xmlns:a16="http://schemas.microsoft.com/office/drawing/2014/main" id="{39348A67-ACCE-D9A8-DFDC-C4E907964954}"/>
-              </a:ext>
-            </a:extLst>
-          </p:cNvPr>
-          <p:cNvPicPr>
-            <a:picLocks noChangeAspect="1"/>
-          </p:cNvPicPr>
-          <p:nvPr/>
-        </p:nvPicPr>
-        <p:blipFill>
-          <a:blip r:embed="rId5">
-            <a:clrChange>
-              <a:clrFrom>
-                <a:srgbClr val="FFFFFF"/>
-              </a:clrFrom>
-              <a:clrTo>
-                <a:srgbClr val="FFFFFF">
-                  <a:alpha val="0"/>
-                </a:srgbClr>
-              </a:clrTo>
-            </a:clrChange>
-            <a:extLst>
-              <a:ext uri="{28A0092B-C50C-407E-A947-70E740481C1C}">
-                <a14:useLocalDpi xmlns:a14="http://schemas.microsoft.com/office/drawing/2010/main" val="0"/>
-              </a:ext>
-            </a:extLst>
-          </a:blip>
-          <a:stretch>
-            <a:fillRect/>
-          </a:stretch>
-        </p:blipFill>
-        <p:spPr>
-          <a:xfrm>
-            <a:off x="694800" y="1670400"/>
-            <a:ext cx="6286622" cy="4399200"/>
-          </a:xfrm>
-          <a:prstGeom prst="rect">
-            <a:avLst/>
-          </a:prstGeom>
-        </p:spPr>
-      </p:pic>
-      <mc:AlternateContent xmlns:mc="http://schemas.openxmlformats.org/markup-compatibility/2006" xmlns:a14="http://schemas.microsoft.com/office/drawing/2010/main">
-        <mc:Choice Requires="a14">
+      <mc:AlternateContent xmlns:mc="http://schemas.openxmlformats.org/markup-compatibility/2006">
+        <mc:Choice xmlns:a14="http://schemas.microsoft.com/office/drawing/2010/main" Requires="a14">
           <p:sp>
             <p:nvSpPr>
               <p:cNvPr id="9" name="文本框 8">
@@ -13133,7 +13761,7 @@
                     <a:ea typeface="华文楷体" panose="02010600040101010101" pitchFamily="2" charset="-122"/>
                     <a:cs typeface="+mj-cs"/>
                   </a:rPr>
-                  <a:t>较小时的能量损失很大，导致重建的速度与真实速度的差异较大。</a:t>
+                  <a:t>较小时的能量损失很大，导致重建的速度与真实速度的差异较大</a:t>
                 </a:r>
                 <a:endParaRPr lang="en-US" altLang="zh-CN" sz="2400" dirty="0">
                   <a:latin typeface="华文楷体" panose="02010600040101010101" pitchFamily="2" charset="-122"/>
@@ -13144,7 +13772,7 @@
             </p:txBody>
           </p:sp>
         </mc:Choice>
-        <mc:Fallback xmlns="">
+        <mc:Fallback>
           <p:sp>
             <p:nvSpPr>
               <p:cNvPr id="9" name="文本框 8">
@@ -13170,7 +13798,7 @@
               <a:blipFill>
                 <a:blip r:embed="rId6"/>
                 <a:stretch>
-                  <a:fillRect l="-2020" t="-5839" r="-379" b="-15328"/>
+                  <a:fillRect l="-2020" t="-5839" b="-15328"/>
                 </a:stretch>
               </a:blipFill>
             </p:spPr>
@@ -16331,7 +16959,7 @@
                 <a:ea typeface="华文楷体" panose="02010600040101010101" pitchFamily="2" charset="-122"/>
                 <a:cs typeface="+mj-cs"/>
               </a:rPr>
-              <a:t>1cm</a:t>
+              <a:t>0.1ns</a:t>
             </a:r>
           </a:p>
           <a:p>

</xml_diff>

<commit_message>
Added usage instructions and modified image styles.
</commit_message>
<xml_diff>
--- a/presentation/Stage：零磁场垂直入射线性重建.pptx
+++ b/presentation/Stage：零磁场垂直入射线性重建.pptx
@@ -5,7 +5,7 @@
     <p:sldMasterId id="2147483648" r:id="rId1"/>
   </p:sldMasterIdLst>
   <p:notesMasterIdLst>
-    <p:notesMasterId r:id="rId22"/>
+    <p:notesMasterId r:id="rId24"/>
   </p:notesMasterIdLst>
   <p:sldIdLst>
     <p:sldId id="256" r:id="rId2"/>
@@ -23,11 +23,13 @@
     <p:sldId id="303" r:id="rId14"/>
     <p:sldId id="302" r:id="rId15"/>
     <p:sldId id="304" r:id="rId16"/>
-    <p:sldId id="305" r:id="rId17"/>
-    <p:sldId id="306" r:id="rId18"/>
-    <p:sldId id="307" r:id="rId19"/>
-    <p:sldId id="316" r:id="rId20"/>
-    <p:sldId id="295" r:id="rId21"/>
+    <p:sldId id="317" r:id="rId17"/>
+    <p:sldId id="318" r:id="rId18"/>
+    <p:sldId id="305" r:id="rId19"/>
+    <p:sldId id="306" r:id="rId20"/>
+    <p:sldId id="307" r:id="rId21"/>
+    <p:sldId id="316" r:id="rId22"/>
+    <p:sldId id="295" r:id="rId23"/>
   </p:sldIdLst>
   <p:sldSz cx="12192000" cy="6858000"/>
   <p:notesSz cx="6858000" cy="9144000"/>
@@ -216,7 +218,7 @@
           <a:p>
             <a:fld id="{4CACAE93-D93B-445C-BE5F-F723567AF5E7}" type="datetimeFigureOut">
               <a:rPr lang="zh-CN" altLang="en-US" smtClean="0"/>
-              <a:t>2025/1/16</a:t>
+              <a:t>2025/1/18</a:t>
             </a:fld>
             <a:endParaRPr lang="zh-CN" altLang="en-US"/>
           </a:p>
@@ -548,7 +550,7 @@
           <a:p>
             <a:fld id="{9889719D-D6F5-4305-94B0-35BE6525DD04}" type="slidenum">
               <a:rPr lang="zh-CN" altLang="en-US" smtClean="0"/>
-              <a:t>20</a:t>
+              <a:t>22</a:t>
             </a:fld>
             <a:endParaRPr lang="zh-CN" altLang="en-US"/>
           </a:p>
@@ -714,7 +716,7 @@
           <a:p>
             <a:fld id="{16B320BF-51D5-40BE-949E-DCB07961F781}" type="datetime1">
               <a:rPr lang="zh-CN" altLang="en-US" smtClean="0"/>
-              <a:t>2025/1/16</a:t>
+              <a:t>2025/1/18</a:t>
             </a:fld>
             <a:endParaRPr lang="zh-CN" altLang="en-US"/>
           </a:p>
@@ -912,7 +914,7 @@
           <a:p>
             <a:fld id="{1C273C5E-2503-4DDD-A543-A887334DA35F}" type="datetime1">
               <a:rPr lang="zh-CN" altLang="en-US" smtClean="0"/>
-              <a:t>2025/1/16</a:t>
+              <a:t>2025/1/18</a:t>
             </a:fld>
             <a:endParaRPr lang="zh-CN" altLang="en-US"/>
           </a:p>
@@ -1120,7 +1122,7 @@
           <a:p>
             <a:fld id="{05867EEF-1968-47A8-9EAA-01012566A685}" type="datetime1">
               <a:rPr lang="zh-CN" altLang="en-US" smtClean="0"/>
-              <a:t>2025/1/16</a:t>
+              <a:t>2025/1/18</a:t>
             </a:fld>
             <a:endParaRPr lang="zh-CN" altLang="en-US"/>
           </a:p>
@@ -1318,7 +1320,7 @@
           <a:p>
             <a:fld id="{38AEC280-2277-468A-889D-4D49D53BF1D9}" type="datetime1">
               <a:rPr lang="zh-CN" altLang="en-US" smtClean="0"/>
-              <a:t>2025/1/16</a:t>
+              <a:t>2025/1/18</a:t>
             </a:fld>
             <a:endParaRPr lang="zh-CN" altLang="en-US"/>
           </a:p>
@@ -1593,7 +1595,7 @@
           <a:p>
             <a:fld id="{6828DDCF-82ED-4608-853E-AC723BA86E47}" type="datetime1">
               <a:rPr lang="zh-CN" altLang="en-US" smtClean="0"/>
-              <a:t>2025/1/16</a:t>
+              <a:t>2025/1/18</a:t>
             </a:fld>
             <a:endParaRPr lang="zh-CN" altLang="en-US"/>
           </a:p>
@@ -1858,7 +1860,7 @@
           <a:p>
             <a:fld id="{97077794-3FE7-420F-88F7-1D7B4895C899}" type="datetime1">
               <a:rPr lang="zh-CN" altLang="en-US" smtClean="0"/>
-              <a:t>2025/1/16</a:t>
+              <a:t>2025/1/18</a:t>
             </a:fld>
             <a:endParaRPr lang="zh-CN" altLang="en-US"/>
           </a:p>
@@ -2270,7 +2272,7 @@
           <a:p>
             <a:fld id="{D59C3C3C-6E49-45F5-A91C-E6F38BA8DB42}" type="datetime1">
               <a:rPr lang="zh-CN" altLang="en-US" smtClean="0"/>
-              <a:t>2025/1/16</a:t>
+              <a:t>2025/1/18</a:t>
             </a:fld>
             <a:endParaRPr lang="zh-CN" altLang="en-US"/>
           </a:p>
@@ -2411,7 +2413,7 @@
           <a:p>
             <a:fld id="{AAE0815A-62CF-4DCB-BD3F-B6FB0564C615}" type="datetime1">
               <a:rPr lang="zh-CN" altLang="en-US" smtClean="0"/>
-              <a:t>2025/1/16</a:t>
+              <a:t>2025/1/18</a:t>
             </a:fld>
             <a:endParaRPr lang="zh-CN" altLang="en-US"/>
           </a:p>
@@ -2524,7 +2526,7 @@
           <a:p>
             <a:fld id="{6AAD7FEA-BEDC-43F5-A950-232128F45C0E}" type="datetime1">
               <a:rPr lang="zh-CN" altLang="en-US" smtClean="0"/>
-              <a:t>2025/1/16</a:t>
+              <a:t>2025/1/18</a:t>
             </a:fld>
             <a:endParaRPr lang="zh-CN" altLang="en-US"/>
           </a:p>
@@ -2835,7 +2837,7 @@
           <a:p>
             <a:fld id="{21CD2C9D-F443-44DD-858A-37DB01C48713}" type="datetime1">
               <a:rPr lang="zh-CN" altLang="en-US" smtClean="0"/>
-              <a:t>2025/1/16</a:t>
+              <a:t>2025/1/18</a:t>
             </a:fld>
             <a:endParaRPr lang="zh-CN" altLang="en-US"/>
           </a:p>
@@ -3123,7 +3125,7 @@
           <a:p>
             <a:fld id="{43C8F874-9162-4361-A9EA-65552F480750}" type="datetime1">
               <a:rPr lang="zh-CN" altLang="en-US" smtClean="0"/>
-              <a:t>2025/1/16</a:t>
+              <a:t>2025/1/18</a:t>
             </a:fld>
             <a:endParaRPr lang="zh-CN" altLang="en-US"/>
           </a:p>
@@ -3364,7 +3366,7 @@
           <a:p>
             <a:fld id="{9EF903D2-EC70-4977-99B9-B0722DA5DCAA}" type="datetime1">
               <a:rPr lang="zh-CN" altLang="en-US" smtClean="0"/>
-              <a:t>2025/1/16</a:t>
+              <a:t>2025/1/18</a:t>
             </a:fld>
             <a:endParaRPr lang="zh-CN" altLang="en-US"/>
           </a:p>
@@ -10024,10 +10026,10 @@
       </p:grpSpPr>
       <p:pic>
         <p:nvPicPr>
-          <p:cNvPr id="5" name="图片 4" descr="图表&#10;&#10;中度可信度描述已自动生成">
+          <p:cNvPr id="9" name="图片 8" descr="图示&#10;&#10;中度可信度描述已自动生成">
             <a:extLst>
               <a:ext uri="{FF2B5EF4-FFF2-40B4-BE49-F238E27FC236}">
-                <a16:creationId xmlns:a16="http://schemas.microsoft.com/office/drawing/2014/main" id="{EA2A1A8E-68C2-EADE-56D9-11F42AAF4384}"/>
+                <a16:creationId xmlns:a16="http://schemas.microsoft.com/office/drawing/2014/main" id="{0127B59D-8008-7D60-2F3C-EE9BDFB3DF7A}"/>
               </a:ext>
             </a:extLst>
           </p:cNvPr>
@@ -10038,16 +10040,6 @@
         </p:nvPicPr>
         <p:blipFill>
           <a:blip r:embed="rId2">
-            <a:clrChange>
-              <a:clrFrom>
-                <a:srgbClr val="FFFFFF"/>
-              </a:clrFrom>
-              <a:clrTo>
-                <a:srgbClr val="FFFFFF">
-                  <a:alpha val="0"/>
-                </a:srgbClr>
-              </a:clrTo>
-            </a:clrChange>
             <a:extLst>
               <a:ext uri="{28A0092B-C50C-407E-A947-70E740481C1C}">
                 <a14:useLocalDpi xmlns:a14="http://schemas.microsoft.com/office/drawing/2010/main" val="0"/>
@@ -10113,8 +10105,8 @@
           </a:p>
         </p:txBody>
       </p:sp>
-      <mc:AlternateContent xmlns:mc="http://schemas.openxmlformats.org/markup-compatibility/2006">
-        <mc:Choice xmlns:a14="http://schemas.microsoft.com/office/drawing/2010/main" Requires="a14">
+      <mc:AlternateContent xmlns:mc="http://schemas.openxmlformats.org/markup-compatibility/2006" xmlns:a14="http://schemas.microsoft.com/office/drawing/2010/main">
+        <mc:Choice Requires="a14">
           <p:sp>
             <p:nvSpPr>
               <p:cNvPr id="3" name="文本框 2">
@@ -10239,7 +10231,7 @@
             </p:txBody>
           </p:sp>
         </mc:Choice>
-        <mc:Fallback>
+        <mc:Fallback xmlns="">
           <p:sp>
             <p:nvSpPr>
               <p:cNvPr id="3" name="文本框 2">
@@ -10318,8 +10310,8 @@
           </a:p>
         </p:txBody>
       </p:sp>
-      <mc:AlternateContent xmlns:mc="http://schemas.openxmlformats.org/markup-compatibility/2006">
-        <mc:Choice xmlns:a14="http://schemas.microsoft.com/office/drawing/2010/main" Requires="a14">
+      <mc:AlternateContent xmlns:mc="http://schemas.openxmlformats.org/markup-compatibility/2006" xmlns:a14="http://schemas.microsoft.com/office/drawing/2010/main">
+        <mc:Choice Requires="a14">
           <p:sp>
             <p:nvSpPr>
               <p:cNvPr id="12" name="文本框 11">
@@ -10413,7 +10405,7 @@
             </p:txBody>
           </p:sp>
         </mc:Choice>
-        <mc:Fallback>
+        <mc:Fallback xmlns="">
           <p:sp>
             <p:nvSpPr>
               <p:cNvPr id="12" name="文本框 11">
@@ -10472,8 +10464,8 @@
         </p:nvSpPr>
         <p:spPr>
           <a:xfrm>
-            <a:off x="6668048" y="2369805"/>
-            <a:ext cx="4826752" cy="461665"/>
+            <a:off x="6527048" y="2328514"/>
+            <a:ext cx="4826752" cy="830997"/>
           </a:xfrm>
           <a:prstGeom prst="rect">
             <a:avLst/>
@@ -10516,7 +10508,23 @@
                 <a:ea typeface="华文楷体" panose="02010600040101010101" pitchFamily="2" charset="-122"/>
                 <a:cs typeface="+mj-cs"/>
               </a:rPr>
-              <a:t>计算中使用的材料为聚苯乙烯</a:t>
+              <a:t>使用</a:t>
+            </a:r>
+            <a:r>
+              <a:rPr lang="en-US" altLang="zh-CN" sz="2400" dirty="0">
+                <a:latin typeface="华文楷体" panose="02010600040101010101" pitchFamily="2" charset="-122"/>
+                <a:ea typeface="华文楷体" panose="02010600040101010101" pitchFamily="2" charset="-122"/>
+                <a:cs typeface="+mj-cs"/>
+              </a:rPr>
+              <a:t>EJ-200</a:t>
+            </a:r>
+            <a:r>
+              <a:rPr lang="zh-CN" altLang="en-US" sz="2400" dirty="0">
+                <a:latin typeface="华文楷体" panose="02010600040101010101" pitchFamily="2" charset="-122"/>
+                <a:ea typeface="华文楷体" panose="02010600040101010101" pitchFamily="2" charset="-122"/>
+                <a:cs typeface="+mj-cs"/>
+              </a:rPr>
+              <a:t>数据进行模拟（但材料使用的是聚苯乙烯）</a:t>
             </a:r>
             <a:endParaRPr lang="en-US" altLang="zh-CN" sz="2400" dirty="0">
               <a:latin typeface="华文楷体" panose="02010600040101010101" pitchFamily="2" charset="-122"/>
@@ -10542,7 +10550,7 @@
             </p:nvSpPr>
             <p:spPr>
               <a:xfrm>
-                <a:off x="6668048" y="4401130"/>
+                <a:off x="6527048" y="4729171"/>
                 <a:ext cx="4826752" cy="1200329"/>
               </a:xfrm>
               <a:prstGeom prst="rect">
@@ -10656,7 +10664,7 @@
             </p:nvSpPr>
             <p:spPr>
               <a:xfrm>
-                <a:off x="6668048" y="4401130"/>
+                <a:off x="6527048" y="4729171"/>
                 <a:ext cx="4826752" cy="1200329"/>
               </a:xfrm>
               <a:prstGeom prst="rect">
@@ -10700,7 +10708,7 @@
             </p:nvSpPr>
             <p:spPr>
               <a:xfrm>
-                <a:off x="6668048" y="2831470"/>
+                <a:off x="6527048" y="3159511"/>
                 <a:ext cx="4826752" cy="1569660"/>
               </a:xfrm>
               <a:prstGeom prst="rect">
@@ -10907,7 +10915,7 @@
             </p:nvSpPr>
             <p:spPr>
               <a:xfrm>
-                <a:off x="6668048" y="2831470"/>
+                <a:off x="6527048" y="3159511"/>
                 <a:ext cx="4826752" cy="1569660"/>
               </a:xfrm>
               <a:prstGeom prst="rect">
@@ -11027,6 +11035,42 @@
           <a:chExt cx="0" cy="0"/>
         </a:xfrm>
       </p:grpSpPr>
+      <p:pic>
+        <p:nvPicPr>
+          <p:cNvPr id="6" name="图片 5" descr="图表, 折线图&#10;&#10;描述已自动生成">
+            <a:extLst>
+              <a:ext uri="{FF2B5EF4-FFF2-40B4-BE49-F238E27FC236}">
+                <a16:creationId xmlns:a16="http://schemas.microsoft.com/office/drawing/2014/main" id="{5CE93620-DA53-1573-1D8B-A3A1FCE6B480}"/>
+              </a:ext>
+            </a:extLst>
+          </p:cNvPr>
+          <p:cNvPicPr>
+            <a:picLocks noChangeAspect="1"/>
+          </p:cNvPicPr>
+          <p:nvPr/>
+        </p:nvPicPr>
+        <p:blipFill>
+          <a:blip r:embed="rId2">
+            <a:extLst>
+              <a:ext uri="{28A0092B-C50C-407E-A947-70E740481C1C}">
+                <a14:useLocalDpi xmlns:a14="http://schemas.microsoft.com/office/drawing/2010/main" val="0"/>
+              </a:ext>
+            </a:extLst>
+          </a:blip>
+          <a:stretch>
+            <a:fillRect/>
+          </a:stretch>
+        </p:blipFill>
+        <p:spPr>
+          <a:xfrm>
+            <a:off x="694800" y="1670400"/>
+            <a:ext cx="6286622" cy="4399200"/>
+          </a:xfrm>
+          <a:prstGeom prst="rect">
+            <a:avLst/>
+          </a:prstGeom>
+        </p:spPr>
+      </p:pic>
       <p:sp>
         <p:nvSpPr>
           <p:cNvPr id="2" name="标题 1">
@@ -11072,8 +11116,8 @@
           </a:p>
         </p:txBody>
       </p:sp>
-      <mc:AlternateContent xmlns:mc="http://schemas.openxmlformats.org/markup-compatibility/2006">
-        <mc:Choice xmlns:a14="http://schemas.microsoft.com/office/drawing/2010/main" Requires="a14">
+      <mc:AlternateContent xmlns:mc="http://schemas.openxmlformats.org/markup-compatibility/2006" xmlns:a14="http://schemas.microsoft.com/office/drawing/2010/main">
+        <mc:Choice Requires="a14">
           <p:sp>
             <p:nvSpPr>
               <p:cNvPr id="3" name="文本框 2">
@@ -11186,7 +11230,7 @@
             </p:txBody>
           </p:sp>
         </mc:Choice>
-        <mc:Fallback>
+        <mc:Fallback xmlns="">
           <p:sp>
             <p:nvSpPr>
               <p:cNvPr id="3" name="文本框 2">
@@ -11210,7 +11254,7 @@
                 <a:avLst/>
               </a:prstGeom>
               <a:blipFill>
-                <a:blip r:embed="rId2"/>
+                <a:blip r:embed="rId3"/>
                 <a:stretch>
                   <a:fillRect l="-903" t="-10526" b="-28947"/>
                 </a:stretch>
@@ -11321,8 +11365,8 @@
           </a:p>
         </p:txBody>
       </p:sp>
-      <mc:AlternateContent xmlns:mc="http://schemas.openxmlformats.org/markup-compatibility/2006" xmlns:a14="http://schemas.microsoft.com/office/drawing/2010/main">
-        <mc:Choice Requires="a14">
+      <mc:AlternateContent xmlns:mc="http://schemas.openxmlformats.org/markup-compatibility/2006">
+        <mc:Choice xmlns:a14="http://schemas.microsoft.com/office/drawing/2010/main" Requires="a14">
           <p:sp>
             <p:nvSpPr>
               <p:cNvPr id="14" name="文本框 13">
@@ -11337,7 +11381,7 @@
             </p:nvSpPr>
             <p:spPr>
               <a:xfrm>
-                <a:off x="6668048" y="3154635"/>
+                <a:off x="6668048" y="3454501"/>
                 <a:ext cx="4826752" cy="830997"/>
               </a:xfrm>
               <a:prstGeom prst="rect">
@@ -11375,13 +11419,36 @@
                   </a:rPr>
                   <a:t>4</a:t>
                 </a:r>
+                <a14:m>
+                  <m:oMath xmlns:m="http://schemas.openxmlformats.org/officeDocument/2006/math">
+                    <m:r>
+                      <m:rPr>
+                        <m:sty m:val="p"/>
+                      </m:rPr>
+                      <a:rPr lang="en-US" altLang="zh-CN" sz="2400" b="0" i="0" smtClean="0">
+                        <a:latin typeface="Cambria Math" panose="02040503050406030204" pitchFamily="18" charset="0"/>
+                        <a:ea typeface="华文楷体" panose="02010600040101010101" pitchFamily="2" charset="-122"/>
+                        <a:cs typeface="+mj-cs"/>
+                      </a:rPr>
+                      <m:t>Δ</m:t>
+                    </m:r>
+                    <m:r>
+                      <a:rPr lang="en-US" altLang="zh-CN" sz="2400" b="0" i="1" smtClean="0">
+                        <a:latin typeface="Cambria Math" panose="02040503050406030204" pitchFamily="18" charset="0"/>
+                        <a:ea typeface="华文楷体" panose="02010600040101010101" pitchFamily="2" charset="-122"/>
+                        <a:cs typeface="+mj-cs"/>
+                      </a:rPr>
+                      <m:t>𝑡</m:t>
+                    </m:r>
+                  </m:oMath>
+                </a14:m>
                 <a:r>
                   <a:rPr lang="zh-CN" altLang="en-US" sz="2400" dirty="0">
                     <a:latin typeface="华文楷体" panose="02010600040101010101" pitchFamily="2" charset="-122"/>
                     <a:ea typeface="华文楷体" panose="02010600040101010101" pitchFamily="2" charset="-122"/>
                     <a:cs typeface="+mj-cs"/>
                   </a:rPr>
-                  <a:t>纵坐标为</a:t>
+                  <a:t>为</a:t>
                 </a:r>
                 <a14:m>
                   <m:oMath xmlns:m="http://schemas.openxmlformats.org/officeDocument/2006/math">
@@ -11424,7 +11491,27 @@
                     <a:ea typeface="华文楷体" panose="02010600040101010101" pitchFamily="2" charset="-122"/>
                     <a:cs typeface="+mj-cs"/>
                   </a:rPr>
-                  <a:t>在无能损时与有能损之间的差值</a:t>
+                  <a:t>在无能损时与有能损之间的差值，</a:t>
+                </a:r>
+                <a14:m>
+                  <m:oMath xmlns:m="http://schemas.openxmlformats.org/officeDocument/2006/math">
+                    <m:r>
+                      <a:rPr lang="en-US" altLang="zh-CN" sz="2400" b="0" i="1" smtClean="0">
+                        <a:latin typeface="Cambria Math" panose="02040503050406030204" pitchFamily="18" charset="0"/>
+                        <a:ea typeface="华文楷体" panose="02010600040101010101" pitchFamily="2" charset="-122"/>
+                        <a:cs typeface="+mj-cs"/>
+                      </a:rPr>
+                      <m:t>𝐿</m:t>
+                    </m:r>
+                  </m:oMath>
+                </a14:m>
+                <a:r>
+                  <a:rPr lang="zh-CN" altLang="en-US" sz="2400" dirty="0">
+                    <a:latin typeface="华文楷体" panose="02010600040101010101" pitchFamily="2" charset="-122"/>
+                    <a:ea typeface="华文楷体" panose="02010600040101010101" pitchFamily="2" charset="-122"/>
+                    <a:cs typeface="+mj-cs"/>
+                  </a:rPr>
+                  <a:t>为粒子传播路程</a:t>
                 </a:r>
                 <a:endParaRPr lang="en-US" altLang="zh-CN" sz="2400" dirty="0">
                   <a:latin typeface="华文楷体" panose="02010600040101010101" pitchFamily="2" charset="-122"/>
@@ -11435,7 +11522,7 @@
             </p:txBody>
           </p:sp>
         </mc:Choice>
-        <mc:Fallback xmlns="">
+        <mc:Fallback>
           <p:sp>
             <p:nvSpPr>
               <p:cNvPr id="14" name="文本框 13">
@@ -11452,16 +11539,16 @@
             </p:nvSpPr>
             <p:spPr>
               <a:xfrm>
-                <a:off x="6668048" y="3154635"/>
+                <a:off x="6668048" y="3454501"/>
                 <a:ext cx="4826752" cy="830997"/>
               </a:xfrm>
               <a:prstGeom prst="rect">
                 <a:avLst/>
               </a:prstGeom>
               <a:blipFill>
-                <a:blip r:embed="rId3"/>
+                <a:blip r:embed="rId4"/>
                 <a:stretch>
-                  <a:fillRect l="-2020" t="-5839" b="-15328"/>
+                  <a:fillRect l="-2020" t="-5882" b="-16176"/>
                 </a:stretch>
               </a:blipFill>
             </p:spPr>
@@ -11480,104 +11567,6 @@
           </p:sp>
         </mc:Fallback>
       </mc:AlternateContent>
-      <p:sp>
-        <p:nvSpPr>
-          <p:cNvPr id="16" name="文本框 15">
-            <a:extLst>
-              <a:ext uri="{FF2B5EF4-FFF2-40B4-BE49-F238E27FC236}">
-                <a16:creationId xmlns:a16="http://schemas.microsoft.com/office/drawing/2014/main" id="{BB205D04-1BFA-43AC-FB04-DAC9D49C7F16}"/>
-              </a:ext>
-            </a:extLst>
-          </p:cNvPr>
-          <p:cNvSpPr txBox="1"/>
-          <p:nvPr/>
-        </p:nvSpPr>
-        <p:spPr>
-          <a:xfrm>
-            <a:off x="6668048" y="3985632"/>
-            <a:ext cx="4826752" cy="830997"/>
-          </a:xfrm>
-          <a:prstGeom prst="rect">
-            <a:avLst/>
-          </a:prstGeom>
-          <a:noFill/>
-        </p:spPr>
-        <p:txBody>
-          <a:bodyPr wrap="square">
-            <a:spAutoFit/>
-          </a:bodyPr>
-          <a:lstStyle/>
-          <a:p>
-            <a:pPr>
-              <a:spcBef>
-                <a:spcPts val="600"/>
-              </a:spcBef>
-              <a:spcAft>
-                <a:spcPts val="600"/>
-              </a:spcAft>
-            </a:pPr>
-            <a:r>
-              <a:rPr lang="zh-CN" altLang="en-US" sz="2400" dirty="0">
-                <a:latin typeface="华文楷体" panose="02010600040101010101" pitchFamily="2" charset="-122"/>
-                <a:ea typeface="华文楷体" panose="02010600040101010101" pitchFamily="2" charset="-122"/>
-                <a:cs typeface="+mj-cs"/>
-              </a:rPr>
-              <a:t>可以注意到图像的斜率增加，表示有能损时的速度会减小</a:t>
-            </a:r>
-            <a:endParaRPr lang="en-US" altLang="zh-CN" sz="2400" dirty="0">
-              <a:latin typeface="华文楷体" panose="02010600040101010101" pitchFamily="2" charset="-122"/>
-              <a:ea typeface="华文楷体" panose="02010600040101010101" pitchFamily="2" charset="-122"/>
-              <a:cs typeface="+mj-cs"/>
-            </a:endParaRPr>
-          </a:p>
-        </p:txBody>
-      </p:sp>
-      <p:pic>
-        <p:nvPicPr>
-          <p:cNvPr id="5" name="图片 4" descr="图表, 折线图&#10;&#10;描述已自动生成">
-            <a:extLst>
-              <a:ext uri="{FF2B5EF4-FFF2-40B4-BE49-F238E27FC236}">
-                <a16:creationId xmlns:a16="http://schemas.microsoft.com/office/drawing/2014/main" id="{694DF28A-B128-3272-F669-1F621F9FB6C7}"/>
-              </a:ext>
-            </a:extLst>
-          </p:cNvPr>
-          <p:cNvPicPr>
-            <a:picLocks noChangeAspect="1"/>
-          </p:cNvPicPr>
-          <p:nvPr/>
-        </p:nvPicPr>
-        <p:blipFill>
-          <a:blip r:embed="rId4">
-            <a:clrChange>
-              <a:clrFrom>
-                <a:srgbClr val="FFFFFF"/>
-              </a:clrFrom>
-              <a:clrTo>
-                <a:srgbClr val="FFFFFF">
-                  <a:alpha val="0"/>
-                </a:srgbClr>
-              </a:clrTo>
-            </a:clrChange>
-            <a:extLst>
-              <a:ext uri="{28A0092B-C50C-407E-A947-70E740481C1C}">
-                <a14:useLocalDpi xmlns:a14="http://schemas.microsoft.com/office/drawing/2010/main" val="0"/>
-              </a:ext>
-            </a:extLst>
-          </a:blip>
-          <a:stretch>
-            <a:fillRect/>
-          </a:stretch>
-        </p:blipFill>
-        <p:spPr>
-          <a:xfrm>
-            <a:off x="694800" y="1670400"/>
-            <a:ext cx="6286621" cy="4399200"/>
-          </a:xfrm>
-          <a:prstGeom prst="rect">
-            <a:avLst/>
-          </a:prstGeom>
-        </p:spPr>
-      </p:pic>
     </p:spTree>
     <p:extLst>
       <p:ext uri="{BB962C8B-B14F-4D97-AF65-F5344CB8AC3E}">
@@ -11611,6 +11600,1188 @@
         <p:cNvPr id="1" name="">
           <a:extLst>
             <a:ext uri="{FF2B5EF4-FFF2-40B4-BE49-F238E27FC236}">
+              <a16:creationId xmlns:a16="http://schemas.microsoft.com/office/drawing/2014/main" id="{EBA460BE-92A0-E15B-8BD0-D5CC9D4148BB}"/>
+            </a:ext>
+          </a:extLst>
+        </p:cNvPr>
+        <p:cNvGrpSpPr/>
+        <p:nvPr/>
+      </p:nvGrpSpPr>
+      <p:grpSpPr>
+        <a:xfrm>
+          <a:off x="0" y="0"/>
+          <a:ext cx="0" cy="0"/>
+          <a:chOff x="0" y="0"/>
+          <a:chExt cx="0" cy="0"/>
+        </a:xfrm>
+      </p:grpSpPr>
+      <p:pic>
+        <p:nvPicPr>
+          <p:cNvPr id="5" name="图片 4" descr="图表, 折线图&#10;&#10;描述已自动生成">
+            <a:extLst>
+              <a:ext uri="{FF2B5EF4-FFF2-40B4-BE49-F238E27FC236}">
+                <a16:creationId xmlns:a16="http://schemas.microsoft.com/office/drawing/2014/main" id="{102A1EE7-07DC-621B-86A5-407D7B9E9FB6}"/>
+              </a:ext>
+            </a:extLst>
+          </p:cNvPr>
+          <p:cNvPicPr>
+            <a:picLocks noChangeAspect="1"/>
+          </p:cNvPicPr>
+          <p:nvPr/>
+        </p:nvPicPr>
+        <p:blipFill>
+          <a:blip r:embed="rId2">
+            <a:clrChange>
+              <a:clrFrom>
+                <a:srgbClr val="FEFEFE"/>
+              </a:clrFrom>
+              <a:clrTo>
+                <a:srgbClr val="FEFEFE">
+                  <a:alpha val="0"/>
+                </a:srgbClr>
+              </a:clrTo>
+            </a:clrChange>
+            <a:extLst>
+              <a:ext uri="{28A0092B-C50C-407E-A947-70E740481C1C}">
+                <a14:useLocalDpi xmlns:a14="http://schemas.microsoft.com/office/drawing/2010/main" val="0"/>
+              </a:ext>
+            </a:extLst>
+          </a:blip>
+          <a:stretch>
+            <a:fillRect/>
+          </a:stretch>
+        </p:blipFill>
+        <p:spPr>
+          <a:xfrm>
+            <a:off x="694800" y="1670400"/>
+            <a:ext cx="6286620" cy="4399200"/>
+          </a:xfrm>
+          <a:prstGeom prst="rect">
+            <a:avLst/>
+          </a:prstGeom>
+        </p:spPr>
+      </p:pic>
+      <p:sp>
+        <p:nvSpPr>
+          <p:cNvPr id="2" name="标题 1">
+            <a:extLst>
+              <a:ext uri="{FF2B5EF4-FFF2-40B4-BE49-F238E27FC236}">
+                <a16:creationId xmlns:a16="http://schemas.microsoft.com/office/drawing/2014/main" id="{1528AD72-5DF9-6263-447C-E9C395644D84}"/>
+              </a:ext>
+            </a:extLst>
+          </p:cNvPr>
+          <p:cNvSpPr>
+            <a:spLocks noGrp="1"/>
+          </p:cNvSpPr>
+          <p:nvPr>
+            <p:ph type="title"/>
+          </p:nvPr>
+        </p:nvSpPr>
+        <p:spPr>
+          <a:xfrm>
+            <a:off x="838200" y="365125"/>
+            <a:ext cx="10515600" cy="830997"/>
+          </a:xfrm>
+        </p:spPr>
+        <p:txBody>
+          <a:bodyPr/>
+          <a:lstStyle/>
+          <a:p>
+            <a:pPr>
+              <a:spcAft>
+                <a:spcPts val="600"/>
+              </a:spcAft>
+            </a:pPr>
+            <a:r>
+              <a:rPr lang="zh-CN" altLang="en-US" sz="4400" dirty="0">
+                <a:latin typeface="华文楷体" panose="02010600040101010101" pitchFamily="2" charset="-122"/>
+                <a:ea typeface="华文楷体" panose="02010600040101010101" pitchFamily="2" charset="-122"/>
+              </a:rPr>
+              <a:t>结果</a:t>
+            </a:r>
+            <a:endParaRPr lang="en-US" altLang="zh-CN" sz="4400" dirty="0">
+              <a:latin typeface="华文楷体" panose="02010600040101010101" pitchFamily="2" charset="-122"/>
+              <a:ea typeface="华文楷体" panose="02010600040101010101" pitchFamily="2" charset="-122"/>
+            </a:endParaRPr>
+          </a:p>
+        </p:txBody>
+      </p:sp>
+      <mc:AlternateContent xmlns:mc="http://schemas.openxmlformats.org/markup-compatibility/2006">
+        <mc:Choice xmlns:a14="http://schemas.microsoft.com/office/drawing/2010/main" Requires="a14">
+          <p:sp>
+            <p:nvSpPr>
+              <p:cNvPr id="3" name="文本框 2">
+                <a:extLst>
+                  <a:ext uri="{FF2B5EF4-FFF2-40B4-BE49-F238E27FC236}">
+                    <a16:creationId xmlns:a16="http://schemas.microsoft.com/office/drawing/2014/main" id="{BD0D20F9-3A99-2E00-898D-87D8B87F5D3C}"/>
+                  </a:ext>
+                </a:extLst>
+              </p:cNvPr>
+              <p:cNvSpPr txBox="1"/>
+              <p:nvPr/>
+            </p:nvSpPr>
+            <p:spPr>
+              <a:xfrm>
+                <a:off x="694800" y="1440000"/>
+                <a:ext cx="10800000" cy="461665"/>
+              </a:xfrm>
+              <a:prstGeom prst="rect">
+                <a:avLst/>
+              </a:prstGeom>
+              <a:noFill/>
+            </p:spPr>
+            <p:txBody>
+              <a:bodyPr wrap="square">
+                <a:spAutoFit/>
+              </a:bodyPr>
+              <a:lstStyle/>
+              <a:p>
+                <a:pPr>
+                  <a:spcBef>
+                    <a:spcPts val="600"/>
+                  </a:spcBef>
+                  <a:spcAft>
+                    <a:spcPts val="600"/>
+                  </a:spcAft>
+                </a:pPr>
+                <a:r>
+                  <a:rPr lang="en-US" altLang="zh-CN" sz="2400" dirty="0">
+                    <a:latin typeface="华文楷体" panose="02010600040101010101" pitchFamily="2" charset="-122"/>
+                    <a:ea typeface="华文楷体" panose="02010600040101010101" pitchFamily="2" charset="-122"/>
+                    <a:cs typeface="+mj-cs"/>
+                  </a:rPr>
+                  <a:t>2. </a:t>
+                </a:r>
+                <a:r>
+                  <a:rPr lang="zh-CN" altLang="en-US" sz="2400" dirty="0">
+                    <a:latin typeface="华文楷体" panose="02010600040101010101" pitchFamily="2" charset="-122"/>
+                    <a:ea typeface="华文楷体" panose="02010600040101010101" pitchFamily="2" charset="-122"/>
+                    <a:cs typeface="+mj-cs"/>
+                  </a:rPr>
+                  <a:t>能量损失对粒子通过探测器时的时间的影响（</a:t>
+                </a:r>
+                <a14:m>
+                  <m:oMath xmlns:m="http://schemas.openxmlformats.org/officeDocument/2006/math">
+                    <m:sSub>
+                      <m:sSubPr>
+                        <m:ctrlPr>
+                          <a:rPr lang="en-US" altLang="zh-CN" sz="2400" b="0" i="1" smtClean="0">
+                            <a:latin typeface="Cambria Math" panose="02040503050406030204" pitchFamily="18" charset="0"/>
+                            <a:ea typeface="华文楷体" panose="02010600040101010101" pitchFamily="2" charset="-122"/>
+                            <a:cs typeface="+mj-cs"/>
+                          </a:rPr>
+                        </m:ctrlPr>
+                      </m:sSubPr>
+                      <m:e>
+                        <m:r>
+                          <a:rPr lang="en-US" altLang="zh-CN" sz="2400" b="0" i="1" smtClean="0">
+                            <a:latin typeface="Cambria Math" panose="02040503050406030204" pitchFamily="18" charset="0"/>
+                            <a:ea typeface="华文楷体" panose="02010600040101010101" pitchFamily="2" charset="-122"/>
+                            <a:cs typeface="+mj-cs"/>
+                          </a:rPr>
+                          <m:t>𝛽</m:t>
+                        </m:r>
+                      </m:e>
+                      <m:sub>
+                        <m:r>
+                          <a:rPr lang="en-US" altLang="zh-CN" sz="2400" b="0" i="1" smtClean="0">
+                            <a:latin typeface="Cambria Math" panose="02040503050406030204" pitchFamily="18" charset="0"/>
+                            <a:ea typeface="华文楷体" panose="02010600040101010101" pitchFamily="2" charset="-122"/>
+                            <a:cs typeface="+mj-cs"/>
+                          </a:rPr>
+                          <m:t>𝑟𝑒𝑎𝑙</m:t>
+                        </m:r>
+                      </m:sub>
+                    </m:sSub>
+                    <m:r>
+                      <a:rPr lang="en-US" altLang="zh-CN" sz="2400" b="0" i="1" smtClean="0">
+                        <a:latin typeface="Cambria Math" panose="02040503050406030204" pitchFamily="18" charset="0"/>
+                        <a:ea typeface="华文楷体" panose="02010600040101010101" pitchFamily="2" charset="-122"/>
+                        <a:cs typeface="+mj-cs"/>
+                      </a:rPr>
+                      <m:t>=0.7</m:t>
+                    </m:r>
+                  </m:oMath>
+                </a14:m>
+                <a:r>
+                  <a:rPr lang="zh-CN" altLang="en-US" sz="2400" dirty="0">
+                    <a:latin typeface="华文楷体" panose="02010600040101010101" pitchFamily="2" charset="-122"/>
+                    <a:ea typeface="华文楷体" panose="02010600040101010101" pitchFamily="2" charset="-122"/>
+                    <a:cs typeface="+mj-cs"/>
+                  </a:rPr>
+                  <a:t>）</a:t>
+                </a:r>
+                <a:endParaRPr lang="en-US" altLang="zh-CN" sz="2400" dirty="0">
+                  <a:latin typeface="华文楷体" panose="02010600040101010101" pitchFamily="2" charset="-122"/>
+                  <a:ea typeface="华文楷体" panose="02010600040101010101" pitchFamily="2" charset="-122"/>
+                  <a:cs typeface="+mj-cs"/>
+                </a:endParaRPr>
+              </a:p>
+            </p:txBody>
+          </p:sp>
+        </mc:Choice>
+        <mc:Fallback>
+          <p:sp>
+            <p:nvSpPr>
+              <p:cNvPr id="3" name="文本框 2">
+                <a:extLst>
+                  <a:ext uri="{FF2B5EF4-FFF2-40B4-BE49-F238E27FC236}">
+                    <a16:creationId xmlns:a16="http://schemas.microsoft.com/office/drawing/2014/main" id="{BD0D20F9-3A99-2E00-898D-87D8B87F5D3C}"/>
+                  </a:ext>
+                </a:extLst>
+              </p:cNvPr>
+              <p:cNvSpPr txBox="1">
+                <a:spLocks noRot="1" noChangeAspect="1" noMove="1" noResize="1" noEditPoints="1" noAdjustHandles="1" noChangeArrowheads="1" noChangeShapeType="1" noTextEdit="1"/>
+              </p:cNvSpPr>
+              <p:nvPr/>
+            </p:nvSpPr>
+            <p:spPr>
+              <a:xfrm>
+                <a:off x="694800" y="1440000"/>
+                <a:ext cx="10800000" cy="461665"/>
+              </a:xfrm>
+              <a:prstGeom prst="rect">
+                <a:avLst/>
+              </a:prstGeom>
+              <a:blipFill>
+                <a:blip r:embed="rId3"/>
+                <a:stretch>
+                  <a:fillRect l="-903" t="-10526" b="-28947"/>
+                </a:stretch>
+              </a:blipFill>
+            </p:spPr>
+            <p:txBody>
+              <a:bodyPr/>
+              <a:lstStyle/>
+              <a:p>
+                <a:r>
+                  <a:rPr lang="zh-CN" altLang="en-US">
+                    <a:noFill/>
+                  </a:rPr>
+                  <a:t> </a:t>
+                </a:r>
+              </a:p>
+            </p:txBody>
+          </p:sp>
+        </mc:Fallback>
+      </mc:AlternateContent>
+      <p:sp>
+        <p:nvSpPr>
+          <p:cNvPr id="7" name="灯片编号占位符 3">
+            <a:extLst>
+              <a:ext uri="{FF2B5EF4-FFF2-40B4-BE49-F238E27FC236}">
+                <a16:creationId xmlns:a16="http://schemas.microsoft.com/office/drawing/2014/main" id="{90FBA25D-7E36-966C-6242-57011FCBD770}"/>
+              </a:ext>
+            </a:extLst>
+          </p:cNvPr>
+          <p:cNvSpPr>
+            <a:spLocks noGrp="1"/>
+          </p:cNvSpPr>
+          <p:nvPr>
+            <p:ph type="sldNum" sz="quarter" idx="12"/>
+          </p:nvPr>
+        </p:nvSpPr>
+        <p:spPr>
+          <a:xfrm>
+            <a:off x="8610600" y="6356350"/>
+            <a:ext cx="2743200" cy="365125"/>
+          </a:xfrm>
+        </p:spPr>
+        <p:txBody>
+          <a:bodyPr/>
+          <a:lstStyle/>
+          <a:p>
+            <a:fld id="{4DF96A39-405C-4801-AFAA-189ED9B29D59}" type="slidenum">
+              <a:rPr lang="zh-CN" altLang="en-US" sz="2400" smtClean="0"/>
+              <a:t>16</a:t>
+            </a:fld>
+            <a:endParaRPr lang="zh-CN" altLang="en-US" sz="2400" dirty="0"/>
+          </a:p>
+        </p:txBody>
+      </p:sp>
+      <p:sp>
+        <p:nvSpPr>
+          <p:cNvPr id="12" name="文本框 11">
+            <a:extLst>
+              <a:ext uri="{FF2B5EF4-FFF2-40B4-BE49-F238E27FC236}">
+                <a16:creationId xmlns:a16="http://schemas.microsoft.com/office/drawing/2014/main" id="{73EBD1DD-1DB1-1467-70A2-D915131574BC}"/>
+              </a:ext>
+            </a:extLst>
+          </p:cNvPr>
+          <p:cNvSpPr txBox="1"/>
+          <p:nvPr/>
+        </p:nvSpPr>
+        <p:spPr>
+          <a:xfrm>
+            <a:off x="1490560" y="5956240"/>
+            <a:ext cx="4695099" cy="400110"/>
+          </a:xfrm>
+          <a:prstGeom prst="rect">
+            <a:avLst/>
+          </a:prstGeom>
+          <a:noFill/>
+        </p:spPr>
+        <p:txBody>
+          <a:bodyPr wrap="square">
+            <a:spAutoFit/>
+          </a:bodyPr>
+          <a:lstStyle/>
+          <a:p>
+            <a:pPr algn="ctr"/>
+            <a:r>
+              <a:rPr lang="zh-CN" altLang="en-US" sz="2000" dirty="0">
+                <a:latin typeface="华文楷体" panose="02010600040101010101" pitchFamily="2" charset="-122"/>
+                <a:ea typeface="华文楷体" panose="02010600040101010101" pitchFamily="2" charset="-122"/>
+                <a:cs typeface="+mj-cs"/>
+              </a:rPr>
+              <a:t>图</a:t>
+            </a:r>
+            <a:r>
+              <a:rPr lang="en-US" altLang="zh-CN" sz="2000" dirty="0">
+                <a:latin typeface="华文楷体" panose="02010600040101010101" pitchFamily="2" charset="-122"/>
+                <a:ea typeface="华文楷体" panose="02010600040101010101" pitchFamily="2" charset="-122"/>
+                <a:cs typeface="+mj-cs"/>
+              </a:rPr>
+              <a:t>4-1</a:t>
+            </a:r>
+            <a:r>
+              <a:rPr lang="zh-CN" altLang="en-US" sz="2000" dirty="0">
+                <a:latin typeface="华文楷体" panose="02010600040101010101" pitchFamily="2" charset="-122"/>
+                <a:ea typeface="华文楷体" panose="02010600040101010101" pitchFamily="2" charset="-122"/>
+                <a:cs typeface="+mj-cs"/>
+              </a:rPr>
+              <a:t>：</a:t>
+            </a:r>
+            <a:r>
+              <a:rPr lang="en-US" altLang="zh-CN" sz="2000" dirty="0">
+                <a:latin typeface="华文楷体" panose="02010600040101010101" pitchFamily="2" charset="-122"/>
+                <a:ea typeface="华文楷体" panose="02010600040101010101" pitchFamily="2" charset="-122"/>
+                <a:cs typeface="+mj-cs"/>
+              </a:rPr>
+              <a:t>TOF-1</a:t>
+            </a:r>
+            <a:r>
+              <a:rPr lang="zh-CN" altLang="en-US" sz="2000" dirty="0">
+                <a:latin typeface="华文楷体" panose="02010600040101010101" pitchFamily="2" charset="-122"/>
+                <a:ea typeface="华文楷体" panose="02010600040101010101" pitchFamily="2" charset="-122"/>
+                <a:cs typeface="+mj-cs"/>
+              </a:rPr>
+              <a:t>附近时间差与路程关系</a:t>
+            </a:r>
+          </a:p>
+        </p:txBody>
+      </p:sp>
+      <p:sp>
+        <p:nvSpPr>
+          <p:cNvPr id="14" name="文本框 13">
+            <a:extLst>
+              <a:ext uri="{FF2B5EF4-FFF2-40B4-BE49-F238E27FC236}">
+                <a16:creationId xmlns:a16="http://schemas.microsoft.com/office/drawing/2014/main" id="{9E7ECEFD-1DFF-9284-622D-F38000AE7F9F}"/>
+              </a:ext>
+            </a:extLst>
+          </p:cNvPr>
+          <p:cNvSpPr txBox="1"/>
+          <p:nvPr/>
+        </p:nvSpPr>
+        <p:spPr>
+          <a:xfrm>
+            <a:off x="6527048" y="2785303"/>
+            <a:ext cx="4826752" cy="1200329"/>
+          </a:xfrm>
+          <a:prstGeom prst="rect">
+            <a:avLst/>
+          </a:prstGeom>
+          <a:noFill/>
+        </p:spPr>
+        <p:txBody>
+          <a:bodyPr wrap="square">
+            <a:spAutoFit/>
+          </a:bodyPr>
+          <a:lstStyle/>
+          <a:p>
+            <a:pPr>
+              <a:spcBef>
+                <a:spcPts val="600"/>
+              </a:spcBef>
+              <a:spcAft>
+                <a:spcPts val="600"/>
+              </a:spcAft>
+            </a:pPr>
+            <a:r>
+              <a:rPr lang="zh-CN" altLang="en-US" sz="2400" dirty="0">
+                <a:latin typeface="华文楷体" panose="02010600040101010101" pitchFamily="2" charset="-122"/>
+                <a:ea typeface="华文楷体" panose="02010600040101010101" pitchFamily="2" charset="-122"/>
+                <a:cs typeface="+mj-cs"/>
+              </a:rPr>
+              <a:t>图</a:t>
+            </a:r>
+            <a:r>
+              <a:rPr lang="en-US" altLang="zh-CN" sz="2400" dirty="0">
+                <a:latin typeface="华文楷体" panose="02010600040101010101" pitchFamily="2" charset="-122"/>
+                <a:ea typeface="华文楷体" panose="02010600040101010101" pitchFamily="2" charset="-122"/>
+                <a:cs typeface="+mj-cs"/>
+              </a:rPr>
+              <a:t>4-1</a:t>
+            </a:r>
+            <a:r>
+              <a:rPr lang="zh-CN" altLang="en-US" sz="2400" dirty="0">
+                <a:latin typeface="华文楷体" panose="02010600040101010101" pitchFamily="2" charset="-122"/>
+                <a:ea typeface="华文楷体" panose="02010600040101010101" pitchFamily="2" charset="-122"/>
+                <a:cs typeface="+mj-cs"/>
+              </a:rPr>
+              <a:t>为图</a:t>
+            </a:r>
+            <a:r>
+              <a:rPr lang="en-US" altLang="zh-CN" sz="2400" dirty="0">
+                <a:latin typeface="华文楷体" panose="02010600040101010101" pitchFamily="2" charset="-122"/>
+                <a:ea typeface="华文楷体" panose="02010600040101010101" pitchFamily="2" charset="-122"/>
+                <a:cs typeface="+mj-cs"/>
+              </a:rPr>
+              <a:t>4</a:t>
+            </a:r>
+            <a:r>
+              <a:rPr lang="zh-CN" altLang="en-US" sz="2400" dirty="0">
+                <a:latin typeface="华文楷体" panose="02010600040101010101" pitchFamily="2" charset="-122"/>
+                <a:ea typeface="华文楷体" panose="02010600040101010101" pitchFamily="2" charset="-122"/>
+                <a:cs typeface="+mj-cs"/>
+              </a:rPr>
+              <a:t>的一部分，在</a:t>
+            </a:r>
+            <a:r>
+              <a:rPr lang="en-US" altLang="zh-CN" sz="2400" dirty="0">
+                <a:latin typeface="华文楷体" panose="02010600040101010101" pitchFamily="2" charset="-122"/>
+                <a:ea typeface="华文楷体" panose="02010600040101010101" pitchFamily="2" charset="-122"/>
+                <a:cs typeface="+mj-cs"/>
+              </a:rPr>
+              <a:t>TOF-1</a:t>
+            </a:r>
+            <a:r>
+              <a:rPr lang="zh-CN" altLang="en-US" sz="2400" dirty="0">
+                <a:latin typeface="华文楷体" panose="02010600040101010101" pitchFamily="2" charset="-122"/>
+                <a:ea typeface="华文楷体" panose="02010600040101010101" pitchFamily="2" charset="-122"/>
+                <a:cs typeface="+mj-cs"/>
+              </a:rPr>
+              <a:t>（编号为</a:t>
+            </a:r>
+            <a:r>
+              <a:rPr lang="en-US" altLang="zh-CN" sz="2400" dirty="0">
+                <a:latin typeface="华文楷体" panose="02010600040101010101" pitchFamily="2" charset="-122"/>
+                <a:ea typeface="华文楷体" panose="02010600040101010101" pitchFamily="2" charset="-122"/>
+                <a:cs typeface="+mj-cs"/>
+              </a:rPr>
+              <a:t>1</a:t>
+            </a:r>
+            <a:r>
+              <a:rPr lang="zh-CN" altLang="en-US" sz="2400" dirty="0">
+                <a:latin typeface="华文楷体" panose="02010600040101010101" pitchFamily="2" charset="-122"/>
+                <a:ea typeface="华文楷体" panose="02010600040101010101" pitchFamily="2" charset="-122"/>
+                <a:cs typeface="+mj-cs"/>
+              </a:rPr>
+              <a:t>的</a:t>
+            </a:r>
+            <a:r>
+              <a:rPr lang="en-US" altLang="zh-CN" sz="2400" dirty="0">
+                <a:latin typeface="华文楷体" panose="02010600040101010101" pitchFamily="2" charset="-122"/>
+                <a:ea typeface="华文楷体" panose="02010600040101010101" pitchFamily="2" charset="-122"/>
+                <a:cs typeface="+mj-cs"/>
+              </a:rPr>
+              <a:t>TOF</a:t>
+            </a:r>
+            <a:r>
+              <a:rPr lang="zh-CN" altLang="en-US" sz="2400" dirty="0">
+                <a:latin typeface="华文楷体" panose="02010600040101010101" pitchFamily="2" charset="-122"/>
+                <a:ea typeface="华文楷体" panose="02010600040101010101" pitchFamily="2" charset="-122"/>
+                <a:cs typeface="+mj-cs"/>
+              </a:rPr>
+              <a:t>探测器）附近的放大</a:t>
+            </a:r>
+            <a:endParaRPr lang="en-US" altLang="zh-CN" sz="2400" dirty="0">
+              <a:latin typeface="华文楷体" panose="02010600040101010101" pitchFamily="2" charset="-122"/>
+              <a:ea typeface="华文楷体" panose="02010600040101010101" pitchFamily="2" charset="-122"/>
+              <a:cs typeface="+mj-cs"/>
+            </a:endParaRPr>
+          </a:p>
+        </p:txBody>
+      </p:sp>
+      <p:sp>
+        <p:nvSpPr>
+          <p:cNvPr id="16" name="文本框 15">
+            <a:extLst>
+              <a:ext uri="{FF2B5EF4-FFF2-40B4-BE49-F238E27FC236}">
+                <a16:creationId xmlns:a16="http://schemas.microsoft.com/office/drawing/2014/main" id="{038B542E-B735-A412-15AB-5F93BA807FE7}"/>
+              </a:ext>
+            </a:extLst>
+          </p:cNvPr>
+          <p:cNvSpPr txBox="1"/>
+          <p:nvPr/>
+        </p:nvSpPr>
+        <p:spPr>
+          <a:xfrm>
+            <a:off x="6527048" y="3985632"/>
+            <a:ext cx="4826752" cy="1200329"/>
+          </a:xfrm>
+          <a:prstGeom prst="rect">
+            <a:avLst/>
+          </a:prstGeom>
+          <a:noFill/>
+        </p:spPr>
+        <p:txBody>
+          <a:bodyPr wrap="square">
+            <a:spAutoFit/>
+          </a:bodyPr>
+          <a:lstStyle/>
+          <a:p>
+            <a:pPr>
+              <a:spcBef>
+                <a:spcPts val="600"/>
+              </a:spcBef>
+              <a:spcAft>
+                <a:spcPts val="600"/>
+              </a:spcAft>
+            </a:pPr>
+            <a:r>
+              <a:rPr lang="zh-CN" altLang="en-US" sz="2400" dirty="0">
+                <a:latin typeface="华文楷体" panose="02010600040101010101" pitchFamily="2" charset="-122"/>
+                <a:ea typeface="华文楷体" panose="02010600040101010101" pitchFamily="2" charset="-122"/>
+                <a:cs typeface="+mj-cs"/>
+              </a:rPr>
+              <a:t>可以注意到在此处图像的斜率增加，即通过</a:t>
+            </a:r>
+            <a:r>
+              <a:rPr lang="en-US" altLang="zh-CN" sz="2400" dirty="0">
+                <a:latin typeface="华文楷体" panose="02010600040101010101" pitchFamily="2" charset="-122"/>
+                <a:ea typeface="华文楷体" panose="02010600040101010101" pitchFamily="2" charset="-122"/>
+                <a:cs typeface="+mj-cs"/>
+              </a:rPr>
+              <a:t>TOF-1</a:t>
+            </a:r>
+            <a:r>
+              <a:rPr lang="zh-CN" altLang="en-US" sz="2400" dirty="0">
+                <a:latin typeface="华文楷体" panose="02010600040101010101" pitchFamily="2" charset="-122"/>
+                <a:ea typeface="华文楷体" panose="02010600040101010101" pitchFamily="2" charset="-122"/>
+                <a:cs typeface="+mj-cs"/>
+              </a:rPr>
+              <a:t>导致了能量损失，速度减小</a:t>
+            </a:r>
+            <a:endParaRPr lang="en-US" altLang="zh-CN" sz="2400" dirty="0">
+              <a:latin typeface="华文楷体" panose="02010600040101010101" pitchFamily="2" charset="-122"/>
+              <a:ea typeface="华文楷体" panose="02010600040101010101" pitchFamily="2" charset="-122"/>
+              <a:cs typeface="+mj-cs"/>
+            </a:endParaRPr>
+          </a:p>
+        </p:txBody>
+      </p:sp>
+    </p:spTree>
+    <p:extLst>
+      <p:ext uri="{BB962C8B-B14F-4D97-AF65-F5344CB8AC3E}">
+        <p14:creationId xmlns:p14="http://schemas.microsoft.com/office/powerpoint/2010/main" val="3995582658"/>
+      </p:ext>
+    </p:extLst>
+  </p:cSld>
+  <p:clrMapOvr>
+    <a:masterClrMapping/>
+  </p:clrMapOvr>
+  <mc:AlternateContent xmlns:mc="http://schemas.openxmlformats.org/markup-compatibility/2006">
+    <mc:Choice xmlns:p159="http://schemas.microsoft.com/office/powerpoint/2015/09/main" Requires="p159">
+      <p:transition>
+        <p159:morph option="byObject"/>
+      </p:transition>
+    </mc:Choice>
+    <mc:Fallback>
+      <p:transition>
+        <p:fade/>
+      </p:transition>
+    </mc:Fallback>
+  </mc:AlternateContent>
+</p:sld>
+</file>
+
+<file path=ppt/slides/slide17.xml><?xml version="1.0" encoding="utf-8"?>
+<p:sld xmlns:a="http://schemas.openxmlformats.org/drawingml/2006/main" xmlns:r="http://schemas.openxmlformats.org/officeDocument/2006/relationships" xmlns:p="http://schemas.openxmlformats.org/presentationml/2006/main">
+  <p:cSld>
+    <p:spTree>
+      <p:nvGrpSpPr>
+        <p:cNvPr id="1" name="">
+          <a:extLst>
+            <a:ext uri="{FF2B5EF4-FFF2-40B4-BE49-F238E27FC236}">
+              <a16:creationId xmlns:a16="http://schemas.microsoft.com/office/drawing/2014/main" id="{C5501DB9-9B0E-34D6-D88E-2F7DC128C748}"/>
+            </a:ext>
+          </a:extLst>
+        </p:cNvPr>
+        <p:cNvGrpSpPr/>
+        <p:nvPr/>
+      </p:nvGrpSpPr>
+      <p:grpSpPr>
+        <a:xfrm>
+          <a:off x="0" y="0"/>
+          <a:ext cx="0" cy="0"/>
+          <a:chOff x="0" y="0"/>
+          <a:chExt cx="0" cy="0"/>
+        </a:xfrm>
+      </p:grpSpPr>
+      <p:pic>
+        <p:nvPicPr>
+          <p:cNvPr id="6" name="图片 5" descr="图表, 折线图&#10;&#10;描述已自动生成">
+            <a:extLst>
+              <a:ext uri="{FF2B5EF4-FFF2-40B4-BE49-F238E27FC236}">
+                <a16:creationId xmlns:a16="http://schemas.microsoft.com/office/drawing/2014/main" id="{92B90968-125A-8DAF-2C8E-ABDA7857905E}"/>
+              </a:ext>
+            </a:extLst>
+          </p:cNvPr>
+          <p:cNvPicPr>
+            <a:picLocks noChangeAspect="1"/>
+          </p:cNvPicPr>
+          <p:nvPr/>
+        </p:nvPicPr>
+        <p:blipFill>
+          <a:blip r:embed="rId2">
+            <a:extLst>
+              <a:ext uri="{28A0092B-C50C-407E-A947-70E740481C1C}">
+                <a14:useLocalDpi xmlns:a14="http://schemas.microsoft.com/office/drawing/2010/main" val="0"/>
+              </a:ext>
+            </a:extLst>
+          </a:blip>
+          <a:stretch>
+            <a:fillRect/>
+          </a:stretch>
+        </p:blipFill>
+        <p:spPr>
+          <a:xfrm>
+            <a:off x="694800" y="1670400"/>
+            <a:ext cx="6286622" cy="4399200"/>
+          </a:xfrm>
+          <a:prstGeom prst="rect">
+            <a:avLst/>
+          </a:prstGeom>
+        </p:spPr>
+      </p:pic>
+      <p:sp>
+        <p:nvSpPr>
+          <p:cNvPr id="2" name="标题 1">
+            <a:extLst>
+              <a:ext uri="{FF2B5EF4-FFF2-40B4-BE49-F238E27FC236}">
+                <a16:creationId xmlns:a16="http://schemas.microsoft.com/office/drawing/2014/main" id="{45A3216D-4A7E-BED1-3856-A562976BAC87}"/>
+              </a:ext>
+            </a:extLst>
+          </p:cNvPr>
+          <p:cNvSpPr>
+            <a:spLocks noGrp="1"/>
+          </p:cNvSpPr>
+          <p:nvPr>
+            <p:ph type="title"/>
+          </p:nvPr>
+        </p:nvSpPr>
+        <p:spPr>
+          <a:xfrm>
+            <a:off x="838200" y="365125"/>
+            <a:ext cx="10515600" cy="830997"/>
+          </a:xfrm>
+        </p:spPr>
+        <p:txBody>
+          <a:bodyPr/>
+          <a:lstStyle/>
+          <a:p>
+            <a:pPr>
+              <a:spcAft>
+                <a:spcPts val="600"/>
+              </a:spcAft>
+            </a:pPr>
+            <a:r>
+              <a:rPr lang="zh-CN" altLang="en-US" sz="4400" dirty="0">
+                <a:latin typeface="华文楷体" panose="02010600040101010101" pitchFamily="2" charset="-122"/>
+                <a:ea typeface="华文楷体" panose="02010600040101010101" pitchFamily="2" charset="-122"/>
+              </a:rPr>
+              <a:t>结果</a:t>
+            </a:r>
+            <a:endParaRPr lang="en-US" altLang="zh-CN" sz="4400" dirty="0">
+              <a:latin typeface="华文楷体" panose="02010600040101010101" pitchFamily="2" charset="-122"/>
+              <a:ea typeface="华文楷体" panose="02010600040101010101" pitchFamily="2" charset="-122"/>
+            </a:endParaRPr>
+          </a:p>
+        </p:txBody>
+      </p:sp>
+      <mc:AlternateContent xmlns:mc="http://schemas.openxmlformats.org/markup-compatibility/2006">
+        <mc:Choice xmlns:a14="http://schemas.microsoft.com/office/drawing/2010/main" Requires="a14">
+          <p:sp>
+            <p:nvSpPr>
+              <p:cNvPr id="3" name="文本框 2">
+                <a:extLst>
+                  <a:ext uri="{FF2B5EF4-FFF2-40B4-BE49-F238E27FC236}">
+                    <a16:creationId xmlns:a16="http://schemas.microsoft.com/office/drawing/2014/main" id="{90D39AB5-1F04-D592-2463-6279B9A40762}"/>
+                  </a:ext>
+                </a:extLst>
+              </p:cNvPr>
+              <p:cNvSpPr txBox="1"/>
+              <p:nvPr/>
+            </p:nvSpPr>
+            <p:spPr>
+              <a:xfrm>
+                <a:off x="694800" y="1440000"/>
+                <a:ext cx="10800000" cy="461665"/>
+              </a:xfrm>
+              <a:prstGeom prst="rect">
+                <a:avLst/>
+              </a:prstGeom>
+              <a:noFill/>
+            </p:spPr>
+            <p:txBody>
+              <a:bodyPr wrap="square">
+                <a:spAutoFit/>
+              </a:bodyPr>
+              <a:lstStyle/>
+              <a:p>
+                <a:pPr>
+                  <a:spcBef>
+                    <a:spcPts val="600"/>
+                  </a:spcBef>
+                  <a:spcAft>
+                    <a:spcPts val="600"/>
+                  </a:spcAft>
+                </a:pPr>
+                <a:r>
+                  <a:rPr lang="en-US" altLang="zh-CN" sz="2400" dirty="0">
+                    <a:latin typeface="华文楷体" panose="02010600040101010101" pitchFamily="2" charset="-122"/>
+                    <a:ea typeface="华文楷体" panose="02010600040101010101" pitchFamily="2" charset="-122"/>
+                    <a:cs typeface="+mj-cs"/>
+                  </a:rPr>
+                  <a:t>2. </a:t>
+                </a:r>
+                <a:r>
+                  <a:rPr lang="zh-CN" altLang="en-US" sz="2400" dirty="0">
+                    <a:latin typeface="华文楷体" panose="02010600040101010101" pitchFamily="2" charset="-122"/>
+                    <a:ea typeface="华文楷体" panose="02010600040101010101" pitchFamily="2" charset="-122"/>
+                    <a:cs typeface="+mj-cs"/>
+                  </a:rPr>
+                  <a:t>能量损失对粒子通过探测器时的时间的影响（</a:t>
+                </a:r>
+                <a14:m>
+                  <m:oMath xmlns:m="http://schemas.openxmlformats.org/officeDocument/2006/math">
+                    <m:sSub>
+                      <m:sSubPr>
+                        <m:ctrlPr>
+                          <a:rPr lang="en-US" altLang="zh-CN" sz="2400" b="0" i="1" smtClean="0">
+                            <a:latin typeface="Cambria Math" panose="02040503050406030204" pitchFamily="18" charset="0"/>
+                            <a:ea typeface="华文楷体" panose="02010600040101010101" pitchFamily="2" charset="-122"/>
+                            <a:cs typeface="+mj-cs"/>
+                          </a:rPr>
+                        </m:ctrlPr>
+                      </m:sSubPr>
+                      <m:e>
+                        <m:r>
+                          <a:rPr lang="en-US" altLang="zh-CN" sz="2400" b="0" i="1" smtClean="0">
+                            <a:latin typeface="Cambria Math" panose="02040503050406030204" pitchFamily="18" charset="0"/>
+                            <a:ea typeface="华文楷体" panose="02010600040101010101" pitchFamily="2" charset="-122"/>
+                            <a:cs typeface="+mj-cs"/>
+                          </a:rPr>
+                          <m:t>𝛽</m:t>
+                        </m:r>
+                      </m:e>
+                      <m:sub>
+                        <m:r>
+                          <a:rPr lang="en-US" altLang="zh-CN" sz="2400" b="0" i="1" smtClean="0">
+                            <a:latin typeface="Cambria Math" panose="02040503050406030204" pitchFamily="18" charset="0"/>
+                            <a:ea typeface="华文楷体" panose="02010600040101010101" pitchFamily="2" charset="-122"/>
+                            <a:cs typeface="+mj-cs"/>
+                          </a:rPr>
+                          <m:t>𝑟𝑒𝑎𝑙</m:t>
+                        </m:r>
+                      </m:sub>
+                    </m:sSub>
+                    <m:r>
+                      <a:rPr lang="en-US" altLang="zh-CN" sz="2400" b="0" i="1" smtClean="0">
+                        <a:latin typeface="Cambria Math" panose="02040503050406030204" pitchFamily="18" charset="0"/>
+                        <a:ea typeface="华文楷体" panose="02010600040101010101" pitchFamily="2" charset="-122"/>
+                        <a:cs typeface="+mj-cs"/>
+                      </a:rPr>
+                      <m:t>=0.7</m:t>
+                    </m:r>
+                  </m:oMath>
+                </a14:m>
+                <a:r>
+                  <a:rPr lang="zh-CN" altLang="en-US" sz="2400" dirty="0">
+                    <a:latin typeface="华文楷体" panose="02010600040101010101" pitchFamily="2" charset="-122"/>
+                    <a:ea typeface="华文楷体" panose="02010600040101010101" pitchFamily="2" charset="-122"/>
+                    <a:cs typeface="+mj-cs"/>
+                  </a:rPr>
+                  <a:t>）</a:t>
+                </a:r>
+                <a:endParaRPr lang="en-US" altLang="zh-CN" sz="2400" dirty="0">
+                  <a:latin typeface="华文楷体" panose="02010600040101010101" pitchFamily="2" charset="-122"/>
+                  <a:ea typeface="华文楷体" panose="02010600040101010101" pitchFamily="2" charset="-122"/>
+                  <a:cs typeface="+mj-cs"/>
+                </a:endParaRPr>
+              </a:p>
+            </p:txBody>
+          </p:sp>
+        </mc:Choice>
+        <mc:Fallback>
+          <p:sp>
+            <p:nvSpPr>
+              <p:cNvPr id="3" name="文本框 2">
+                <a:extLst>
+                  <a:ext uri="{FF2B5EF4-FFF2-40B4-BE49-F238E27FC236}">
+                    <a16:creationId xmlns:a16="http://schemas.microsoft.com/office/drawing/2014/main" id="{90D39AB5-1F04-D592-2463-6279B9A40762}"/>
+                  </a:ext>
+                </a:extLst>
+              </p:cNvPr>
+              <p:cNvSpPr txBox="1">
+                <a:spLocks noRot="1" noChangeAspect="1" noMove="1" noResize="1" noEditPoints="1" noAdjustHandles="1" noChangeArrowheads="1" noChangeShapeType="1" noTextEdit="1"/>
+              </p:cNvSpPr>
+              <p:nvPr/>
+            </p:nvSpPr>
+            <p:spPr>
+              <a:xfrm>
+                <a:off x="694800" y="1440000"/>
+                <a:ext cx="10800000" cy="461665"/>
+              </a:xfrm>
+              <a:prstGeom prst="rect">
+                <a:avLst/>
+              </a:prstGeom>
+              <a:blipFill>
+                <a:blip r:embed="rId3"/>
+                <a:stretch>
+                  <a:fillRect l="-903" t="-10526" b="-28947"/>
+                </a:stretch>
+              </a:blipFill>
+            </p:spPr>
+            <p:txBody>
+              <a:bodyPr/>
+              <a:lstStyle/>
+              <a:p>
+                <a:r>
+                  <a:rPr lang="zh-CN" altLang="en-US">
+                    <a:noFill/>
+                  </a:rPr>
+                  <a:t> </a:t>
+                </a:r>
+              </a:p>
+            </p:txBody>
+          </p:sp>
+        </mc:Fallback>
+      </mc:AlternateContent>
+      <p:sp>
+        <p:nvSpPr>
+          <p:cNvPr id="7" name="灯片编号占位符 3">
+            <a:extLst>
+              <a:ext uri="{FF2B5EF4-FFF2-40B4-BE49-F238E27FC236}">
+                <a16:creationId xmlns:a16="http://schemas.microsoft.com/office/drawing/2014/main" id="{6F5615D3-484D-6EB8-4DCD-9CF33AD3887A}"/>
+              </a:ext>
+            </a:extLst>
+          </p:cNvPr>
+          <p:cNvSpPr>
+            <a:spLocks noGrp="1"/>
+          </p:cNvSpPr>
+          <p:nvPr>
+            <p:ph type="sldNum" sz="quarter" idx="12"/>
+          </p:nvPr>
+        </p:nvSpPr>
+        <p:spPr>
+          <a:xfrm>
+            <a:off x="8610600" y="6356350"/>
+            <a:ext cx="2743200" cy="365125"/>
+          </a:xfrm>
+        </p:spPr>
+        <p:txBody>
+          <a:bodyPr/>
+          <a:lstStyle/>
+          <a:p>
+            <a:fld id="{4DF96A39-405C-4801-AFAA-189ED9B29D59}" type="slidenum">
+              <a:rPr lang="zh-CN" altLang="en-US" sz="2400" smtClean="0"/>
+              <a:t>17</a:t>
+            </a:fld>
+            <a:endParaRPr lang="zh-CN" altLang="en-US" sz="2400" dirty="0"/>
+          </a:p>
+        </p:txBody>
+      </p:sp>
+      <p:sp>
+        <p:nvSpPr>
+          <p:cNvPr id="12" name="文本框 11">
+            <a:extLst>
+              <a:ext uri="{FF2B5EF4-FFF2-40B4-BE49-F238E27FC236}">
+                <a16:creationId xmlns:a16="http://schemas.microsoft.com/office/drawing/2014/main" id="{0C819F86-567A-F2AA-A2AC-CD0BE650512C}"/>
+              </a:ext>
+            </a:extLst>
+          </p:cNvPr>
+          <p:cNvSpPr txBox="1"/>
+          <p:nvPr/>
+        </p:nvSpPr>
+        <p:spPr>
+          <a:xfrm>
+            <a:off x="1490560" y="5956240"/>
+            <a:ext cx="4695099" cy="400110"/>
+          </a:xfrm>
+          <a:prstGeom prst="rect">
+            <a:avLst/>
+          </a:prstGeom>
+          <a:noFill/>
+        </p:spPr>
+        <p:txBody>
+          <a:bodyPr wrap="square">
+            <a:spAutoFit/>
+          </a:bodyPr>
+          <a:lstStyle/>
+          <a:p>
+            <a:pPr algn="ctr"/>
+            <a:r>
+              <a:rPr lang="zh-CN" altLang="en-US" sz="2000" dirty="0">
+                <a:latin typeface="华文楷体" panose="02010600040101010101" pitchFamily="2" charset="-122"/>
+                <a:ea typeface="华文楷体" panose="02010600040101010101" pitchFamily="2" charset="-122"/>
+                <a:cs typeface="+mj-cs"/>
+              </a:rPr>
+              <a:t>图</a:t>
+            </a:r>
+            <a:r>
+              <a:rPr lang="en-US" altLang="zh-CN" sz="2000" dirty="0">
+                <a:latin typeface="华文楷体" panose="02010600040101010101" pitchFamily="2" charset="-122"/>
+                <a:ea typeface="华文楷体" panose="02010600040101010101" pitchFamily="2" charset="-122"/>
+                <a:cs typeface="+mj-cs"/>
+              </a:rPr>
+              <a:t>4-2</a:t>
+            </a:r>
+            <a:r>
+              <a:rPr lang="zh-CN" altLang="en-US" sz="2000" dirty="0">
+                <a:latin typeface="华文楷体" panose="02010600040101010101" pitchFamily="2" charset="-122"/>
+                <a:ea typeface="华文楷体" panose="02010600040101010101" pitchFamily="2" charset="-122"/>
+                <a:cs typeface="+mj-cs"/>
+              </a:rPr>
+              <a:t>：</a:t>
+            </a:r>
+            <a:r>
+              <a:rPr lang="en-US" altLang="zh-CN" sz="2000" dirty="0">
+                <a:latin typeface="华文楷体" panose="02010600040101010101" pitchFamily="2" charset="-122"/>
+                <a:ea typeface="华文楷体" panose="02010600040101010101" pitchFamily="2" charset="-122"/>
+                <a:cs typeface="+mj-cs"/>
+              </a:rPr>
+              <a:t>TOF-2</a:t>
+            </a:r>
+            <a:r>
+              <a:rPr lang="zh-CN" altLang="en-US" sz="2000" dirty="0">
+                <a:latin typeface="华文楷体" panose="02010600040101010101" pitchFamily="2" charset="-122"/>
+                <a:ea typeface="华文楷体" panose="02010600040101010101" pitchFamily="2" charset="-122"/>
+                <a:cs typeface="+mj-cs"/>
+              </a:rPr>
+              <a:t>附近时间差与路程关系</a:t>
+            </a:r>
+          </a:p>
+        </p:txBody>
+      </p:sp>
+      <p:sp>
+        <p:nvSpPr>
+          <p:cNvPr id="14" name="文本框 13">
+            <a:extLst>
+              <a:ext uri="{FF2B5EF4-FFF2-40B4-BE49-F238E27FC236}">
+                <a16:creationId xmlns:a16="http://schemas.microsoft.com/office/drawing/2014/main" id="{E37A0FF0-CFA0-368C-D849-28D49664DD41}"/>
+              </a:ext>
+            </a:extLst>
+          </p:cNvPr>
+          <p:cNvSpPr txBox="1"/>
+          <p:nvPr/>
+        </p:nvSpPr>
+        <p:spPr>
+          <a:xfrm>
+            <a:off x="6527048" y="2969969"/>
+            <a:ext cx="4826752" cy="1200329"/>
+          </a:xfrm>
+          <a:prstGeom prst="rect">
+            <a:avLst/>
+          </a:prstGeom>
+          <a:noFill/>
+        </p:spPr>
+        <p:txBody>
+          <a:bodyPr wrap="square">
+            <a:spAutoFit/>
+          </a:bodyPr>
+          <a:lstStyle/>
+          <a:p>
+            <a:pPr>
+              <a:spcBef>
+                <a:spcPts val="600"/>
+              </a:spcBef>
+              <a:spcAft>
+                <a:spcPts val="600"/>
+              </a:spcAft>
+            </a:pPr>
+            <a:r>
+              <a:rPr lang="zh-CN" altLang="en-US" sz="2400" dirty="0">
+                <a:latin typeface="华文楷体" panose="02010600040101010101" pitchFamily="2" charset="-122"/>
+                <a:ea typeface="华文楷体" panose="02010600040101010101" pitchFamily="2" charset="-122"/>
+                <a:cs typeface="+mj-cs"/>
+              </a:rPr>
+              <a:t>图</a:t>
+            </a:r>
+            <a:r>
+              <a:rPr lang="en-US" altLang="zh-CN" sz="2400" dirty="0">
+                <a:latin typeface="华文楷体" panose="02010600040101010101" pitchFamily="2" charset="-122"/>
+                <a:ea typeface="华文楷体" panose="02010600040101010101" pitchFamily="2" charset="-122"/>
+                <a:cs typeface="+mj-cs"/>
+              </a:rPr>
+              <a:t>4-2</a:t>
+            </a:r>
+            <a:r>
+              <a:rPr lang="zh-CN" altLang="en-US" sz="2400" dirty="0">
+                <a:latin typeface="华文楷体" panose="02010600040101010101" pitchFamily="2" charset="-122"/>
+                <a:ea typeface="华文楷体" panose="02010600040101010101" pitchFamily="2" charset="-122"/>
+                <a:cs typeface="+mj-cs"/>
+              </a:rPr>
+              <a:t>也为图</a:t>
+            </a:r>
+            <a:r>
+              <a:rPr lang="en-US" altLang="zh-CN" sz="2400" dirty="0">
+                <a:latin typeface="华文楷体" panose="02010600040101010101" pitchFamily="2" charset="-122"/>
+                <a:ea typeface="华文楷体" panose="02010600040101010101" pitchFamily="2" charset="-122"/>
+                <a:cs typeface="+mj-cs"/>
+              </a:rPr>
+              <a:t>4</a:t>
+            </a:r>
+            <a:r>
+              <a:rPr lang="zh-CN" altLang="en-US" sz="2400" dirty="0">
+                <a:latin typeface="华文楷体" panose="02010600040101010101" pitchFamily="2" charset="-122"/>
+                <a:ea typeface="华文楷体" panose="02010600040101010101" pitchFamily="2" charset="-122"/>
+                <a:cs typeface="+mj-cs"/>
+              </a:rPr>
+              <a:t>的一部分，在</a:t>
+            </a:r>
+            <a:r>
+              <a:rPr lang="en-US" altLang="zh-CN" sz="2400" dirty="0">
+                <a:latin typeface="华文楷体" panose="02010600040101010101" pitchFamily="2" charset="-122"/>
+                <a:ea typeface="华文楷体" panose="02010600040101010101" pitchFamily="2" charset="-122"/>
+                <a:cs typeface="+mj-cs"/>
+              </a:rPr>
+              <a:t>TOF-2</a:t>
+            </a:r>
+            <a:r>
+              <a:rPr lang="zh-CN" altLang="en-US" sz="2400" dirty="0">
+                <a:latin typeface="华文楷体" panose="02010600040101010101" pitchFamily="2" charset="-122"/>
+                <a:ea typeface="华文楷体" panose="02010600040101010101" pitchFamily="2" charset="-122"/>
+                <a:cs typeface="+mj-cs"/>
+              </a:rPr>
+              <a:t>（编号为</a:t>
+            </a:r>
+            <a:r>
+              <a:rPr lang="en-US" altLang="zh-CN" sz="2400" dirty="0">
+                <a:latin typeface="华文楷体" panose="02010600040101010101" pitchFamily="2" charset="-122"/>
+                <a:ea typeface="华文楷体" panose="02010600040101010101" pitchFamily="2" charset="-122"/>
+                <a:cs typeface="+mj-cs"/>
+              </a:rPr>
+              <a:t>1</a:t>
+            </a:r>
+            <a:r>
+              <a:rPr lang="zh-CN" altLang="en-US" sz="2400" dirty="0">
+                <a:latin typeface="华文楷体" panose="02010600040101010101" pitchFamily="2" charset="-122"/>
+                <a:ea typeface="华文楷体" panose="02010600040101010101" pitchFamily="2" charset="-122"/>
+                <a:cs typeface="+mj-cs"/>
+              </a:rPr>
+              <a:t>的</a:t>
+            </a:r>
+            <a:r>
+              <a:rPr lang="en-US" altLang="zh-CN" sz="2400" dirty="0">
+                <a:latin typeface="华文楷体" panose="02010600040101010101" pitchFamily="2" charset="-122"/>
+                <a:ea typeface="华文楷体" panose="02010600040101010101" pitchFamily="2" charset="-122"/>
+                <a:cs typeface="+mj-cs"/>
+              </a:rPr>
+              <a:t>TOF</a:t>
+            </a:r>
+            <a:r>
+              <a:rPr lang="zh-CN" altLang="en-US" sz="2400" dirty="0">
+                <a:latin typeface="华文楷体" panose="02010600040101010101" pitchFamily="2" charset="-122"/>
+                <a:ea typeface="华文楷体" panose="02010600040101010101" pitchFamily="2" charset="-122"/>
+                <a:cs typeface="+mj-cs"/>
+              </a:rPr>
+              <a:t>探测器）附近的放大</a:t>
+            </a:r>
+            <a:endParaRPr lang="en-US" altLang="zh-CN" sz="2400" dirty="0">
+              <a:latin typeface="华文楷体" panose="02010600040101010101" pitchFamily="2" charset="-122"/>
+              <a:ea typeface="华文楷体" panose="02010600040101010101" pitchFamily="2" charset="-122"/>
+              <a:cs typeface="+mj-cs"/>
+            </a:endParaRPr>
+          </a:p>
+        </p:txBody>
+      </p:sp>
+      <p:sp>
+        <p:nvSpPr>
+          <p:cNvPr id="16" name="文本框 15">
+            <a:extLst>
+              <a:ext uri="{FF2B5EF4-FFF2-40B4-BE49-F238E27FC236}">
+                <a16:creationId xmlns:a16="http://schemas.microsoft.com/office/drawing/2014/main" id="{60F1915E-96C7-696A-2D19-2A8BAAF43AD2}"/>
+              </a:ext>
+            </a:extLst>
+          </p:cNvPr>
+          <p:cNvSpPr txBox="1"/>
+          <p:nvPr/>
+        </p:nvSpPr>
+        <p:spPr>
+          <a:xfrm>
+            <a:off x="6527048" y="4170298"/>
+            <a:ext cx="4826752" cy="830997"/>
+          </a:xfrm>
+          <a:prstGeom prst="rect">
+            <a:avLst/>
+          </a:prstGeom>
+          <a:noFill/>
+        </p:spPr>
+        <p:txBody>
+          <a:bodyPr wrap="square">
+            <a:spAutoFit/>
+          </a:bodyPr>
+          <a:lstStyle/>
+          <a:p>
+            <a:pPr>
+              <a:spcBef>
+                <a:spcPts val="600"/>
+              </a:spcBef>
+              <a:spcAft>
+                <a:spcPts val="600"/>
+              </a:spcAft>
+            </a:pPr>
+            <a:r>
+              <a:rPr lang="zh-CN" altLang="en-US" sz="2400" dirty="0">
+                <a:latin typeface="华文楷体" panose="02010600040101010101" pitchFamily="2" charset="-122"/>
+                <a:ea typeface="华文楷体" panose="02010600040101010101" pitchFamily="2" charset="-122"/>
+                <a:cs typeface="+mj-cs"/>
+              </a:rPr>
+              <a:t>同样是通过探测器的能损导致了速度减小</a:t>
+            </a:r>
+            <a:endParaRPr lang="en-US" altLang="zh-CN" sz="2400" dirty="0">
+              <a:latin typeface="华文楷体" panose="02010600040101010101" pitchFamily="2" charset="-122"/>
+              <a:ea typeface="华文楷体" panose="02010600040101010101" pitchFamily="2" charset="-122"/>
+              <a:cs typeface="+mj-cs"/>
+            </a:endParaRPr>
+          </a:p>
+        </p:txBody>
+      </p:sp>
+    </p:spTree>
+    <p:extLst>
+      <p:ext uri="{BB962C8B-B14F-4D97-AF65-F5344CB8AC3E}">
+        <p14:creationId xmlns:p14="http://schemas.microsoft.com/office/powerpoint/2010/main" val="3454390182"/>
+      </p:ext>
+    </p:extLst>
+  </p:cSld>
+  <p:clrMapOvr>
+    <a:masterClrMapping/>
+  </p:clrMapOvr>
+  <mc:AlternateContent xmlns:mc="http://schemas.openxmlformats.org/markup-compatibility/2006">
+    <mc:Choice xmlns:p159="http://schemas.microsoft.com/office/powerpoint/2015/09/main" Requires="p159">
+      <p:transition>
+        <p159:morph option="byObject"/>
+      </p:transition>
+    </mc:Choice>
+    <mc:Fallback>
+      <p:transition>
+        <p:fade/>
+      </p:transition>
+    </mc:Fallback>
+  </mc:AlternateContent>
+</p:sld>
+</file>
+
+<file path=ppt/slides/slide18.xml><?xml version="1.0" encoding="utf-8"?>
+<p:sld xmlns:a="http://schemas.openxmlformats.org/drawingml/2006/main" xmlns:r="http://schemas.openxmlformats.org/officeDocument/2006/relationships" xmlns:p="http://schemas.openxmlformats.org/presentationml/2006/main">
+  <p:cSld>
+    <p:spTree>
+      <p:nvGrpSpPr>
+        <p:cNvPr id="1" name="">
+          <a:extLst>
+            <a:ext uri="{FF2B5EF4-FFF2-40B4-BE49-F238E27FC236}">
               <a16:creationId xmlns:a16="http://schemas.microsoft.com/office/drawing/2014/main" id="{6B2B2E3C-2528-CA71-1BD0-BBCCCBF403ED}"/>
             </a:ext>
           </a:extLst>
@@ -11626,6 +12797,42 @@
           <a:chExt cx="0" cy="0"/>
         </a:xfrm>
       </p:grpSpPr>
+      <p:pic>
+        <p:nvPicPr>
+          <p:cNvPr id="5" name="图片 4">
+            <a:extLst>
+              <a:ext uri="{FF2B5EF4-FFF2-40B4-BE49-F238E27FC236}">
+                <a16:creationId xmlns:a16="http://schemas.microsoft.com/office/drawing/2014/main" id="{832CA765-2E71-2AB7-8257-67DBCF973CD0}"/>
+              </a:ext>
+            </a:extLst>
+          </p:cNvPr>
+          <p:cNvPicPr>
+            <a:picLocks noChangeAspect="1"/>
+          </p:cNvPicPr>
+          <p:nvPr/>
+        </p:nvPicPr>
+        <p:blipFill>
+          <a:blip r:embed="rId2">
+            <a:extLst>
+              <a:ext uri="{28A0092B-C50C-407E-A947-70E740481C1C}">
+                <a14:useLocalDpi xmlns:a14="http://schemas.microsoft.com/office/drawing/2010/main" val="0"/>
+              </a:ext>
+            </a:extLst>
+          </a:blip>
+          <a:stretch>
+            <a:fillRect/>
+          </a:stretch>
+        </p:blipFill>
+        <p:spPr>
+          <a:xfrm>
+            <a:off x="694800" y="1670400"/>
+            <a:ext cx="6286622" cy="4399200"/>
+          </a:xfrm>
+          <a:prstGeom prst="rect">
+            <a:avLst/>
+          </a:prstGeom>
+        </p:spPr>
+      </p:pic>
       <p:sp>
         <p:nvSpPr>
           <p:cNvPr id="2" name="标题 1">
@@ -11671,8 +12878,8 @@
           </a:p>
         </p:txBody>
       </p:sp>
-      <mc:AlternateContent xmlns:mc="http://schemas.openxmlformats.org/markup-compatibility/2006">
-        <mc:Choice xmlns:a14="http://schemas.microsoft.com/office/drawing/2010/main" Requires="a14">
+      <mc:AlternateContent xmlns:mc="http://schemas.openxmlformats.org/markup-compatibility/2006" xmlns:a14="http://schemas.microsoft.com/office/drawing/2010/main">
+        <mc:Choice Requires="a14">
           <p:sp>
             <p:nvSpPr>
               <p:cNvPr id="3" name="文本框 2">
@@ -11785,7 +12992,7 @@
             </p:txBody>
           </p:sp>
         </mc:Choice>
-        <mc:Fallback>
+        <mc:Fallback xmlns="">
           <p:sp>
             <p:nvSpPr>
               <p:cNvPr id="3" name="文本框 2">
@@ -11809,7 +13016,7 @@
                 <a:avLst/>
               </a:prstGeom>
               <a:blipFill>
-                <a:blip r:embed="rId2"/>
+                <a:blip r:embed="rId3"/>
                 <a:stretch>
                   <a:fillRect l="-903" t="-10526" b="-28947"/>
                 </a:stretch>
@@ -11858,7 +13065,7 @@
           <a:p>
             <a:fld id="{4DF96A39-405C-4801-AFAA-189ED9B29D59}" type="slidenum">
               <a:rPr lang="zh-CN" altLang="en-US" sz="2400" smtClean="0"/>
-              <a:t>16</a:t>
+              <a:t>18</a:t>
             </a:fld>
             <a:endParaRPr lang="zh-CN" altLang="en-US" sz="2400" dirty="0"/>
           </a:p>
@@ -11935,7 +13142,7 @@
         <p:spPr>
           <a:xfrm>
             <a:off x="6668048" y="3269835"/>
-            <a:ext cx="4826752" cy="1200329"/>
+            <a:ext cx="4826752" cy="1569660"/>
           </a:xfrm>
           <a:prstGeom prst="rect">
             <a:avLst/>
@@ -11978,7 +13185,7 @@
                 <a:ea typeface="华文楷体" panose="02010600040101010101" pitchFamily="2" charset="-122"/>
                 <a:cs typeface="+mj-cs"/>
               </a:rPr>
-              <a:t>黑色实线表示实际时间的连线，</a:t>
+              <a:t>黑色三角表示粒子实际通过探测器的时间，</a:t>
             </a:r>
             <a:r>
               <a:rPr lang="zh-CN" altLang="en-US" sz="2400" dirty="0">
@@ -11997,18 +13204,18 @@
                 <a:ea typeface="华文楷体" panose="02010600040101010101" pitchFamily="2" charset="-122"/>
                 <a:cs typeface="+mj-cs"/>
               </a:rPr>
-              <a:t>代表测量时间，</a:t>
+              <a:t>代表探测器测量到的时间，</a:t>
             </a:r>
             <a:r>
               <a:rPr lang="zh-CN" altLang="en-US" sz="2400" dirty="0">
                 <a:solidFill>
-                  <a:srgbClr val="FF0000"/>
+                  <a:srgbClr val="13FF13"/>
                 </a:solidFill>
                 <a:latin typeface="华文楷体" panose="02010600040101010101" pitchFamily="2" charset="-122"/>
                 <a:ea typeface="华文楷体" panose="02010600040101010101" pitchFamily="2" charset="-122"/>
                 <a:cs typeface="+mj-cs"/>
               </a:rPr>
-              <a:t>红色实线</a:t>
+              <a:t>绿色实线</a:t>
             </a:r>
             <a:r>
               <a:rPr lang="zh-CN" altLang="en-US" sz="2400" dirty="0">
@@ -12016,7 +13223,7 @@
                 <a:ea typeface="华文楷体" panose="02010600040101010101" pitchFamily="2" charset="-122"/>
                 <a:cs typeface="+mj-cs"/>
               </a:rPr>
-              <a:t>为拟合直线</a:t>
+              <a:t>为对探测数据进行拟合得到的直线</a:t>
             </a:r>
             <a:endParaRPr lang="en-US" altLang="zh-CN" sz="2400" dirty="0">
               <a:latin typeface="华文楷体" panose="02010600040101010101" pitchFamily="2" charset="-122"/>
@@ -12026,52 +13233,6 @@
           </a:p>
         </p:txBody>
       </p:sp>
-      <p:pic>
-        <p:nvPicPr>
-          <p:cNvPr id="11" name="图片 10" descr="图表, 折线图&#10;&#10;描述已自动生成">
-            <a:extLst>
-              <a:ext uri="{FF2B5EF4-FFF2-40B4-BE49-F238E27FC236}">
-                <a16:creationId xmlns:a16="http://schemas.microsoft.com/office/drawing/2014/main" id="{C7689042-BBC7-671F-E656-4F08C365005E}"/>
-              </a:ext>
-            </a:extLst>
-          </p:cNvPr>
-          <p:cNvPicPr>
-            <a:picLocks noChangeAspect="1"/>
-          </p:cNvPicPr>
-          <p:nvPr/>
-        </p:nvPicPr>
-        <p:blipFill>
-          <a:blip r:embed="rId3">
-            <a:clrChange>
-              <a:clrFrom>
-                <a:srgbClr val="FFFFFF"/>
-              </a:clrFrom>
-              <a:clrTo>
-                <a:srgbClr val="FFFFFF">
-                  <a:alpha val="0"/>
-                </a:srgbClr>
-              </a:clrTo>
-            </a:clrChange>
-            <a:extLst>
-              <a:ext uri="{28A0092B-C50C-407E-A947-70E740481C1C}">
-                <a14:useLocalDpi xmlns:a14="http://schemas.microsoft.com/office/drawing/2010/main" val="0"/>
-              </a:ext>
-            </a:extLst>
-          </a:blip>
-          <a:stretch>
-            <a:fillRect/>
-          </a:stretch>
-        </p:blipFill>
-        <p:spPr>
-          <a:xfrm>
-            <a:off x="694800" y="1670400"/>
-            <a:ext cx="6286622" cy="4399200"/>
-          </a:xfrm>
-          <a:prstGeom prst="rect">
-            <a:avLst/>
-          </a:prstGeom>
-        </p:spPr>
-      </p:pic>
     </p:spTree>
     <p:extLst>
       <p:ext uri="{BB962C8B-B14F-4D97-AF65-F5344CB8AC3E}">
@@ -12097,7 +13258,7 @@
 </p:sld>
 </file>
 
-<file path=ppt/slides/slide17.xml><?xml version="1.0" encoding="utf-8"?>
+<file path=ppt/slides/slide19.xml><?xml version="1.0" encoding="utf-8"?>
 <p:sld xmlns:a="http://schemas.openxmlformats.org/drawingml/2006/main" xmlns:r="http://schemas.openxmlformats.org/officeDocument/2006/relationships" xmlns:p="http://schemas.openxmlformats.org/presentationml/2006/main">
   <p:cSld>
     <p:spTree>
@@ -12122,10 +13283,10 @@
       </p:grpSpPr>
       <p:pic>
         <p:nvPicPr>
-          <p:cNvPr id="8" name="图片 7" descr="图表, 折线图&#10;&#10;描述已自动生成">
+          <p:cNvPr id="6" name="图片 5" descr="图表, 折线图&#10;&#10;描述已自动生成">
             <a:extLst>
               <a:ext uri="{FF2B5EF4-FFF2-40B4-BE49-F238E27FC236}">
-                <a16:creationId xmlns:a16="http://schemas.microsoft.com/office/drawing/2014/main" id="{C2D5453D-4F25-AF21-902D-B23542C0C22D}"/>
+                <a16:creationId xmlns:a16="http://schemas.microsoft.com/office/drawing/2014/main" id="{A8E57C2A-B4D8-F9E4-B7A3-B0FE824EDF8F}"/>
               </a:ext>
             </a:extLst>
           </p:cNvPr>
@@ -12201,8 +13362,8 @@
           </a:p>
         </p:txBody>
       </p:sp>
-      <mc:AlternateContent xmlns:mc="http://schemas.openxmlformats.org/markup-compatibility/2006">
-        <mc:Choice xmlns:a14="http://schemas.microsoft.com/office/drawing/2010/main" Requires="a14">
+      <mc:AlternateContent xmlns:mc="http://schemas.openxmlformats.org/markup-compatibility/2006" xmlns:a14="http://schemas.microsoft.com/office/drawing/2010/main">
+        <mc:Choice Requires="a14">
           <p:sp>
             <p:nvSpPr>
               <p:cNvPr id="3" name="文本框 2">
@@ -12315,7 +13476,7 @@
             </p:txBody>
           </p:sp>
         </mc:Choice>
-        <mc:Fallback>
+        <mc:Fallback xmlns="">
           <p:sp>
             <p:nvSpPr>
               <p:cNvPr id="3" name="文本框 2">
@@ -12388,7 +13549,7 @@
           <a:p>
             <a:fld id="{4DF96A39-405C-4801-AFAA-189ED9B29D59}" type="slidenum">
               <a:rPr lang="zh-CN" altLang="en-US" sz="2400" smtClean="0"/>
-              <a:t>17</a:t>
+              <a:t>19</a:t>
             </a:fld>
             <a:endParaRPr lang="zh-CN" altLang="en-US" sz="2400" dirty="0"/>
           </a:p>
@@ -12568,7 +13729,7 @@
             </p:nvSpPr>
             <p:spPr>
               <a:xfrm>
-                <a:off x="6668048" y="2785304"/>
+                <a:off x="6668048" y="2369805"/>
                 <a:ext cx="4826752" cy="1569660"/>
               </a:xfrm>
               <a:prstGeom prst="rect">
@@ -12612,49 +13773,26 @@
                     <a:ea typeface="华文楷体" panose="02010600040101010101" pitchFamily="2" charset="-122"/>
                     <a:cs typeface="+mj-cs"/>
                   </a:rPr>
-                  <a:t>为</a:t>
+                  <a:t>为真实的粒子</a:t>
                 </a:r>
                 <a14:m>
                   <m:oMath xmlns:m="http://schemas.openxmlformats.org/officeDocument/2006/math">
+                    <m:r>
+                      <a:rPr lang="en-US" altLang="zh-CN" sz="2400" b="0" i="0" smtClean="0">
+                        <a:latin typeface="Cambria Math" panose="02040503050406030204" pitchFamily="18" charset="0"/>
+                        <a:ea typeface="华文楷体" panose="02010600040101010101" pitchFamily="2" charset="-122"/>
+                        <a:cs typeface="+mj-cs"/>
+                      </a:rPr>
+                      <m:t>1/</m:t>
+                    </m:r>
                     <m:r>
                       <a:rPr lang="en-US" altLang="zh-CN" sz="2400" b="0" i="1" smtClean="0">
                         <a:latin typeface="Cambria Math" panose="02040503050406030204" pitchFamily="18" charset="0"/>
                         <a:ea typeface="华文楷体" panose="02010600040101010101" pitchFamily="2" charset="-122"/>
                         <a:cs typeface="+mj-cs"/>
                       </a:rPr>
-                      <m:t>1/</m:t>
+                      <m:t>𝛽</m:t>
                     </m:r>
-                    <m:sSub>
-                      <m:sSubPr>
-                        <m:ctrlPr>
-                          <a:rPr lang="en-US" altLang="zh-CN" sz="2400" b="0" i="1" smtClean="0">
-                            <a:latin typeface="Cambria Math" panose="02040503050406030204" pitchFamily="18" charset="0"/>
-                            <a:ea typeface="华文楷体" panose="02010600040101010101" pitchFamily="2" charset="-122"/>
-                            <a:cs typeface="+mj-cs"/>
-                          </a:rPr>
-                        </m:ctrlPr>
-                      </m:sSubPr>
-                      <m:e>
-                        <m:r>
-                          <a:rPr lang="en-US" altLang="zh-CN" sz="2400" b="0" i="1" smtClean="0">
-                            <a:latin typeface="Cambria Math" panose="02040503050406030204" pitchFamily="18" charset="0"/>
-                            <a:ea typeface="华文楷体" panose="02010600040101010101" pitchFamily="2" charset="-122"/>
-                            <a:cs typeface="+mj-cs"/>
-                          </a:rPr>
-                          <m:t>𝛽</m:t>
-                        </m:r>
-                      </m:e>
-                      <m:sub>
-                        <m:r>
-                          <a:rPr lang="en-US" altLang="zh-CN" sz="2400" b="0" i="1" smtClean="0">
-                            <a:latin typeface="Cambria Math" panose="02040503050406030204" pitchFamily="18" charset="0"/>
-                            <a:ea typeface="华文楷体" panose="02010600040101010101" pitchFamily="2" charset="-122"/>
-                            <a:cs typeface="+mj-cs"/>
-                          </a:rPr>
-                          <m:t>𝑟𝑒𝑎𝑙</m:t>
-                        </m:r>
-                      </m:sub>
-                    </m:sSub>
                   </m:oMath>
                 </a14:m>
                 <a:r>
@@ -12663,7 +13801,7 @@
                     <a:ea typeface="华文楷体" panose="02010600040101010101" pitchFamily="2" charset="-122"/>
                     <a:cs typeface="+mj-cs"/>
                   </a:rPr>
-                  <a:t>（实际</a:t>
+                  <a:t>与重建</a:t>
                 </a:r>
                 <a:r>
                   <a:rPr lang="zh-CN" altLang="en-US" sz="2400" dirty="0">
@@ -12683,91 +13821,13 @@
                 <a14:m>
                   <m:oMath xmlns:m="http://schemas.openxmlformats.org/officeDocument/2006/math">
                     <m:r>
-                      <a:rPr lang="en-US" altLang="zh-CN" sz="2400" b="0" i="1" smtClean="0">
-                        <a:latin typeface="Cambria Math" panose="02040503050406030204" pitchFamily="18" charset="0"/>
-                        <a:ea typeface="华文楷体" panose="02010600040101010101" pitchFamily="2" charset="-122"/>
-                        <a:cs typeface="+mj-cs"/>
-                      </a:rPr>
-                      <m:t>𝛽</m:t>
-                    </m:r>
-                  </m:oMath>
-                </a14:m>
-                <a:r>
-                  <a:rPr lang="zh-CN" altLang="en-US" sz="2400" dirty="0">
-                    <a:latin typeface="华文楷体" panose="02010600040101010101" pitchFamily="2" charset="-122"/>
-                    <a:ea typeface="华文楷体" panose="02010600040101010101" pitchFamily="2" charset="-122"/>
-                    <a:cs typeface="+mj-cs"/>
-                  </a:rPr>
-                  <a:t>）与</a:t>
-                </a:r>
-                <a14:m>
-                  <m:oMath xmlns:m="http://schemas.openxmlformats.org/officeDocument/2006/math">
-                    <m:r>
-                      <a:rPr lang="en-US" altLang="zh-CN" sz="2400" b="0" i="1" smtClean="0">
+                      <a:rPr lang="en-US" altLang="zh-CN" sz="2400" b="0" i="0" smtClean="0">
                         <a:latin typeface="Cambria Math" panose="02040503050406030204" pitchFamily="18" charset="0"/>
                         <a:ea typeface="华文楷体" panose="02010600040101010101" pitchFamily="2" charset="-122"/>
                         <a:cs typeface="+mj-cs"/>
                       </a:rPr>
                       <m:t>1/</m:t>
                     </m:r>
-                    <m:sSub>
-                      <m:sSubPr>
-                        <m:ctrlPr>
-                          <a:rPr lang="en-US" altLang="zh-CN" sz="2400" b="0" i="1" smtClean="0">
-                            <a:latin typeface="Cambria Math" panose="02040503050406030204" pitchFamily="18" charset="0"/>
-                            <a:ea typeface="华文楷体" panose="02010600040101010101" pitchFamily="2" charset="-122"/>
-                            <a:cs typeface="+mj-cs"/>
-                          </a:rPr>
-                        </m:ctrlPr>
-                      </m:sSubPr>
-                      <m:e>
-                        <m:r>
-                          <a:rPr lang="en-US" altLang="zh-CN" sz="2400" b="0" i="1" smtClean="0">
-                            <a:latin typeface="Cambria Math" panose="02040503050406030204" pitchFamily="18" charset="0"/>
-                            <a:ea typeface="华文楷体" panose="02010600040101010101" pitchFamily="2" charset="-122"/>
-                            <a:cs typeface="+mj-cs"/>
-                          </a:rPr>
-                          <m:t>𝛽</m:t>
-                        </m:r>
-                      </m:e>
-                      <m:sub>
-                        <m:r>
-                          <a:rPr lang="en-US" altLang="zh-CN" sz="2400" b="0" i="1" smtClean="0">
-                            <a:latin typeface="Cambria Math" panose="02040503050406030204" pitchFamily="18" charset="0"/>
-                            <a:ea typeface="华文楷体" panose="02010600040101010101" pitchFamily="2" charset="-122"/>
-                            <a:cs typeface="+mj-cs"/>
-                          </a:rPr>
-                          <m:t>𝑟𝑒𝑐</m:t>
-                        </m:r>
-                      </m:sub>
-                    </m:sSub>
-                  </m:oMath>
-                </a14:m>
-                <a:r>
-                  <a:rPr lang="zh-CN" altLang="en-US" sz="2400" dirty="0">
-                    <a:latin typeface="华文楷体" panose="02010600040101010101" pitchFamily="2" charset="-122"/>
-                    <a:ea typeface="华文楷体" panose="02010600040101010101" pitchFamily="2" charset="-122"/>
-                    <a:cs typeface="+mj-cs"/>
-                  </a:rPr>
-                  <a:t>（重建</a:t>
-                </a:r>
-                <a:r>
-                  <a:rPr lang="zh-CN" altLang="en-US" sz="2400" dirty="0">
-                    <a:latin typeface="华文楷体" panose="02010600040101010101" pitchFamily="2" charset="-122"/>
-                    <a:ea typeface="华文楷体" panose="02010600040101010101" pitchFamily="2" charset="-122"/>
-                  </a:rPr>
-                  <a:t>的</a:t>
-                </a:r>
-                <a:r>
-                  <a:rPr lang="zh-CN" altLang="en-US" sz="2400" dirty="0">
-                    <a:latin typeface="华文楷体" panose="02010600040101010101" pitchFamily="2" charset="-122"/>
-                    <a:ea typeface="华文楷体" panose="02010600040101010101" pitchFamily="2" charset="-122"/>
-                    <a:cs typeface="+mj-cs"/>
-                  </a:rPr>
-                  <a:t>粒子</a:t>
-                </a:r>
-                <a14:m>
-                  <m:oMath xmlns:m="http://schemas.openxmlformats.org/officeDocument/2006/math">
                     <m:r>
                       <a:rPr lang="en-US" altLang="zh-CN" sz="2400" b="0" i="1" smtClean="0">
                         <a:latin typeface="Cambria Math" panose="02040503050406030204" pitchFamily="18" charset="0"/>
@@ -12784,7 +13844,7 @@
                     <a:ea typeface="华文楷体" panose="02010600040101010101" pitchFamily="2" charset="-122"/>
                     <a:cs typeface="+mj-cs"/>
                   </a:rPr>
-                  <a:t>）差值的分布，中央黑色竖线为</a:t>
+                  <a:t>差值的分布，中央的黑色竖线是将时间分辨率设置为</a:t>
                 </a:r>
                 <a:r>
                   <a:rPr lang="en-US" altLang="zh-CN" sz="2400" dirty="0">
@@ -12800,7 +13860,7 @@
                     <a:ea typeface="华文楷体" panose="02010600040101010101" pitchFamily="2" charset="-122"/>
                     <a:cs typeface="+mj-cs"/>
                   </a:rPr>
-                  <a:t>时间分辨率时的</a:t>
+                  <a:t>，得到的</a:t>
                 </a:r>
                 <a14:m>
                   <m:oMath xmlns:m="http://schemas.openxmlformats.org/officeDocument/2006/math">
@@ -12808,38 +13868,40 @@
                       <m:rPr>
                         <m:sty m:val="p"/>
                       </m:rPr>
-                      <a:rPr lang="en-US" altLang="zh-CN" sz="2400" b="0" i="0" smtClean="0">
+                      <a:rPr lang="en-US" altLang="zh-CN" sz="2400">
                         <a:latin typeface="Cambria Math" panose="02040503050406030204" pitchFamily="18" charset="0"/>
                         <a:ea typeface="华文楷体" panose="02010600040101010101" pitchFamily="2" charset="-122"/>
                       </a:rPr>
                       <m:t>Δ</m:t>
                     </m:r>
-                    <m:d>
-                      <m:dPr>
-                        <m:ctrlPr>
-                          <a:rPr lang="en-US" altLang="zh-CN" sz="2400" b="0" i="0" smtClean="0">
-                            <a:latin typeface="Cambria Math" panose="02040503050406030204" pitchFamily="18" charset="0"/>
-                            <a:ea typeface="华文楷体" panose="02010600040101010101" pitchFamily="2" charset="-122"/>
-                          </a:rPr>
-                        </m:ctrlPr>
-                      </m:dPr>
-                      <m:e>
-                        <m:r>
-                          <a:rPr lang="en-US" altLang="zh-CN" sz="2400" i="1">
-                            <a:latin typeface="Cambria Math" panose="02040503050406030204" pitchFamily="18" charset="0"/>
-                            <a:ea typeface="华文楷体" panose="02010600040101010101" pitchFamily="2" charset="-122"/>
-                          </a:rPr>
-                          <m:t>1/</m:t>
-                        </m:r>
-                        <m:r>
-                          <a:rPr lang="en-US" altLang="zh-CN" sz="2400" i="1">
-                            <a:latin typeface="Cambria Math" panose="02040503050406030204" pitchFamily="18" charset="0"/>
-                            <a:ea typeface="华文楷体" panose="02010600040101010101" pitchFamily="2" charset="-122"/>
-                          </a:rPr>
-                          <m:t>𝛽</m:t>
-                        </m:r>
-                      </m:e>
-                    </m:d>
+                    <m:r>
+                      <a:rPr lang="en-US" altLang="zh-CN" sz="2400" b="0" i="1" smtClean="0">
+                        <a:latin typeface="Cambria Math" panose="02040503050406030204" pitchFamily="18" charset="0"/>
+                        <a:ea typeface="华文楷体" panose="02010600040101010101" pitchFamily="2" charset="-122"/>
+                      </a:rPr>
+                      <m:t>(</m:t>
+                    </m:r>
+                    <m:r>
+                      <a:rPr lang="en-US" altLang="zh-CN" sz="2400">
+                        <a:latin typeface="Cambria Math" panose="02040503050406030204" pitchFamily="18" charset="0"/>
+                        <a:ea typeface="华文楷体" panose="02010600040101010101" pitchFamily="2" charset="-122"/>
+                      </a:rPr>
+                      <m:t>1/</m:t>
+                    </m:r>
+                    <m:r>
+                      <a:rPr lang="en-US" altLang="zh-CN" sz="2400" i="1">
+                        <a:latin typeface="Cambria Math" panose="02040503050406030204" pitchFamily="18" charset="0"/>
+                        <a:ea typeface="华文楷体" panose="02010600040101010101" pitchFamily="2" charset="-122"/>
+                      </a:rPr>
+                      <m:t>𝛽</m:t>
+                    </m:r>
+                    <m:r>
+                      <a:rPr lang="en-US" altLang="zh-CN" sz="2400" b="0" i="1" smtClean="0">
+                        <a:latin typeface="Cambria Math" panose="02040503050406030204" pitchFamily="18" charset="0"/>
+                        <a:ea typeface="华文楷体" panose="02010600040101010101" pitchFamily="2" charset="-122"/>
+                      </a:rPr>
+                      <m:t>)</m:t>
+                    </m:r>
                   </m:oMath>
                 </a14:m>
                 <a:endParaRPr lang="en-US" altLang="zh-CN" sz="2400" dirty="0">
@@ -12868,7 +13930,7 @@
             </p:nvSpPr>
             <p:spPr>
               <a:xfrm>
-                <a:off x="6668048" y="2785304"/>
+                <a:off x="6668048" y="2369805"/>
                 <a:ext cx="4826752" cy="1569660"/>
               </a:xfrm>
               <a:prstGeom prst="rect">
@@ -12877,7 +13939,7 @@
               <a:blipFill>
                 <a:blip r:embed="rId5"/>
                 <a:stretch>
-                  <a:fillRect l="-2020" t="-3113" b="-8171"/>
+                  <a:fillRect l="-2020" t="-3113" r="-1263" b="-4280"/>
                 </a:stretch>
               </a:blipFill>
             </p:spPr>
@@ -12910,7 +13972,7 @@
         </p:nvSpPr>
         <p:spPr>
           <a:xfrm>
-            <a:off x="6668048" y="4354964"/>
+            <a:off x="6668048" y="3939465"/>
             <a:ext cx="4826752" cy="830997"/>
           </a:xfrm>
           <a:prstGeom prst="rect">
@@ -12954,7 +14016,59 @@
                 <a:ea typeface="华文楷体" panose="02010600040101010101" pitchFamily="2" charset="-122"/>
                 <a:cs typeface="+mj-cs"/>
               </a:rPr>
-              <a:t>处，猜想为由重建方法（线性重建）造成</a:t>
+              <a:t>处，猜想为由重建方法（线性重建）不足：</a:t>
+            </a:r>
+            <a:endParaRPr lang="en-US" altLang="zh-CN" sz="2400" dirty="0">
+              <a:latin typeface="华文楷体" panose="02010600040101010101" pitchFamily="2" charset="-122"/>
+              <a:ea typeface="华文楷体" panose="02010600040101010101" pitchFamily="2" charset="-122"/>
+              <a:cs typeface="+mj-cs"/>
+            </a:endParaRPr>
+          </a:p>
+        </p:txBody>
+      </p:sp>
+      <p:sp>
+        <p:nvSpPr>
+          <p:cNvPr id="9" name="文本框 8">
+            <a:extLst>
+              <a:ext uri="{FF2B5EF4-FFF2-40B4-BE49-F238E27FC236}">
+                <a16:creationId xmlns:a16="http://schemas.microsoft.com/office/drawing/2014/main" id="{CD1AD42C-4A2C-DBFC-D9CA-F3F67562C3CE}"/>
+              </a:ext>
+            </a:extLst>
+          </p:cNvPr>
+          <p:cNvSpPr txBox="1"/>
+          <p:nvPr/>
+        </p:nvSpPr>
+        <p:spPr>
+          <a:xfrm>
+            <a:off x="6668048" y="4770462"/>
+            <a:ext cx="4826752" cy="830997"/>
+          </a:xfrm>
+          <a:prstGeom prst="rect">
+            <a:avLst/>
+          </a:prstGeom>
+          <a:noFill/>
+        </p:spPr>
+        <p:txBody>
+          <a:bodyPr wrap="square">
+            <a:spAutoFit/>
+          </a:bodyPr>
+          <a:lstStyle/>
+          <a:p>
+            <a:pPr>
+              <a:spcBef>
+                <a:spcPts val="600"/>
+              </a:spcBef>
+              <a:spcAft>
+                <a:spcPts val="600"/>
+              </a:spcAft>
+            </a:pPr>
+            <a:r>
+              <a:rPr lang="zh-CN" altLang="en-US" sz="2400" dirty="0">
+                <a:latin typeface="华文楷体" panose="02010600040101010101" pitchFamily="2" charset="-122"/>
+                <a:ea typeface="华文楷体" panose="02010600040101010101" pitchFamily="2" charset="-122"/>
+                <a:cs typeface="+mj-cs"/>
+              </a:rPr>
+              <a:t>实际上速度有衰减，但该重建方法仍然认为速度不变</a:t>
             </a:r>
             <a:endParaRPr lang="en-US" altLang="zh-CN" sz="2400" dirty="0">
               <a:latin typeface="华文楷体" panose="02010600040101010101" pitchFamily="2" charset="-122"/>
@@ -12989,7 +14103,222 @@
 </p:sld>
 </file>
 
-<file path=ppt/slides/slide18.xml><?xml version="1.0" encoding="utf-8"?>
+<file path=ppt/slides/slide2.xml><?xml version="1.0" encoding="utf-8"?>
+<p:sld xmlns:a="http://schemas.openxmlformats.org/drawingml/2006/main" xmlns:r="http://schemas.openxmlformats.org/officeDocument/2006/relationships" xmlns:p="http://schemas.openxmlformats.org/presentationml/2006/main">
+  <p:cSld>
+    <p:spTree>
+      <p:nvGrpSpPr>
+        <p:cNvPr id="1" name=""/>
+        <p:cNvGrpSpPr/>
+        <p:nvPr/>
+      </p:nvGrpSpPr>
+      <p:grpSpPr>
+        <a:xfrm>
+          <a:off x="0" y="0"/>
+          <a:ext cx="0" cy="0"/>
+          <a:chOff x="0" y="0"/>
+          <a:chExt cx="0" cy="0"/>
+        </a:xfrm>
+      </p:grpSpPr>
+      <p:sp>
+        <p:nvSpPr>
+          <p:cNvPr id="2" name="标题 1">
+            <a:extLst>
+              <a:ext uri="{FF2B5EF4-FFF2-40B4-BE49-F238E27FC236}">
+                <a16:creationId xmlns:a16="http://schemas.microsoft.com/office/drawing/2014/main" id="{9EBDDFBE-EB5E-457B-E06E-65815A2ECA0F}"/>
+              </a:ext>
+            </a:extLst>
+          </p:cNvPr>
+          <p:cNvSpPr>
+            <a:spLocks noGrp="1"/>
+          </p:cNvSpPr>
+          <p:nvPr>
+            <p:ph type="title"/>
+          </p:nvPr>
+        </p:nvSpPr>
+        <p:spPr/>
+        <p:txBody>
+          <a:bodyPr/>
+          <a:lstStyle/>
+          <a:p>
+            <a:r>
+              <a:rPr lang="zh-CN" altLang="en-US" dirty="0">
+                <a:latin typeface="华文宋体" panose="02010600040101010101" pitchFamily="2" charset="-122"/>
+                <a:ea typeface="华文宋体" panose="02010600040101010101" pitchFamily="2" charset="-122"/>
+              </a:rPr>
+              <a:t>目录</a:t>
+            </a:r>
+          </a:p>
+        </p:txBody>
+      </p:sp>
+      <p:sp>
+        <p:nvSpPr>
+          <p:cNvPr id="3" name="内容占位符 2">
+            <a:extLst>
+              <a:ext uri="{FF2B5EF4-FFF2-40B4-BE49-F238E27FC236}">
+                <a16:creationId xmlns:a16="http://schemas.microsoft.com/office/drawing/2014/main" id="{8A1E0005-B676-78F3-00E9-64C0A3D3B03B}"/>
+              </a:ext>
+            </a:extLst>
+          </p:cNvPr>
+          <p:cNvSpPr>
+            <a:spLocks noGrp="1"/>
+          </p:cNvSpPr>
+          <p:nvPr>
+            <p:ph idx="1"/>
+          </p:nvPr>
+        </p:nvSpPr>
+        <p:spPr/>
+        <p:txBody>
+          <a:bodyPr>
+            <a:normAutofit/>
+          </a:bodyPr>
+          <a:lstStyle/>
+          <a:p>
+            <a:pPr>
+              <a:spcAft>
+                <a:spcPts val="600"/>
+              </a:spcAft>
+            </a:pPr>
+            <a:r>
+              <a:rPr lang="en-US" altLang="zh-CN" sz="3600" dirty="0">
+                <a:latin typeface="华文楷体" panose="02010600040101010101" pitchFamily="2" charset="-122"/>
+                <a:ea typeface="华文楷体" panose="02010600040101010101" pitchFamily="2" charset="-122"/>
+                <a:hlinkClick r:id="rId2" action="ppaction://hlinksldjump"/>
+              </a:rPr>
+              <a:t>AMS</a:t>
+            </a:r>
+            <a:r>
+              <a:rPr lang="zh-CN" altLang="en-US" sz="3600" dirty="0">
+                <a:latin typeface="华文楷体" panose="02010600040101010101" pitchFamily="2" charset="-122"/>
+                <a:ea typeface="华文楷体" panose="02010600040101010101" pitchFamily="2" charset="-122"/>
+                <a:hlinkClick r:id="rId2" action="ppaction://hlinksldjump"/>
+              </a:rPr>
+              <a:t>飞行时间探测器简介</a:t>
+            </a:r>
+            <a:endParaRPr lang="en-US" altLang="zh-CN" sz="3600" dirty="0">
+              <a:latin typeface="华文楷体" panose="02010600040101010101" pitchFamily="2" charset="-122"/>
+              <a:ea typeface="华文楷体" panose="02010600040101010101" pitchFamily="2" charset="-122"/>
+            </a:endParaRPr>
+          </a:p>
+          <a:p>
+            <a:pPr>
+              <a:spcAft>
+                <a:spcPts val="600"/>
+              </a:spcAft>
+            </a:pPr>
+            <a:r>
+              <a:rPr lang="zh-CN" altLang="en-US" sz="3600" dirty="0">
+                <a:latin typeface="华文楷体" panose="02010600040101010101" pitchFamily="2" charset="-122"/>
+                <a:ea typeface="华文楷体" panose="02010600040101010101" pitchFamily="2" charset="-122"/>
+                <a:hlinkClick r:id="rId3" action="ppaction://hlinksldjump"/>
+              </a:rPr>
+              <a:t>该阶段研究中使用的参数</a:t>
+            </a:r>
+            <a:endParaRPr lang="en-US" altLang="zh-CN" sz="3600" dirty="0">
+              <a:latin typeface="华文楷体" panose="02010600040101010101" pitchFamily="2" charset="-122"/>
+              <a:ea typeface="华文楷体" panose="02010600040101010101" pitchFamily="2" charset="-122"/>
+            </a:endParaRPr>
+          </a:p>
+          <a:p>
+            <a:pPr>
+              <a:spcAft>
+                <a:spcPts val="600"/>
+              </a:spcAft>
+            </a:pPr>
+            <a:r>
+              <a:rPr lang="zh-CN" altLang="en-US" sz="3600" dirty="0">
+                <a:latin typeface="华文楷体" panose="02010600040101010101" pitchFamily="2" charset="-122"/>
+                <a:ea typeface="华文楷体" panose="02010600040101010101" pitchFamily="2" charset="-122"/>
+                <a:hlinkClick r:id="rId4" action="ppaction://hlinksldjump"/>
+              </a:rPr>
+              <a:t>研究方法</a:t>
+            </a:r>
+            <a:endParaRPr lang="en-US" altLang="zh-CN" sz="3600" dirty="0">
+              <a:latin typeface="华文楷体" panose="02010600040101010101" pitchFamily="2" charset="-122"/>
+              <a:ea typeface="华文楷体" panose="02010600040101010101" pitchFamily="2" charset="-122"/>
+            </a:endParaRPr>
+          </a:p>
+          <a:p>
+            <a:pPr>
+              <a:spcAft>
+                <a:spcPts val="600"/>
+              </a:spcAft>
+            </a:pPr>
+            <a:r>
+              <a:rPr lang="zh-CN" altLang="en-US" sz="3600" dirty="0">
+                <a:latin typeface="华文楷体" panose="02010600040101010101" pitchFamily="2" charset="-122"/>
+                <a:ea typeface="华文楷体" panose="02010600040101010101" pitchFamily="2" charset="-122"/>
+                <a:hlinkClick r:id="rId5" action="ppaction://hlinksldjump"/>
+              </a:rPr>
+              <a:t>结果</a:t>
+            </a:r>
+            <a:endParaRPr lang="zh-CN" altLang="en-US" sz="3600" dirty="0">
+              <a:latin typeface="华文楷体" panose="02010600040101010101" pitchFamily="2" charset="-122"/>
+              <a:ea typeface="华文楷体" panose="02010600040101010101" pitchFamily="2" charset="-122"/>
+            </a:endParaRPr>
+          </a:p>
+        </p:txBody>
+      </p:sp>
+      <p:sp>
+        <p:nvSpPr>
+          <p:cNvPr id="6" name="灯片编号占位符 3">
+            <a:extLst>
+              <a:ext uri="{FF2B5EF4-FFF2-40B4-BE49-F238E27FC236}">
+                <a16:creationId xmlns:a16="http://schemas.microsoft.com/office/drawing/2014/main" id="{07F2F14A-D798-B350-AE15-A415785BDCA7}"/>
+              </a:ext>
+            </a:extLst>
+          </p:cNvPr>
+          <p:cNvSpPr>
+            <a:spLocks noGrp="1"/>
+          </p:cNvSpPr>
+          <p:nvPr>
+            <p:ph type="sldNum" sz="quarter" idx="12"/>
+          </p:nvPr>
+        </p:nvSpPr>
+        <p:spPr>
+          <a:xfrm>
+            <a:off x="8610600" y="6356350"/>
+            <a:ext cx="2743200" cy="365125"/>
+          </a:xfrm>
+        </p:spPr>
+        <p:txBody>
+          <a:bodyPr/>
+          <a:lstStyle/>
+          <a:p>
+            <a:fld id="{4DF96A39-405C-4801-AFAA-189ED9B29D59}" type="slidenum">
+              <a:rPr lang="zh-CN" altLang="en-US" sz="2400" smtClean="0"/>
+              <a:t>2</a:t>
+            </a:fld>
+            <a:endParaRPr lang="zh-CN" altLang="en-US" sz="2400" dirty="0"/>
+          </a:p>
+        </p:txBody>
+      </p:sp>
+    </p:spTree>
+    <p:extLst>
+      <p:ext uri="{BB962C8B-B14F-4D97-AF65-F5344CB8AC3E}">
+        <p14:creationId xmlns:p14="http://schemas.microsoft.com/office/powerpoint/2010/main" val="2364123729"/>
+      </p:ext>
+    </p:extLst>
+  </p:cSld>
+  <p:clrMapOvr>
+    <a:masterClrMapping/>
+  </p:clrMapOvr>
+  <mc:AlternateContent xmlns:mc="http://schemas.openxmlformats.org/markup-compatibility/2006" xmlns:p159="http://schemas.microsoft.com/office/powerpoint/2015/09/main">
+    <mc:Choice Requires="p159">
+      <p:transition>
+        <p159:morph option="byObject"/>
+      </p:transition>
+    </mc:Choice>
+    <mc:Fallback xmlns="">
+      <p:transition>
+        <p:fade/>
+      </p:transition>
+    </mc:Fallback>
+  </mc:AlternateContent>
+</p:sld>
+</file>
+
+<file path=ppt/slides/slide20.xml><?xml version="1.0" encoding="utf-8"?>
 <p:sld xmlns:a="http://schemas.openxmlformats.org/drawingml/2006/main" xmlns:r="http://schemas.openxmlformats.org/officeDocument/2006/relationships" xmlns:p="http://schemas.openxmlformats.org/presentationml/2006/main">
   <p:cSld>
     <p:spTree>
@@ -13014,10 +14343,10 @@
       </p:grpSpPr>
       <p:pic>
         <p:nvPicPr>
-          <p:cNvPr id="5" name="图片 4" descr="图表, 折线图&#10;&#10;描述已自动生成">
+          <p:cNvPr id="6" name="图片 5" descr="图表, 折线图&#10;&#10;描述已自动生成">
             <a:extLst>
               <a:ext uri="{FF2B5EF4-FFF2-40B4-BE49-F238E27FC236}">
-                <a16:creationId xmlns:a16="http://schemas.microsoft.com/office/drawing/2014/main" id="{95225374-D0A4-FCE8-5AC2-EBB2428B111B}"/>
+                <a16:creationId xmlns:a16="http://schemas.microsoft.com/office/drawing/2014/main" id="{72E95237-B92F-B8BF-647A-553E993F6D85}"/>
               </a:ext>
             </a:extLst>
           </p:cNvPr>
@@ -13040,8 +14369,8 @@
         </p:blipFill>
         <p:spPr>
           <a:xfrm>
-            <a:off x="694800" y="1670400"/>
-            <a:ext cx="6286622" cy="4399200"/>
+            <a:off x="694799" y="1670400"/>
+            <a:ext cx="6286620" cy="4399200"/>
           </a:xfrm>
           <a:prstGeom prst="rect">
             <a:avLst/>
@@ -13093,8 +14422,8 @@
           </a:p>
         </p:txBody>
       </p:sp>
-      <mc:AlternateContent xmlns:mc="http://schemas.openxmlformats.org/markup-compatibility/2006">
-        <mc:Choice xmlns:a14="http://schemas.microsoft.com/office/drawing/2010/main" Requires="a14">
+      <mc:AlternateContent xmlns:mc="http://schemas.openxmlformats.org/markup-compatibility/2006" xmlns:a14="http://schemas.microsoft.com/office/drawing/2010/main">
+        <mc:Choice Requires="a14">
           <p:sp>
             <p:nvSpPr>
               <p:cNvPr id="3" name="文本框 2">
@@ -13304,7 +14633,7 @@
             </p:txBody>
           </p:sp>
         </mc:Choice>
-        <mc:Fallback>
+        <mc:Fallback xmlns="">
           <p:sp>
             <p:nvSpPr>
               <p:cNvPr id="3" name="文本框 2">
@@ -13377,7 +14706,7 @@
           <a:p>
             <a:fld id="{4DF96A39-405C-4801-AFAA-189ED9B29D59}" type="slidenum">
               <a:rPr lang="zh-CN" altLang="en-US" sz="2400" smtClean="0"/>
-              <a:t>18</a:t>
+              <a:t>20</a:t>
             </a:fld>
             <a:endParaRPr lang="zh-CN" altLang="en-US" sz="2400" dirty="0"/>
           </a:p>
@@ -13705,8 +15034,8 @@
           </p:sp>
         </mc:Fallback>
       </mc:AlternateContent>
-      <mc:AlternateContent xmlns:mc="http://schemas.openxmlformats.org/markup-compatibility/2006">
-        <mc:Choice xmlns:a14="http://schemas.microsoft.com/office/drawing/2010/main" Requires="a14">
+      <mc:AlternateContent xmlns:mc="http://schemas.openxmlformats.org/markup-compatibility/2006" xmlns:a14="http://schemas.microsoft.com/office/drawing/2010/main">
+        <mc:Choice Requires="a14">
           <p:sp>
             <p:nvSpPr>
               <p:cNvPr id="9" name="文本框 8">
@@ -13772,7 +15101,7 @@
             </p:txBody>
           </p:sp>
         </mc:Choice>
-        <mc:Fallback>
+        <mc:Fallback xmlns="">
           <p:sp>
             <p:nvSpPr>
               <p:cNvPr id="9" name="文本框 8">
@@ -13842,7 +15171,7 @@
 </p:sld>
 </file>
 
-<file path=ppt/slides/slide19.xml><?xml version="1.0" encoding="utf-8"?>
+<file path=ppt/slides/slide21.xml><?xml version="1.0" encoding="utf-8"?>
 <p:sld xmlns:a="http://schemas.openxmlformats.org/drawingml/2006/main" xmlns:r="http://schemas.openxmlformats.org/officeDocument/2006/relationships" xmlns:p="http://schemas.openxmlformats.org/presentationml/2006/main">
   <p:cSld>
     <p:spTree>
@@ -13967,7 +15296,7 @@
                   <a:latin typeface="楷体" panose="02010609060101010101" pitchFamily="49" charset="-122"/>
                   <a:ea typeface="楷体" panose="02010609060101010101" pitchFamily="49" charset="-122"/>
                 </a:rPr>
-                <a:t>2025.1.16</a:t>
+                <a:t>2025.1.18</a:t>
               </a:r>
               <a:endParaRPr lang="zh-CN" altLang="en-US" sz="2400" dirty="0"/>
             </a:p>
@@ -13999,222 +15328,7 @@
 </p:sld>
 </file>
 
-<file path=ppt/slides/slide2.xml><?xml version="1.0" encoding="utf-8"?>
-<p:sld xmlns:a="http://schemas.openxmlformats.org/drawingml/2006/main" xmlns:r="http://schemas.openxmlformats.org/officeDocument/2006/relationships" xmlns:p="http://schemas.openxmlformats.org/presentationml/2006/main">
-  <p:cSld>
-    <p:spTree>
-      <p:nvGrpSpPr>
-        <p:cNvPr id="1" name=""/>
-        <p:cNvGrpSpPr/>
-        <p:nvPr/>
-      </p:nvGrpSpPr>
-      <p:grpSpPr>
-        <a:xfrm>
-          <a:off x="0" y="0"/>
-          <a:ext cx="0" cy="0"/>
-          <a:chOff x="0" y="0"/>
-          <a:chExt cx="0" cy="0"/>
-        </a:xfrm>
-      </p:grpSpPr>
-      <p:sp>
-        <p:nvSpPr>
-          <p:cNvPr id="2" name="标题 1">
-            <a:extLst>
-              <a:ext uri="{FF2B5EF4-FFF2-40B4-BE49-F238E27FC236}">
-                <a16:creationId xmlns:a16="http://schemas.microsoft.com/office/drawing/2014/main" id="{9EBDDFBE-EB5E-457B-E06E-65815A2ECA0F}"/>
-              </a:ext>
-            </a:extLst>
-          </p:cNvPr>
-          <p:cNvSpPr>
-            <a:spLocks noGrp="1"/>
-          </p:cNvSpPr>
-          <p:nvPr>
-            <p:ph type="title"/>
-          </p:nvPr>
-        </p:nvSpPr>
-        <p:spPr/>
-        <p:txBody>
-          <a:bodyPr/>
-          <a:lstStyle/>
-          <a:p>
-            <a:r>
-              <a:rPr lang="zh-CN" altLang="en-US" dirty="0">
-                <a:latin typeface="华文宋体" panose="02010600040101010101" pitchFamily="2" charset="-122"/>
-                <a:ea typeface="华文宋体" panose="02010600040101010101" pitchFamily="2" charset="-122"/>
-              </a:rPr>
-              <a:t>目录</a:t>
-            </a:r>
-          </a:p>
-        </p:txBody>
-      </p:sp>
-      <p:sp>
-        <p:nvSpPr>
-          <p:cNvPr id="3" name="内容占位符 2">
-            <a:extLst>
-              <a:ext uri="{FF2B5EF4-FFF2-40B4-BE49-F238E27FC236}">
-                <a16:creationId xmlns:a16="http://schemas.microsoft.com/office/drawing/2014/main" id="{8A1E0005-B676-78F3-00E9-64C0A3D3B03B}"/>
-              </a:ext>
-            </a:extLst>
-          </p:cNvPr>
-          <p:cNvSpPr>
-            <a:spLocks noGrp="1"/>
-          </p:cNvSpPr>
-          <p:nvPr>
-            <p:ph idx="1"/>
-          </p:nvPr>
-        </p:nvSpPr>
-        <p:spPr/>
-        <p:txBody>
-          <a:bodyPr>
-            <a:normAutofit/>
-          </a:bodyPr>
-          <a:lstStyle/>
-          <a:p>
-            <a:pPr>
-              <a:spcAft>
-                <a:spcPts val="600"/>
-              </a:spcAft>
-            </a:pPr>
-            <a:r>
-              <a:rPr lang="en-US" altLang="zh-CN" sz="3600" dirty="0">
-                <a:latin typeface="华文楷体" panose="02010600040101010101" pitchFamily="2" charset="-122"/>
-                <a:ea typeface="华文楷体" panose="02010600040101010101" pitchFamily="2" charset="-122"/>
-                <a:hlinkClick r:id="rId2" action="ppaction://hlinksldjump"/>
-              </a:rPr>
-              <a:t>AMS</a:t>
-            </a:r>
-            <a:r>
-              <a:rPr lang="zh-CN" altLang="en-US" sz="3600" dirty="0">
-                <a:latin typeface="华文楷体" panose="02010600040101010101" pitchFamily="2" charset="-122"/>
-                <a:ea typeface="华文楷体" panose="02010600040101010101" pitchFamily="2" charset="-122"/>
-                <a:hlinkClick r:id="rId2" action="ppaction://hlinksldjump"/>
-              </a:rPr>
-              <a:t>飞行时间探测器简介</a:t>
-            </a:r>
-            <a:endParaRPr lang="en-US" altLang="zh-CN" sz="3600" dirty="0">
-              <a:latin typeface="华文楷体" panose="02010600040101010101" pitchFamily="2" charset="-122"/>
-              <a:ea typeface="华文楷体" panose="02010600040101010101" pitchFamily="2" charset="-122"/>
-            </a:endParaRPr>
-          </a:p>
-          <a:p>
-            <a:pPr>
-              <a:spcAft>
-                <a:spcPts val="600"/>
-              </a:spcAft>
-            </a:pPr>
-            <a:r>
-              <a:rPr lang="zh-CN" altLang="en-US" sz="3600" dirty="0">
-                <a:latin typeface="华文楷体" panose="02010600040101010101" pitchFamily="2" charset="-122"/>
-                <a:ea typeface="华文楷体" panose="02010600040101010101" pitchFamily="2" charset="-122"/>
-                <a:hlinkClick r:id="rId3" action="ppaction://hlinksldjump"/>
-              </a:rPr>
-              <a:t>该阶段研究中使用的参数</a:t>
-            </a:r>
-            <a:endParaRPr lang="en-US" altLang="zh-CN" sz="3600" dirty="0">
-              <a:latin typeface="华文楷体" panose="02010600040101010101" pitchFamily="2" charset="-122"/>
-              <a:ea typeface="华文楷体" panose="02010600040101010101" pitchFamily="2" charset="-122"/>
-            </a:endParaRPr>
-          </a:p>
-          <a:p>
-            <a:pPr>
-              <a:spcAft>
-                <a:spcPts val="600"/>
-              </a:spcAft>
-            </a:pPr>
-            <a:r>
-              <a:rPr lang="zh-CN" altLang="en-US" sz="3600" dirty="0">
-                <a:latin typeface="华文楷体" panose="02010600040101010101" pitchFamily="2" charset="-122"/>
-                <a:ea typeface="华文楷体" panose="02010600040101010101" pitchFamily="2" charset="-122"/>
-                <a:hlinkClick r:id="rId4" action="ppaction://hlinksldjump"/>
-              </a:rPr>
-              <a:t>研究方法</a:t>
-            </a:r>
-            <a:endParaRPr lang="en-US" altLang="zh-CN" sz="3600" dirty="0">
-              <a:latin typeface="华文楷体" panose="02010600040101010101" pitchFamily="2" charset="-122"/>
-              <a:ea typeface="华文楷体" panose="02010600040101010101" pitchFamily="2" charset="-122"/>
-            </a:endParaRPr>
-          </a:p>
-          <a:p>
-            <a:pPr>
-              <a:spcAft>
-                <a:spcPts val="600"/>
-              </a:spcAft>
-            </a:pPr>
-            <a:r>
-              <a:rPr lang="zh-CN" altLang="en-US" sz="3600" dirty="0">
-                <a:latin typeface="华文楷体" panose="02010600040101010101" pitchFamily="2" charset="-122"/>
-                <a:ea typeface="华文楷体" panose="02010600040101010101" pitchFamily="2" charset="-122"/>
-                <a:hlinkClick r:id="rId5" action="ppaction://hlinksldjump"/>
-              </a:rPr>
-              <a:t>结果</a:t>
-            </a:r>
-            <a:endParaRPr lang="zh-CN" altLang="en-US" sz="3600" dirty="0">
-              <a:latin typeface="华文楷体" panose="02010600040101010101" pitchFamily="2" charset="-122"/>
-              <a:ea typeface="华文楷体" panose="02010600040101010101" pitchFamily="2" charset="-122"/>
-            </a:endParaRPr>
-          </a:p>
-        </p:txBody>
-      </p:sp>
-      <p:sp>
-        <p:nvSpPr>
-          <p:cNvPr id="6" name="灯片编号占位符 3">
-            <a:extLst>
-              <a:ext uri="{FF2B5EF4-FFF2-40B4-BE49-F238E27FC236}">
-                <a16:creationId xmlns:a16="http://schemas.microsoft.com/office/drawing/2014/main" id="{07F2F14A-D798-B350-AE15-A415785BDCA7}"/>
-              </a:ext>
-            </a:extLst>
-          </p:cNvPr>
-          <p:cNvSpPr>
-            <a:spLocks noGrp="1"/>
-          </p:cNvSpPr>
-          <p:nvPr>
-            <p:ph type="sldNum" sz="quarter" idx="12"/>
-          </p:nvPr>
-        </p:nvSpPr>
-        <p:spPr>
-          <a:xfrm>
-            <a:off x="8610600" y="6356350"/>
-            <a:ext cx="2743200" cy="365125"/>
-          </a:xfrm>
-        </p:spPr>
-        <p:txBody>
-          <a:bodyPr/>
-          <a:lstStyle/>
-          <a:p>
-            <a:fld id="{4DF96A39-405C-4801-AFAA-189ED9B29D59}" type="slidenum">
-              <a:rPr lang="zh-CN" altLang="en-US" sz="2400" smtClean="0"/>
-              <a:t>2</a:t>
-            </a:fld>
-            <a:endParaRPr lang="zh-CN" altLang="en-US" sz="2400" dirty="0"/>
-          </a:p>
-        </p:txBody>
-      </p:sp>
-    </p:spTree>
-    <p:extLst>
-      <p:ext uri="{BB962C8B-B14F-4D97-AF65-F5344CB8AC3E}">
-        <p14:creationId xmlns:p14="http://schemas.microsoft.com/office/powerpoint/2010/main" val="2364123729"/>
-      </p:ext>
-    </p:extLst>
-  </p:cSld>
-  <p:clrMapOvr>
-    <a:masterClrMapping/>
-  </p:clrMapOvr>
-  <mc:AlternateContent xmlns:mc="http://schemas.openxmlformats.org/markup-compatibility/2006" xmlns:p159="http://schemas.microsoft.com/office/powerpoint/2015/09/main">
-    <mc:Choice Requires="p159">
-      <p:transition>
-        <p159:morph option="byObject"/>
-      </p:transition>
-    </mc:Choice>
-    <mc:Fallback xmlns="">
-      <p:transition>
-        <p:fade/>
-      </p:transition>
-    </mc:Fallback>
-  </mc:AlternateContent>
-</p:sld>
-</file>
-
-<file path=ppt/slides/slide20.xml><?xml version="1.0" encoding="utf-8"?>
+<file path=ppt/slides/slide22.xml><?xml version="1.0" encoding="utf-8"?>
 <p:sld xmlns:a="http://schemas.openxmlformats.org/drawingml/2006/main" xmlns:r="http://schemas.openxmlformats.org/officeDocument/2006/relationships" xmlns:p="http://schemas.openxmlformats.org/presentationml/2006/main" show="0">
   <p:cSld>
     <p:spTree>
@@ -16036,7 +17150,7 @@
           <a:p>
             <a:fld id="{4DF96A39-405C-4801-AFAA-189ED9B29D59}" type="slidenum">
               <a:rPr lang="zh-CN" altLang="en-US" sz="2400" smtClean="0"/>
-              <a:t>20</a:t>
+              <a:t>22</a:t>
             </a:fld>
             <a:endParaRPr lang="zh-CN" altLang="en-US" sz="2400" dirty="0"/>
           </a:p>
@@ -25798,7 +26912,7 @@
                 <a:ea typeface="华文楷体" panose="02010600040101010101" pitchFamily="2" charset="-122"/>
                 <a:cs typeface="Times New Roman" panose="02020603050405020304" pitchFamily="18" charset="0"/>
               </a:rPr>
-              <a:t>[4] </a:t>
+              <a:t>[8] </a:t>
             </a:r>
             <a:r>
               <a:rPr lang="en-US" altLang="zh-CN" sz="1600" dirty="0" err="1">

</xml_diff>